<commit_message>
Less confusing loop presentation
</commit_message>
<xml_diff>
--- a/Presentations/Presentations Power Point/03_Looping.pptx
+++ b/Presentations/Presentations Power Point/03_Looping.pptx
@@ -1,26 +1,26 @@
 
 <file path=ppt/presentation.xml><?xml version="1.0" encoding="utf-8"?>
-<p:presentation xmlns:a="http://schemas.openxmlformats.org/drawingml/2006/main" xmlns:r="http://schemas.openxmlformats.org/officeDocument/2006/relationships" xmlns:p="http://schemas.openxmlformats.org/presentationml/2006/main" xmlns:m="http://schemas.openxmlformats.org/officeDocument/2006/math" xmlns:a14="http://schemas.microsoft.com/office/drawing/2010/main">
+<p:presentation xmlns:a="http://schemas.openxmlformats.org/drawingml/2006/main" xmlns:r="http://schemas.openxmlformats.org/officeDocument/2006/relationships" xmlns:p="http://schemas.openxmlformats.org/presentationml/2006/main">
   <p:sldMasterIdLst>
-    <p:sldMasterId id="2147483648" r:id="rId5"/>
+    <p:sldMasterId id="2147483648" r:id="rId1"/>
   </p:sldMasterIdLst>
   <p:notesMasterIdLst>
-    <p:notesMasterId r:id="rId7"/>
+    <p:notesMasterId r:id="rId15"/>
   </p:notesMasterIdLst>
   <p:sldIdLst>
-    <p:sldId id="256" r:id="rId8"/>
-    <p:sldId id="257" r:id="rId9"/>
-    <p:sldId id="258" r:id="rId10"/>
-    <p:sldId id="259" r:id="rId11"/>
-    <p:sldId id="260" r:id="rId12"/>
-    <p:sldId id="261" r:id="rId13"/>
-    <p:sldId id="262" r:id="rId14"/>
-    <p:sldId id="263" r:id="rId15"/>
-    <p:sldId id="264" r:id="rId16"/>
-    <p:sldId id="265" r:id="rId17"/>
-    <p:sldId id="266" r:id="rId18"/>
-    <p:sldId id="267" r:id="rId19"/>
-    <p:sldId id="268" r:id="rId20"/>
+    <p:sldId id="256" r:id="rId2"/>
+    <p:sldId id="257" r:id="rId3"/>
+    <p:sldId id="258" r:id="rId4"/>
+    <p:sldId id="259" r:id="rId5"/>
+    <p:sldId id="260" r:id="rId6"/>
+    <p:sldId id="261" r:id="rId7"/>
+    <p:sldId id="262" r:id="rId8"/>
+    <p:sldId id="264" r:id="rId9"/>
+    <p:sldId id="265" r:id="rId10"/>
+    <p:sldId id="263" r:id="rId11"/>
+    <p:sldId id="266" r:id="rId12"/>
+    <p:sldId id="267" r:id="rId13"/>
+    <p:sldId id="268" r:id="rId14"/>
   </p:sldIdLst>
   <p:sldSz cx="13004800" cy="9753600"/>
   <p:notesSz cx="6858000" cy="9144000"/>
@@ -40,7 +40,7 @@
       <a:buFontTx/>
       <a:buNone/>
       <a:tabLst/>
-      <a:defRPr b="0" baseline="0" cap="none" i="0" spc="0" strike="noStrike" sz="1800" u="none" kumimoji="0" normalizeH="0">
+      <a:defRPr kumimoji="0" sz="1800" b="0" i="0" u="none" strike="noStrike" cap="none" spc="0" normalizeH="0" baseline="0">
         <a:ln>
           <a:noFill/>
         </a:ln>
@@ -66,7 +66,7 @@
       <a:buFontTx/>
       <a:buNone/>
       <a:tabLst/>
-      <a:defRPr b="0" baseline="0" cap="none" i="0" spc="0" strike="noStrike" sz="5800" u="none" kumimoji="0" normalizeH="0">
+      <a:defRPr kumimoji="0" sz="5800" b="0" i="0" u="none" strike="noStrike" cap="none" spc="0" normalizeH="0" baseline="0">
         <a:ln>
           <a:noFill/>
         </a:ln>
@@ -96,7 +96,7 @@
       <a:buFontTx/>
       <a:buNone/>
       <a:tabLst/>
-      <a:defRPr b="0" baseline="0" cap="none" i="0" spc="0" strike="noStrike" sz="5800" u="none" kumimoji="0" normalizeH="0">
+      <a:defRPr kumimoji="0" sz="5800" b="0" i="0" u="none" strike="noStrike" cap="none" spc="0" normalizeH="0" baseline="0">
         <a:ln>
           <a:noFill/>
         </a:ln>
@@ -126,7 +126,7 @@
       <a:buFontTx/>
       <a:buNone/>
       <a:tabLst/>
-      <a:defRPr b="0" baseline="0" cap="none" i="0" spc="0" strike="noStrike" sz="5800" u="none" kumimoji="0" normalizeH="0">
+      <a:defRPr kumimoji="0" sz="5800" b="0" i="0" u="none" strike="noStrike" cap="none" spc="0" normalizeH="0" baseline="0">
         <a:ln>
           <a:noFill/>
         </a:ln>
@@ -156,7 +156,7 @@
       <a:buFontTx/>
       <a:buNone/>
       <a:tabLst/>
-      <a:defRPr b="0" baseline="0" cap="none" i="0" spc="0" strike="noStrike" sz="5800" u="none" kumimoji="0" normalizeH="0">
+      <a:defRPr kumimoji="0" sz="5800" b="0" i="0" u="none" strike="noStrike" cap="none" spc="0" normalizeH="0" baseline="0">
         <a:ln>
           <a:noFill/>
         </a:ln>
@@ -186,7 +186,7 @@
       <a:buFontTx/>
       <a:buNone/>
       <a:tabLst/>
-      <a:defRPr b="0" baseline="0" cap="none" i="0" spc="0" strike="noStrike" sz="5800" u="none" kumimoji="0" normalizeH="0">
+      <a:defRPr kumimoji="0" sz="5800" b="0" i="0" u="none" strike="noStrike" cap="none" spc="0" normalizeH="0" baseline="0">
         <a:ln>
           <a:noFill/>
         </a:ln>
@@ -216,7 +216,7 @@
       <a:buFontTx/>
       <a:buNone/>
       <a:tabLst/>
-      <a:defRPr b="0" baseline="0" cap="none" i="0" spc="0" strike="noStrike" sz="5800" u="none" kumimoji="0" normalizeH="0">
+      <a:defRPr kumimoji="0" sz="5800" b="0" i="0" u="none" strike="noStrike" cap="none" spc="0" normalizeH="0" baseline="0">
         <a:ln>
           <a:noFill/>
         </a:ln>
@@ -246,7 +246,7 @@
       <a:buFontTx/>
       <a:buNone/>
       <a:tabLst/>
-      <a:defRPr b="0" baseline="0" cap="none" i="0" spc="0" strike="noStrike" sz="5800" u="none" kumimoji="0" normalizeH="0">
+      <a:defRPr kumimoji="0" sz="5800" b="0" i="0" u="none" strike="noStrike" cap="none" spc="0" normalizeH="0" baseline="0">
         <a:ln>
           <a:noFill/>
         </a:ln>
@@ -276,7 +276,7 @@
       <a:buFontTx/>
       <a:buNone/>
       <a:tabLst/>
-      <a:defRPr b="0" baseline="0" cap="none" i="0" spc="0" strike="noStrike" sz="5800" u="none" kumimoji="0" normalizeH="0">
+      <a:defRPr kumimoji="0" sz="5800" b="0" i="0" u="none" strike="noStrike" cap="none" spc="0" normalizeH="0" baseline="0">
         <a:ln>
           <a:noFill/>
         </a:ln>
@@ -306,7 +306,7 @@
       <a:buFontTx/>
       <a:buNone/>
       <a:tabLst/>
-      <a:defRPr b="0" baseline="0" cap="none" i="0" spc="0" strike="noStrike" sz="5800" u="none" kumimoji="0" normalizeH="0">
+      <a:defRPr kumimoji="0" sz="5800" b="0" i="0" u="none" strike="noStrike" cap="none" spc="0" normalizeH="0" baseline="0">
         <a:ln>
           <a:noFill/>
         </a:ln>
@@ -325,13 +325,14 @@
 </p:presentation>
 </file>
 
-<file path=ppt/commentAuthors.xml><?xml version="1.0" encoding="utf-8"?>
-<p:cmAuthorLst xmlns:a="http://schemas.openxmlformats.org/drawingml/2006/main" xmlns:r="http://schemas.openxmlformats.org/officeDocument/2006/relationships" xmlns:p="http://schemas.openxmlformats.org/presentationml/2006/main" xmlns:m="http://schemas.openxmlformats.org/officeDocument/2006/math" xmlns:a14="http://schemas.microsoft.com/office/drawing/2010/main"/>
-</file>
-
 <file path=ppt/notesMasters/notesMaster1.xml><?xml version="1.0" encoding="utf-8"?>
-<p:notesMaster xmlns:a="http://schemas.openxmlformats.org/drawingml/2006/main" xmlns:r="http://schemas.openxmlformats.org/officeDocument/2006/relationships" xmlns:p="http://schemas.openxmlformats.org/presentationml/2006/main" xmlns:m="http://schemas.openxmlformats.org/officeDocument/2006/math" xmlns:a14="http://schemas.microsoft.com/office/drawing/2010/main">
+<p:notesMaster xmlns:a="http://schemas.openxmlformats.org/drawingml/2006/main" xmlns:r="http://schemas.openxmlformats.org/officeDocument/2006/relationships" xmlns:p="http://schemas.openxmlformats.org/presentationml/2006/main">
   <p:cSld>
+    <p:bg>
+      <p:bgRef idx="1001">
+        <a:schemeClr val="bg1"/>
+      </p:bgRef>
+    </p:bg>
     <p:spTree>
       <p:nvGrpSpPr>
         <p:cNvPr id="1" name=""/>
@@ -349,7 +350,9 @@
       <p:sp>
         <p:nvSpPr>
           <p:cNvPr id="116" name="Shape 116"/>
-          <p:cNvSpPr/>
+          <p:cNvSpPr>
+            <a:spLocks noGrp="1" noRot="1" noChangeAspect="1"/>
+          </p:cNvSpPr>
           <p:nvPr>
             <p:ph type="sldImg"/>
           </p:nvPr>
@@ -367,14 +370,16 @@
           <a:bodyPr/>
           <a:lstStyle/>
           <a:p>
-            <a:pPr/>
+            <a:endParaRPr/>
           </a:p>
         </p:txBody>
       </p:sp>
       <p:sp>
         <p:nvSpPr>
           <p:cNvPr id="117" name="Shape 117"/>
-          <p:cNvSpPr/>
+          <p:cNvSpPr>
+            <a:spLocks noGrp="1"/>
+          </p:cNvSpPr>
           <p:nvPr>
             <p:ph type="body" sz="quarter" idx="1"/>
           </p:nvPr>
@@ -392,7 +397,7 @@
           <a:bodyPr/>
           <a:lstStyle/>
           <a:p>
-            <a:pPr/>
+            <a:endParaRPr/>
           </a:p>
         </p:txBody>
       </p:sp>
@@ -504,7 +509,7 @@
 </file>
 
 <file path=ppt/slideLayouts/slideLayout1.xml><?xml version="1.0" encoding="utf-8"?>
-<p:sldLayout xmlns:a="http://schemas.openxmlformats.org/drawingml/2006/main" xmlns:r="http://schemas.openxmlformats.org/officeDocument/2006/relationships" xmlns:p="http://schemas.openxmlformats.org/presentationml/2006/main" xmlns:m="http://schemas.openxmlformats.org/officeDocument/2006/math" xmlns:a14="http://schemas.microsoft.com/office/drawing/2010/main" type="title" showMasterSp="1" showMasterPhAnim="1">
+<p:sldLayout xmlns:a="http://schemas.openxmlformats.org/drawingml/2006/main" xmlns:r="http://schemas.openxmlformats.org/officeDocument/2006/relationships" xmlns:p="http://schemas.openxmlformats.org/presentationml/2006/main" type="title">
   <p:cSld name="Titre et sous-titre">
     <p:spTree>
       <p:nvGrpSpPr>
@@ -523,7 +528,9 @@
       <p:sp>
         <p:nvSpPr>
           <p:cNvPr id="11" name="Title Text"/>
-          <p:cNvSpPr txBox="1"/>
+          <p:cNvSpPr txBox="1">
+            <a:spLocks noGrp="1"/>
+          </p:cNvSpPr>
           <p:nvPr>
             <p:ph type="title"/>
           </p:nvPr>
@@ -537,7 +544,6 @@
           <a:bodyPr/>
           <a:lstStyle/>
           <a:p>
-            <a:pPr/>
             <a:r>
               <a:t>Title Text</a:t>
             </a:r>
@@ -547,7 +553,9 @@
       <p:sp>
         <p:nvSpPr>
           <p:cNvPr id="12" name="Body Level One…"/>
-          <p:cNvSpPr txBox="1"/>
+          <p:cNvSpPr txBox="1">
+            <a:spLocks noGrp="1"/>
+          </p:cNvSpPr>
           <p:nvPr>
             <p:ph type="body" sz="quarter" idx="1"/>
           </p:nvPr>
@@ -561,7 +569,6 @@
           <a:bodyPr/>
           <a:lstStyle/>
           <a:p>
-            <a:pPr/>
             <a:r>
               <a:t>Body Level One</a:t>
             </a:r>
@@ -595,7 +602,9 @@
       <p:sp>
         <p:nvSpPr>
           <p:cNvPr id="13" name="Slide Number"/>
-          <p:cNvSpPr txBox="1"/>
+          <p:cNvSpPr txBox="1">
+            <a:spLocks noGrp="1"/>
+          </p:cNvSpPr>
           <p:nvPr>
             <p:ph type="sldNum" sz="quarter" idx="2"/>
           </p:nvPr>
@@ -609,8 +618,10 @@
           <a:bodyPr/>
           <a:lstStyle/>
           <a:p>
-            <a:pPr/>
-            <a:fld id="{86CB4B4D-7CA3-9044-876B-883B54F8677D}" type="slidenum"/>
+            <a:fld id="{86CB4B4D-7CA3-9044-876B-883B54F8677D}" type="slidenum">
+              <a:t>‹#›</a:t>
+            </a:fld>
+            <a:endParaRPr/>
           </a:p>
         </p:txBody>
       </p:sp>
@@ -619,12 +630,12 @@
   <p:clrMapOvr>
     <a:masterClrMapping/>
   </p:clrMapOvr>
-  <p:transition xmlns:p14="http://schemas.microsoft.com/office/powerpoint/2010/main" spd="med" advClick="1"/>
+  <p:transition spd="med"/>
 </p:sldLayout>
 </file>
 
 <file path=ppt/slideLayouts/slideLayout10.xml><?xml version="1.0" encoding="utf-8"?>
-<p:sldLayout xmlns:a="http://schemas.openxmlformats.org/drawingml/2006/main" xmlns:r="http://schemas.openxmlformats.org/officeDocument/2006/relationships" xmlns:p="http://schemas.openxmlformats.org/presentationml/2006/main" xmlns:m="http://schemas.openxmlformats.org/officeDocument/2006/math" xmlns:a14="http://schemas.microsoft.com/office/drawing/2010/main" type="tx" showMasterSp="1" showMasterPhAnim="1">
+<p:sldLayout xmlns:a="http://schemas.openxmlformats.org/drawingml/2006/main" xmlns:r="http://schemas.openxmlformats.org/officeDocument/2006/relationships" xmlns:p="http://schemas.openxmlformats.org/presentationml/2006/main" type="tx">
   <p:cSld name="Citation">
     <p:spTree>
       <p:nvGrpSpPr>
@@ -643,7 +654,9 @@
       <p:sp>
         <p:nvSpPr>
           <p:cNvPr id="93" name="-Gilles Allain"/>
-          <p:cNvSpPr/>
+          <p:cNvSpPr>
+            <a:spLocks noGrp="1"/>
+          </p:cNvSpPr>
           <p:nvPr>
             <p:ph type="body" sz="quarter" idx="13"/>
           </p:nvPr>
@@ -672,7 +685,6 @@
             </a:lvl1pPr>
           </a:lstStyle>
           <a:p>
-            <a:pPr/>
             <a:r>
               <a:t>-Gilles Allain</a:t>
             </a:r>
@@ -682,7 +694,9 @@
       <p:sp>
         <p:nvSpPr>
           <p:cNvPr id="94" name="« Saisissez une citation ici. »"/>
-          <p:cNvSpPr/>
+          <p:cNvSpPr>
+            <a:spLocks noGrp="1"/>
+          </p:cNvSpPr>
           <p:nvPr>
             <p:ph type="body" sz="quarter" idx="14"/>
           </p:nvPr>
@@ -706,7 +720,6 @@
             </a:lvl1pPr>
           </a:lstStyle>
           <a:p>
-            <a:pPr/>
             <a:r>
               <a:t>« Saisissez une citation ici. » </a:t>
             </a:r>
@@ -716,7 +729,9 @@
       <p:sp>
         <p:nvSpPr>
           <p:cNvPr id="95" name="Slide Number"/>
-          <p:cNvSpPr txBox="1"/>
+          <p:cNvSpPr txBox="1">
+            <a:spLocks noGrp="1"/>
+          </p:cNvSpPr>
           <p:nvPr>
             <p:ph type="sldNum" sz="quarter" idx="2"/>
           </p:nvPr>
@@ -730,8 +745,10 @@
           <a:bodyPr/>
           <a:lstStyle/>
           <a:p>
-            <a:pPr/>
-            <a:fld id="{86CB4B4D-7CA3-9044-876B-883B54F8677D}" type="slidenum"/>
+            <a:fld id="{86CB4B4D-7CA3-9044-876B-883B54F8677D}" type="slidenum">
+              <a:t>‹#›</a:t>
+            </a:fld>
+            <a:endParaRPr/>
           </a:p>
         </p:txBody>
       </p:sp>
@@ -740,12 +757,12 @@
   <p:clrMapOvr>
     <a:masterClrMapping/>
   </p:clrMapOvr>
-  <p:transition xmlns:p14="http://schemas.microsoft.com/office/powerpoint/2010/main" spd="med" advClick="1"/>
+  <p:transition spd="med"/>
 </p:sldLayout>
 </file>
 
 <file path=ppt/slideLayouts/slideLayout11.xml><?xml version="1.0" encoding="utf-8"?>
-<p:sldLayout xmlns:a="http://schemas.openxmlformats.org/drawingml/2006/main" xmlns:r="http://schemas.openxmlformats.org/officeDocument/2006/relationships" xmlns:p="http://schemas.openxmlformats.org/presentationml/2006/main" xmlns:m="http://schemas.openxmlformats.org/officeDocument/2006/math" xmlns:a14="http://schemas.microsoft.com/office/drawing/2010/main" type="tx" showMasterSp="1" showMasterPhAnim="1">
+<p:sldLayout xmlns:a="http://schemas.openxmlformats.org/drawingml/2006/main" xmlns:r="http://schemas.openxmlformats.org/officeDocument/2006/relationships" xmlns:p="http://schemas.openxmlformats.org/presentationml/2006/main" type="tx">
   <p:cSld name="Photo">
     <p:spTree>
       <p:nvGrpSpPr>
@@ -764,7 +781,9 @@
       <p:sp>
         <p:nvSpPr>
           <p:cNvPr id="102" name="Image"/>
-          <p:cNvSpPr/>
+          <p:cNvSpPr>
+            <a:spLocks noGrp="1"/>
+          </p:cNvSpPr>
           <p:nvPr>
             <p:ph type="pic" idx="13"/>
           </p:nvPr>
@@ -784,14 +803,16 @@
           </a:bodyPr>
           <a:lstStyle/>
           <a:p>
-            <a:pPr/>
+            <a:endParaRPr/>
           </a:p>
         </p:txBody>
       </p:sp>
       <p:sp>
         <p:nvSpPr>
           <p:cNvPr id="103" name="Slide Number"/>
-          <p:cNvSpPr txBox="1"/>
+          <p:cNvSpPr txBox="1">
+            <a:spLocks noGrp="1"/>
+          </p:cNvSpPr>
           <p:nvPr>
             <p:ph type="sldNum" sz="quarter" idx="2"/>
           </p:nvPr>
@@ -805,8 +826,10 @@
           <a:bodyPr/>
           <a:lstStyle/>
           <a:p>
-            <a:pPr/>
-            <a:fld id="{86CB4B4D-7CA3-9044-876B-883B54F8677D}" type="slidenum"/>
+            <a:fld id="{86CB4B4D-7CA3-9044-876B-883B54F8677D}" type="slidenum">
+              <a:t>‹#›</a:t>
+            </a:fld>
+            <a:endParaRPr/>
           </a:p>
         </p:txBody>
       </p:sp>
@@ -815,12 +838,12 @@
   <p:clrMapOvr>
     <a:masterClrMapping/>
   </p:clrMapOvr>
-  <p:transition xmlns:p14="http://schemas.microsoft.com/office/powerpoint/2010/main" spd="med" advClick="1"/>
+  <p:transition spd="med"/>
 </p:sldLayout>
 </file>
 
 <file path=ppt/slideLayouts/slideLayout12.xml><?xml version="1.0" encoding="utf-8"?>
-<p:sldLayout xmlns:a="http://schemas.openxmlformats.org/drawingml/2006/main" xmlns:r="http://schemas.openxmlformats.org/officeDocument/2006/relationships" xmlns:p="http://schemas.openxmlformats.org/presentationml/2006/main" xmlns:m="http://schemas.openxmlformats.org/officeDocument/2006/math" xmlns:a14="http://schemas.microsoft.com/office/drawing/2010/main" type="tx" showMasterSp="1" showMasterPhAnim="1">
+<p:sldLayout xmlns:a="http://schemas.openxmlformats.org/drawingml/2006/main" xmlns:r="http://schemas.openxmlformats.org/officeDocument/2006/relationships" xmlns:p="http://schemas.openxmlformats.org/presentationml/2006/main" type="tx">
   <p:cSld name="Vierge">
     <p:spTree>
       <p:nvGrpSpPr>
@@ -839,7 +862,9 @@
       <p:sp>
         <p:nvSpPr>
           <p:cNvPr id="110" name="Slide Number"/>
-          <p:cNvSpPr txBox="1"/>
+          <p:cNvSpPr txBox="1">
+            <a:spLocks noGrp="1"/>
+          </p:cNvSpPr>
           <p:nvPr>
             <p:ph type="sldNum" sz="quarter" idx="2"/>
           </p:nvPr>
@@ -853,8 +878,10 @@
           <a:bodyPr/>
           <a:lstStyle/>
           <a:p>
-            <a:pPr/>
-            <a:fld id="{86CB4B4D-7CA3-9044-876B-883B54F8677D}" type="slidenum"/>
+            <a:fld id="{86CB4B4D-7CA3-9044-876B-883B54F8677D}" type="slidenum">
+              <a:t>‹#›</a:t>
+            </a:fld>
+            <a:endParaRPr/>
           </a:p>
         </p:txBody>
       </p:sp>
@@ -863,12 +890,12 @@
   <p:clrMapOvr>
     <a:masterClrMapping/>
   </p:clrMapOvr>
-  <p:transition xmlns:p14="http://schemas.microsoft.com/office/powerpoint/2010/main" spd="med" advClick="1"/>
+  <p:transition spd="med"/>
 </p:sldLayout>
 </file>
 
 <file path=ppt/slideLayouts/slideLayout2.xml><?xml version="1.0" encoding="utf-8"?>
-<p:sldLayout xmlns:a="http://schemas.openxmlformats.org/drawingml/2006/main" xmlns:r="http://schemas.openxmlformats.org/officeDocument/2006/relationships" xmlns:p="http://schemas.openxmlformats.org/presentationml/2006/main" xmlns:m="http://schemas.openxmlformats.org/officeDocument/2006/math" xmlns:a14="http://schemas.microsoft.com/office/drawing/2010/main" type="tx" showMasterSp="1" showMasterPhAnim="1">
+<p:sldLayout xmlns:a="http://schemas.openxmlformats.org/drawingml/2006/main" xmlns:r="http://schemas.openxmlformats.org/officeDocument/2006/relationships" xmlns:p="http://schemas.openxmlformats.org/presentationml/2006/main" type="tx">
   <p:cSld name="Photo - Horizontale">
     <p:spTree>
       <p:nvGrpSpPr>
@@ -887,7 +914,9 @@
       <p:sp>
         <p:nvSpPr>
           <p:cNvPr id="20" name="Image"/>
-          <p:cNvSpPr/>
+          <p:cNvSpPr>
+            <a:spLocks noGrp="1"/>
+          </p:cNvSpPr>
           <p:nvPr>
             <p:ph type="pic" sz="half" idx="13"/>
           </p:nvPr>
@@ -907,14 +936,16 @@
           </a:bodyPr>
           <a:lstStyle/>
           <a:p>
-            <a:pPr/>
+            <a:endParaRPr/>
           </a:p>
         </p:txBody>
       </p:sp>
       <p:sp>
         <p:nvSpPr>
           <p:cNvPr id="21" name="Title Text"/>
-          <p:cNvSpPr txBox="1"/>
+          <p:cNvSpPr txBox="1">
+            <a:spLocks noGrp="1"/>
+          </p:cNvSpPr>
           <p:nvPr>
             <p:ph type="title"/>
           </p:nvPr>
@@ -932,7 +963,6 @@
           <a:bodyPr/>
           <a:lstStyle/>
           <a:p>
-            <a:pPr/>
             <a:r>
               <a:t>Title Text</a:t>
             </a:r>
@@ -942,7 +972,9 @@
       <p:sp>
         <p:nvSpPr>
           <p:cNvPr id="22" name="Body Level One…"/>
-          <p:cNvSpPr txBox="1"/>
+          <p:cNvSpPr txBox="1">
+            <a:spLocks noGrp="1"/>
+          </p:cNvSpPr>
           <p:nvPr>
             <p:ph type="body" sz="quarter" idx="1"/>
           </p:nvPr>
@@ -960,7 +992,6 @@
           <a:bodyPr/>
           <a:lstStyle/>
           <a:p>
-            <a:pPr/>
             <a:r>
               <a:t>Body Level One</a:t>
             </a:r>
@@ -994,7 +1025,9 @@
       <p:sp>
         <p:nvSpPr>
           <p:cNvPr id="23" name="Slide Number"/>
-          <p:cNvSpPr txBox="1"/>
+          <p:cNvSpPr txBox="1">
+            <a:spLocks noGrp="1"/>
+          </p:cNvSpPr>
           <p:nvPr>
             <p:ph type="sldNum" sz="quarter" idx="2"/>
           </p:nvPr>
@@ -1012,8 +1045,10 @@
           <a:bodyPr/>
           <a:lstStyle/>
           <a:p>
-            <a:pPr/>
-            <a:fld id="{86CB4B4D-7CA3-9044-876B-883B54F8677D}" type="slidenum"/>
+            <a:fld id="{86CB4B4D-7CA3-9044-876B-883B54F8677D}" type="slidenum">
+              <a:t>‹#›</a:t>
+            </a:fld>
+            <a:endParaRPr/>
           </a:p>
         </p:txBody>
       </p:sp>
@@ -1022,12 +1057,12 @@
   <p:clrMapOvr>
     <a:masterClrMapping/>
   </p:clrMapOvr>
-  <p:transition xmlns:p14="http://schemas.microsoft.com/office/powerpoint/2010/main" spd="med" advClick="1"/>
+  <p:transition spd="med"/>
 </p:sldLayout>
 </file>
 
 <file path=ppt/slideLayouts/slideLayout3.xml><?xml version="1.0" encoding="utf-8"?>
-<p:sldLayout xmlns:a="http://schemas.openxmlformats.org/drawingml/2006/main" xmlns:r="http://schemas.openxmlformats.org/officeDocument/2006/relationships" xmlns:p="http://schemas.openxmlformats.org/presentationml/2006/main" xmlns:m="http://schemas.openxmlformats.org/officeDocument/2006/math" xmlns:a14="http://schemas.microsoft.com/office/drawing/2010/main" type="tx" showMasterSp="1" showMasterPhAnim="1">
+<p:sldLayout xmlns:a="http://schemas.openxmlformats.org/drawingml/2006/main" xmlns:r="http://schemas.openxmlformats.org/officeDocument/2006/relationships" xmlns:p="http://schemas.openxmlformats.org/presentationml/2006/main" type="tx">
   <p:cSld name="Titre - Centré">
     <p:spTree>
       <p:nvGrpSpPr>
@@ -1046,7 +1081,9 @@
       <p:sp>
         <p:nvSpPr>
           <p:cNvPr id="30" name="Title Text"/>
-          <p:cNvSpPr txBox="1"/>
+          <p:cNvSpPr txBox="1">
+            <a:spLocks noGrp="1"/>
+          </p:cNvSpPr>
           <p:nvPr>
             <p:ph type="title"/>
           </p:nvPr>
@@ -1064,7 +1101,6 @@
           <a:bodyPr anchor="ctr"/>
           <a:lstStyle/>
           <a:p>
-            <a:pPr/>
             <a:r>
               <a:t>Title Text</a:t>
             </a:r>
@@ -1074,7 +1110,9 @@
       <p:sp>
         <p:nvSpPr>
           <p:cNvPr id="31" name="Slide Number"/>
-          <p:cNvSpPr txBox="1"/>
+          <p:cNvSpPr txBox="1">
+            <a:spLocks noGrp="1"/>
+          </p:cNvSpPr>
           <p:nvPr>
             <p:ph type="sldNum" sz="quarter" idx="2"/>
           </p:nvPr>
@@ -1088,8 +1126,10 @@
           <a:bodyPr/>
           <a:lstStyle/>
           <a:p>
-            <a:pPr/>
-            <a:fld id="{86CB4B4D-7CA3-9044-876B-883B54F8677D}" type="slidenum"/>
+            <a:fld id="{86CB4B4D-7CA3-9044-876B-883B54F8677D}" type="slidenum">
+              <a:t>‹#›</a:t>
+            </a:fld>
+            <a:endParaRPr/>
           </a:p>
         </p:txBody>
       </p:sp>
@@ -1098,12 +1138,12 @@
   <p:clrMapOvr>
     <a:masterClrMapping/>
   </p:clrMapOvr>
-  <p:transition xmlns:p14="http://schemas.microsoft.com/office/powerpoint/2010/main" spd="med" advClick="1"/>
+  <p:transition spd="med"/>
 </p:sldLayout>
 </file>
 
 <file path=ppt/slideLayouts/slideLayout4.xml><?xml version="1.0" encoding="utf-8"?>
-<p:sldLayout xmlns:a="http://schemas.openxmlformats.org/drawingml/2006/main" xmlns:r="http://schemas.openxmlformats.org/officeDocument/2006/relationships" xmlns:p="http://schemas.openxmlformats.org/presentationml/2006/main" xmlns:m="http://schemas.openxmlformats.org/officeDocument/2006/math" xmlns:a14="http://schemas.microsoft.com/office/drawing/2010/main" type="tx" showMasterSp="1" showMasterPhAnim="1">
+<p:sldLayout xmlns:a="http://schemas.openxmlformats.org/drawingml/2006/main" xmlns:r="http://schemas.openxmlformats.org/officeDocument/2006/relationships" xmlns:p="http://schemas.openxmlformats.org/presentationml/2006/main" type="tx">
   <p:cSld name="Photo - Verticale">
     <p:spTree>
       <p:nvGrpSpPr>
@@ -1122,7 +1162,9 @@
       <p:sp>
         <p:nvSpPr>
           <p:cNvPr id="38" name="Image"/>
-          <p:cNvSpPr/>
+          <p:cNvSpPr>
+            <a:spLocks noGrp="1"/>
+          </p:cNvSpPr>
           <p:nvPr>
             <p:ph type="pic" idx="13"/>
           </p:nvPr>
@@ -1142,14 +1184,16 @@
           </a:bodyPr>
           <a:lstStyle/>
           <a:p>
-            <a:pPr/>
+            <a:endParaRPr/>
           </a:p>
         </p:txBody>
       </p:sp>
       <p:sp>
         <p:nvSpPr>
           <p:cNvPr id="39" name="Title Text"/>
-          <p:cNvSpPr txBox="1"/>
+          <p:cNvSpPr txBox="1">
+            <a:spLocks noGrp="1"/>
+          </p:cNvSpPr>
           <p:nvPr>
             <p:ph type="title"/>
           </p:nvPr>
@@ -1171,7 +1215,6 @@
             </a:lvl1pPr>
           </a:lstStyle>
           <a:p>
-            <a:pPr/>
             <a:r>
               <a:t>Title Text</a:t>
             </a:r>
@@ -1181,7 +1224,9 @@
       <p:sp>
         <p:nvSpPr>
           <p:cNvPr id="40" name="Body Level One…"/>
-          <p:cNvSpPr txBox="1"/>
+          <p:cNvSpPr txBox="1">
+            <a:spLocks noGrp="1"/>
+          </p:cNvSpPr>
           <p:nvPr>
             <p:ph type="body" sz="quarter" idx="1"/>
           </p:nvPr>
@@ -1199,7 +1244,6 @@
           <a:bodyPr/>
           <a:lstStyle/>
           <a:p>
-            <a:pPr/>
             <a:r>
               <a:t>Body Level One</a:t>
             </a:r>
@@ -1233,7 +1277,9 @@
       <p:sp>
         <p:nvSpPr>
           <p:cNvPr id="41" name="Slide Number"/>
-          <p:cNvSpPr txBox="1"/>
+          <p:cNvSpPr txBox="1">
+            <a:spLocks noGrp="1"/>
+          </p:cNvSpPr>
           <p:nvPr>
             <p:ph type="sldNum" sz="quarter" idx="2"/>
           </p:nvPr>
@@ -1247,8 +1293,10 @@
           <a:bodyPr/>
           <a:lstStyle/>
           <a:p>
-            <a:pPr/>
-            <a:fld id="{86CB4B4D-7CA3-9044-876B-883B54F8677D}" type="slidenum"/>
+            <a:fld id="{86CB4B4D-7CA3-9044-876B-883B54F8677D}" type="slidenum">
+              <a:t>‹#›</a:t>
+            </a:fld>
+            <a:endParaRPr/>
           </a:p>
         </p:txBody>
       </p:sp>
@@ -1257,12 +1305,12 @@
   <p:clrMapOvr>
     <a:masterClrMapping/>
   </p:clrMapOvr>
-  <p:transition xmlns:p14="http://schemas.microsoft.com/office/powerpoint/2010/main" spd="med" advClick="1"/>
+  <p:transition spd="med"/>
 </p:sldLayout>
 </file>
 
 <file path=ppt/slideLayouts/slideLayout5.xml><?xml version="1.0" encoding="utf-8"?>
-<p:sldLayout xmlns:a="http://schemas.openxmlformats.org/drawingml/2006/main" xmlns:r="http://schemas.openxmlformats.org/officeDocument/2006/relationships" xmlns:p="http://schemas.openxmlformats.org/presentationml/2006/main" xmlns:m="http://schemas.openxmlformats.org/officeDocument/2006/math" xmlns:a14="http://schemas.microsoft.com/office/drawing/2010/main" type="tx" showMasterSp="1" showMasterPhAnim="1">
+<p:sldLayout xmlns:a="http://schemas.openxmlformats.org/drawingml/2006/main" xmlns:r="http://schemas.openxmlformats.org/officeDocument/2006/relationships" xmlns:p="http://schemas.openxmlformats.org/presentationml/2006/main" type="tx">
   <p:cSld name="Titre - Haut">
     <p:spTree>
       <p:nvGrpSpPr>
@@ -1281,7 +1329,9 @@
       <p:sp>
         <p:nvSpPr>
           <p:cNvPr id="48" name="Title Text"/>
-          <p:cNvSpPr txBox="1"/>
+          <p:cNvSpPr txBox="1">
+            <a:spLocks noGrp="1"/>
+          </p:cNvSpPr>
           <p:nvPr>
             <p:ph type="title"/>
           </p:nvPr>
@@ -1299,7 +1349,6 @@
           <a:bodyPr anchor="ctr"/>
           <a:lstStyle/>
           <a:p>
-            <a:pPr/>
             <a:r>
               <a:t>Title Text</a:t>
             </a:r>
@@ -1309,7 +1358,9 @@
       <p:sp>
         <p:nvSpPr>
           <p:cNvPr id="49" name="Slide Number"/>
-          <p:cNvSpPr txBox="1"/>
+          <p:cNvSpPr txBox="1">
+            <a:spLocks noGrp="1"/>
+          </p:cNvSpPr>
           <p:nvPr>
             <p:ph type="sldNum" sz="quarter" idx="2"/>
           </p:nvPr>
@@ -1323,8 +1374,10 @@
           <a:bodyPr/>
           <a:lstStyle/>
           <a:p>
-            <a:pPr/>
-            <a:fld id="{86CB4B4D-7CA3-9044-876B-883B54F8677D}" type="slidenum"/>
+            <a:fld id="{86CB4B4D-7CA3-9044-876B-883B54F8677D}" type="slidenum">
+              <a:t>‹#›</a:t>
+            </a:fld>
+            <a:endParaRPr/>
           </a:p>
         </p:txBody>
       </p:sp>
@@ -1333,12 +1386,12 @@
   <p:clrMapOvr>
     <a:masterClrMapping/>
   </p:clrMapOvr>
-  <p:transition xmlns:p14="http://schemas.microsoft.com/office/powerpoint/2010/main" spd="med" advClick="1"/>
+  <p:transition spd="med"/>
 </p:sldLayout>
 </file>
 
 <file path=ppt/slideLayouts/slideLayout6.xml><?xml version="1.0" encoding="utf-8"?>
-<p:sldLayout xmlns:a="http://schemas.openxmlformats.org/drawingml/2006/main" xmlns:r="http://schemas.openxmlformats.org/officeDocument/2006/relationships" xmlns:p="http://schemas.openxmlformats.org/presentationml/2006/main" xmlns:m="http://schemas.openxmlformats.org/officeDocument/2006/math" xmlns:a14="http://schemas.microsoft.com/office/drawing/2010/main" type="tx" showMasterSp="1" showMasterPhAnim="1">
+<p:sldLayout xmlns:a="http://schemas.openxmlformats.org/drawingml/2006/main" xmlns:r="http://schemas.openxmlformats.org/officeDocument/2006/relationships" xmlns:p="http://schemas.openxmlformats.org/presentationml/2006/main" type="tx">
   <p:cSld name="Titre et puces">
     <p:spTree>
       <p:nvGrpSpPr>
@@ -1357,7 +1410,9 @@
       <p:sp>
         <p:nvSpPr>
           <p:cNvPr id="56" name="Title Text"/>
-          <p:cNvSpPr txBox="1"/>
+          <p:cNvSpPr txBox="1">
+            <a:spLocks noGrp="1"/>
+          </p:cNvSpPr>
           <p:nvPr>
             <p:ph type="title"/>
           </p:nvPr>
@@ -1375,7 +1430,6 @@
           <a:bodyPr anchor="ctr"/>
           <a:lstStyle/>
           <a:p>
-            <a:pPr/>
             <a:r>
               <a:t>Title Text</a:t>
             </a:r>
@@ -1385,7 +1439,9 @@
       <p:sp>
         <p:nvSpPr>
           <p:cNvPr id="57" name="Body Level One…"/>
-          <p:cNvSpPr txBox="1"/>
+          <p:cNvSpPr txBox="1">
+            <a:spLocks noGrp="1"/>
+          </p:cNvSpPr>
           <p:nvPr>
             <p:ph type="body" sz="half" idx="1"/>
           </p:nvPr>
@@ -1444,7 +1500,6 @@
             </a:lvl5pPr>
           </a:lstStyle>
           <a:p>
-            <a:pPr/>
             <a:r>
               <a:t>Body Level One</a:t>
             </a:r>
@@ -1478,7 +1533,9 @@
       <p:sp>
         <p:nvSpPr>
           <p:cNvPr id="58" name="Slide Number"/>
-          <p:cNvSpPr txBox="1"/>
+          <p:cNvSpPr txBox="1">
+            <a:spLocks noGrp="1"/>
+          </p:cNvSpPr>
           <p:nvPr>
             <p:ph type="sldNum" sz="quarter" idx="2"/>
           </p:nvPr>
@@ -1492,8 +1549,10 @@
           <a:bodyPr/>
           <a:lstStyle/>
           <a:p>
-            <a:pPr/>
-            <a:fld id="{86CB4B4D-7CA3-9044-876B-883B54F8677D}" type="slidenum"/>
+            <a:fld id="{86CB4B4D-7CA3-9044-876B-883B54F8677D}" type="slidenum">
+              <a:t>‹#›</a:t>
+            </a:fld>
+            <a:endParaRPr/>
           </a:p>
         </p:txBody>
       </p:sp>
@@ -1502,12 +1561,12 @@
   <p:clrMapOvr>
     <a:masterClrMapping/>
   </p:clrMapOvr>
-  <p:transition xmlns:p14="http://schemas.microsoft.com/office/powerpoint/2010/main" spd="med" advClick="1"/>
+  <p:transition spd="med"/>
 </p:sldLayout>
 </file>
 
 <file path=ppt/slideLayouts/slideLayout7.xml><?xml version="1.0" encoding="utf-8"?>
-<p:sldLayout xmlns:a="http://schemas.openxmlformats.org/drawingml/2006/main" xmlns:r="http://schemas.openxmlformats.org/officeDocument/2006/relationships" xmlns:p="http://schemas.openxmlformats.org/presentationml/2006/main" xmlns:m="http://schemas.openxmlformats.org/officeDocument/2006/math" xmlns:a14="http://schemas.microsoft.com/office/drawing/2010/main" type="tx" showMasterSp="1" showMasterPhAnim="1">
+<p:sldLayout xmlns:a="http://schemas.openxmlformats.org/drawingml/2006/main" xmlns:r="http://schemas.openxmlformats.org/officeDocument/2006/relationships" xmlns:p="http://schemas.openxmlformats.org/presentationml/2006/main" type="tx">
   <p:cSld name="Titre, puces et photo">
     <p:spTree>
       <p:nvGrpSpPr>
@@ -1526,7 +1585,9 @@
       <p:sp>
         <p:nvSpPr>
           <p:cNvPr id="65" name="Image"/>
-          <p:cNvSpPr/>
+          <p:cNvSpPr>
+            <a:spLocks noGrp="1"/>
+          </p:cNvSpPr>
           <p:nvPr>
             <p:ph type="pic" sz="half" idx="13"/>
           </p:nvPr>
@@ -1546,14 +1607,16 @@
           </a:bodyPr>
           <a:lstStyle/>
           <a:p>
-            <a:pPr/>
+            <a:endParaRPr/>
           </a:p>
         </p:txBody>
       </p:sp>
       <p:sp>
         <p:nvSpPr>
           <p:cNvPr id="66" name="Title Text"/>
-          <p:cNvSpPr txBox="1"/>
+          <p:cNvSpPr txBox="1">
+            <a:spLocks noGrp="1"/>
+          </p:cNvSpPr>
           <p:nvPr>
             <p:ph type="title"/>
           </p:nvPr>
@@ -1571,7 +1634,6 @@
           <a:bodyPr anchor="ctr"/>
           <a:lstStyle/>
           <a:p>
-            <a:pPr/>
             <a:r>
               <a:t>Title Text</a:t>
             </a:r>
@@ -1581,7 +1643,9 @@
       <p:sp>
         <p:nvSpPr>
           <p:cNvPr id="67" name="Body Level One…"/>
-          <p:cNvSpPr txBox="1"/>
+          <p:cNvSpPr txBox="1">
+            <a:spLocks noGrp="1"/>
+          </p:cNvSpPr>
           <p:nvPr>
             <p:ph type="body" sz="quarter" idx="1"/>
           </p:nvPr>
@@ -1640,7 +1704,6 @@
             </a:lvl5pPr>
           </a:lstStyle>
           <a:p>
-            <a:pPr/>
             <a:r>
               <a:t>Body Level One</a:t>
             </a:r>
@@ -1674,7 +1737,9 @@
       <p:sp>
         <p:nvSpPr>
           <p:cNvPr id="68" name="Slide Number"/>
-          <p:cNvSpPr txBox="1"/>
+          <p:cNvSpPr txBox="1">
+            <a:spLocks noGrp="1"/>
+          </p:cNvSpPr>
           <p:nvPr>
             <p:ph type="sldNum" sz="quarter" idx="2"/>
           </p:nvPr>
@@ -1688,8 +1753,10 @@
           <a:bodyPr/>
           <a:lstStyle/>
           <a:p>
-            <a:pPr/>
-            <a:fld id="{86CB4B4D-7CA3-9044-876B-883B54F8677D}" type="slidenum"/>
+            <a:fld id="{86CB4B4D-7CA3-9044-876B-883B54F8677D}" type="slidenum">
+              <a:t>‹#›</a:t>
+            </a:fld>
+            <a:endParaRPr/>
           </a:p>
         </p:txBody>
       </p:sp>
@@ -1698,12 +1765,12 @@
   <p:clrMapOvr>
     <a:masterClrMapping/>
   </p:clrMapOvr>
-  <p:transition xmlns:p14="http://schemas.microsoft.com/office/powerpoint/2010/main" spd="med" advClick="1"/>
+  <p:transition spd="med"/>
 </p:sldLayout>
 </file>
 
 <file path=ppt/slideLayouts/slideLayout8.xml><?xml version="1.0" encoding="utf-8"?>
-<p:sldLayout xmlns:a="http://schemas.openxmlformats.org/drawingml/2006/main" xmlns:r="http://schemas.openxmlformats.org/officeDocument/2006/relationships" xmlns:p="http://schemas.openxmlformats.org/presentationml/2006/main" xmlns:m="http://schemas.openxmlformats.org/officeDocument/2006/math" xmlns:a14="http://schemas.microsoft.com/office/drawing/2010/main" type="tx" showMasterSp="1" showMasterPhAnim="1">
+<p:sldLayout xmlns:a="http://schemas.openxmlformats.org/drawingml/2006/main" xmlns:r="http://schemas.openxmlformats.org/officeDocument/2006/relationships" xmlns:p="http://schemas.openxmlformats.org/presentationml/2006/main" type="tx">
   <p:cSld name="Puces">
     <p:spTree>
       <p:nvGrpSpPr>
@@ -1722,7 +1789,9 @@
       <p:sp>
         <p:nvSpPr>
           <p:cNvPr id="75" name="Body Level One…"/>
-          <p:cNvSpPr txBox="1"/>
+          <p:cNvSpPr txBox="1">
+            <a:spLocks noGrp="1"/>
+          </p:cNvSpPr>
           <p:nvPr>
             <p:ph type="body" sz="half" idx="1"/>
           </p:nvPr>
@@ -1781,7 +1850,6 @@
             </a:lvl5pPr>
           </a:lstStyle>
           <a:p>
-            <a:pPr/>
             <a:r>
               <a:t>Body Level One</a:t>
             </a:r>
@@ -1815,7 +1883,9 @@
       <p:sp>
         <p:nvSpPr>
           <p:cNvPr id="76" name="Slide Number"/>
-          <p:cNvSpPr txBox="1"/>
+          <p:cNvSpPr txBox="1">
+            <a:spLocks noGrp="1"/>
+          </p:cNvSpPr>
           <p:nvPr>
             <p:ph type="sldNum" sz="quarter" idx="2"/>
           </p:nvPr>
@@ -1829,8 +1899,10 @@
           <a:bodyPr/>
           <a:lstStyle/>
           <a:p>
-            <a:pPr/>
-            <a:fld id="{86CB4B4D-7CA3-9044-876B-883B54F8677D}" type="slidenum"/>
+            <a:fld id="{86CB4B4D-7CA3-9044-876B-883B54F8677D}" type="slidenum">
+              <a:t>‹#›</a:t>
+            </a:fld>
+            <a:endParaRPr/>
           </a:p>
         </p:txBody>
       </p:sp>
@@ -1839,12 +1911,12 @@
   <p:clrMapOvr>
     <a:masterClrMapping/>
   </p:clrMapOvr>
-  <p:transition xmlns:p14="http://schemas.microsoft.com/office/powerpoint/2010/main" spd="med" advClick="1"/>
+  <p:transition spd="med"/>
 </p:sldLayout>
 </file>
 
 <file path=ppt/slideLayouts/slideLayout9.xml><?xml version="1.0" encoding="utf-8"?>
-<p:sldLayout xmlns:a="http://schemas.openxmlformats.org/drawingml/2006/main" xmlns:r="http://schemas.openxmlformats.org/officeDocument/2006/relationships" xmlns:p="http://schemas.openxmlformats.org/presentationml/2006/main" xmlns:m="http://schemas.openxmlformats.org/officeDocument/2006/math" xmlns:a14="http://schemas.microsoft.com/office/drawing/2010/main" type="tx" showMasterSp="1" showMasterPhAnim="1">
+<p:sldLayout xmlns:a="http://schemas.openxmlformats.org/drawingml/2006/main" xmlns:r="http://schemas.openxmlformats.org/officeDocument/2006/relationships" xmlns:p="http://schemas.openxmlformats.org/presentationml/2006/main" type="tx">
   <p:cSld name="Photo - 3">
     <p:spTree>
       <p:nvGrpSpPr>
@@ -1863,7 +1935,9 @@
       <p:sp>
         <p:nvSpPr>
           <p:cNvPr id="83" name="Image"/>
-          <p:cNvSpPr/>
+          <p:cNvSpPr>
+            <a:spLocks noGrp="1"/>
+          </p:cNvSpPr>
           <p:nvPr>
             <p:ph type="pic" sz="quarter" idx="13"/>
           </p:nvPr>
@@ -1883,14 +1957,16 @@
           </a:bodyPr>
           <a:lstStyle/>
           <a:p>
-            <a:pPr/>
+            <a:endParaRPr/>
           </a:p>
         </p:txBody>
       </p:sp>
       <p:sp>
         <p:nvSpPr>
           <p:cNvPr id="84" name="Image"/>
-          <p:cNvSpPr/>
+          <p:cNvSpPr>
+            <a:spLocks noGrp="1"/>
+          </p:cNvSpPr>
           <p:nvPr>
             <p:ph type="pic" sz="quarter" idx="14"/>
           </p:nvPr>
@@ -1910,14 +1986,16 @@
           </a:bodyPr>
           <a:lstStyle/>
           <a:p>
-            <a:pPr/>
+            <a:endParaRPr/>
           </a:p>
         </p:txBody>
       </p:sp>
       <p:sp>
         <p:nvSpPr>
           <p:cNvPr id="85" name="Image"/>
-          <p:cNvSpPr/>
+          <p:cNvSpPr>
+            <a:spLocks noGrp="1"/>
+          </p:cNvSpPr>
           <p:nvPr>
             <p:ph type="pic" idx="15"/>
           </p:nvPr>
@@ -1937,14 +2015,16 @@
           </a:bodyPr>
           <a:lstStyle/>
           <a:p>
-            <a:pPr/>
+            <a:endParaRPr/>
           </a:p>
         </p:txBody>
       </p:sp>
       <p:sp>
         <p:nvSpPr>
           <p:cNvPr id="86" name="Slide Number"/>
-          <p:cNvSpPr txBox="1"/>
+          <p:cNvSpPr txBox="1">
+            <a:spLocks noGrp="1"/>
+          </p:cNvSpPr>
           <p:nvPr>
             <p:ph type="sldNum" sz="quarter" idx="2"/>
           </p:nvPr>
@@ -1958,8 +2038,10 @@
           <a:bodyPr/>
           <a:lstStyle/>
           <a:p>
-            <a:pPr/>
-            <a:fld id="{86CB4B4D-7CA3-9044-876B-883B54F8677D}" type="slidenum"/>
+            <a:fld id="{86CB4B4D-7CA3-9044-876B-883B54F8677D}" type="slidenum">
+              <a:t>‹#›</a:t>
+            </a:fld>
+            <a:endParaRPr/>
           </a:p>
         </p:txBody>
       </p:sp>
@@ -1968,18 +2050,19 @@
   <p:clrMapOvr>
     <a:masterClrMapping/>
   </p:clrMapOvr>
-  <p:transition xmlns:p14="http://schemas.microsoft.com/office/powerpoint/2010/main" spd="med" advClick="1"/>
+  <p:transition spd="med"/>
 </p:sldLayout>
 </file>
 
 <file path=ppt/slideMasters/slideMaster1.xml><?xml version="1.0" encoding="utf-8"?>
-<p:sldMaster xmlns:a="http://schemas.openxmlformats.org/drawingml/2006/main" xmlns:r="http://schemas.openxmlformats.org/officeDocument/2006/relationships" xmlns:p="http://schemas.openxmlformats.org/presentationml/2006/main" xmlns:m="http://schemas.openxmlformats.org/officeDocument/2006/math" xmlns:a14="http://schemas.microsoft.com/office/drawing/2010/main">
+<p:sldMaster xmlns:a="http://schemas.openxmlformats.org/drawingml/2006/main" xmlns:r="http://schemas.openxmlformats.org/officeDocument/2006/relationships" xmlns:p="http://schemas.openxmlformats.org/presentationml/2006/main">
   <p:cSld>
     <p:bg>
       <p:bgPr>
         <a:solidFill>
           <a:srgbClr val="FFFFFF"/>
         </a:solidFill>
+        <a:effectLst/>
       </p:bgPr>
     </p:bg>
     <p:spTree>
@@ -1999,7 +2082,9 @@
       <p:sp>
         <p:nvSpPr>
           <p:cNvPr id="2" name="Title Text"/>
-          <p:cNvSpPr txBox="1"/>
+          <p:cNvSpPr txBox="1">
+            <a:spLocks noGrp="1"/>
+          </p:cNvSpPr>
           <p:nvPr>
             <p:ph type="title"/>
           </p:nvPr>
@@ -2017,17 +2102,16 @@
           </a:ln>
           <a:extLst>
             <a:ext uri="{C572A759-6A51-4108-AA02-DFA0A04FC94B}">
-              <ma14:wrappingTextBoxFlag xmlns:ma14="http://schemas.microsoft.com/office/mac/drawingml/2011/main" val="1"/>
+              <ma14:wrappingTextBoxFlag xmlns:ma14="http://schemas.microsoft.com/office/mac/drawingml/2011/main" xmlns:a14="http://schemas.microsoft.com/office/drawing/2010/main" xmlns:m="http://schemas.openxmlformats.org/officeDocument/2006/math" xmlns="" val="1"/>
             </a:ext>
           </a:extLst>
         </p:spPr>
         <p:txBody>
           <a:bodyPr lIns="38100" tIns="38100" rIns="38100" bIns="38100" anchor="b">
-            <a:normAutofit fontScale="100000" lnSpcReduction="0"/>
+            <a:normAutofit/>
           </a:bodyPr>
           <a:lstStyle/>
           <a:p>
-            <a:pPr/>
             <a:r>
               <a:t>Title Text</a:t>
             </a:r>
@@ -2037,7 +2121,9 @@
       <p:sp>
         <p:nvSpPr>
           <p:cNvPr id="3" name="Body Level One…"/>
-          <p:cNvSpPr txBox="1"/>
+          <p:cNvSpPr txBox="1">
+            <a:spLocks noGrp="1"/>
+          </p:cNvSpPr>
           <p:nvPr>
             <p:ph type="body" idx="1"/>
           </p:nvPr>
@@ -2055,17 +2141,16 @@
           </a:ln>
           <a:extLst>
             <a:ext uri="{C572A759-6A51-4108-AA02-DFA0A04FC94B}">
-              <ma14:wrappingTextBoxFlag xmlns:ma14="http://schemas.microsoft.com/office/mac/drawingml/2011/main" val="1"/>
+              <ma14:wrappingTextBoxFlag xmlns:ma14="http://schemas.microsoft.com/office/mac/drawingml/2011/main" xmlns:a14="http://schemas.microsoft.com/office/drawing/2010/main" xmlns:m="http://schemas.openxmlformats.org/officeDocument/2006/math" xmlns="" val="1"/>
             </a:ext>
           </a:extLst>
         </p:spPr>
         <p:txBody>
           <a:bodyPr lIns="38100" tIns="38100" rIns="38100" bIns="38100">
-            <a:normAutofit fontScale="100000" lnSpcReduction="0"/>
+            <a:normAutofit/>
           </a:bodyPr>
           <a:lstStyle/>
           <a:p>
-            <a:pPr/>
             <a:r>
               <a:t>Body Level One</a:t>
             </a:r>
@@ -2099,7 +2184,9 @@
       <p:sp>
         <p:nvSpPr>
           <p:cNvPr id="4" name="Slide Number"/>
-          <p:cNvSpPr txBox="1"/>
+          <p:cNvSpPr txBox="1">
+            <a:spLocks noGrp="1"/>
+          </p:cNvSpPr>
           <p:nvPr>
             <p:ph type="sldNum" sz="quarter" idx="2"/>
           </p:nvPr>
@@ -2134,8 +2221,10 @@
             </a:lvl1pPr>
           </a:lstStyle>
           <a:p>
-            <a:pPr/>
-            <a:fld id="{86CB4B4D-7CA3-9044-876B-883B54F8677D}" type="slidenum"/>
+            <a:fld id="{86CB4B4D-7CA3-9044-876B-883B54F8677D}" type="slidenum">
+              <a:t>‹#›</a:t>
+            </a:fld>
+            <a:endParaRPr/>
           </a:p>
         </p:txBody>
       </p:sp>
@@ -2143,20 +2232,20 @@
   </p:cSld>
   <p:clrMap bg1="lt1" tx1="dk1" bg2="lt2" tx2="dk2" accent1="accent1" accent2="accent2" accent3="accent3" accent4="accent4" accent5="accent5" accent6="accent6" hlink="hlink" folHlink="folHlink"/>
   <p:sldLayoutIdLst>
-    <p:sldLayoutId id="2147483649" r:id="rId2"/>
-    <p:sldLayoutId id="2147483650" r:id="rId3"/>
-    <p:sldLayoutId id="2147483651" r:id="rId4"/>
-    <p:sldLayoutId id="2147483652" r:id="rId5"/>
-    <p:sldLayoutId id="2147483653" r:id="rId6"/>
-    <p:sldLayoutId id="2147483654" r:id="rId7"/>
-    <p:sldLayoutId id="2147483655" r:id="rId8"/>
-    <p:sldLayoutId id="2147483656" r:id="rId9"/>
-    <p:sldLayoutId id="2147483657" r:id="rId10"/>
-    <p:sldLayoutId id="2147483658" r:id="rId11"/>
-    <p:sldLayoutId id="2147483659" r:id="rId12"/>
-    <p:sldLayoutId id="2147483660" r:id="rId13"/>
+    <p:sldLayoutId id="2147483649" r:id="rId1"/>
+    <p:sldLayoutId id="2147483650" r:id="rId2"/>
+    <p:sldLayoutId id="2147483651" r:id="rId3"/>
+    <p:sldLayoutId id="2147483652" r:id="rId4"/>
+    <p:sldLayoutId id="2147483653" r:id="rId5"/>
+    <p:sldLayoutId id="2147483654" r:id="rId6"/>
+    <p:sldLayoutId id="2147483655" r:id="rId7"/>
+    <p:sldLayoutId id="2147483656" r:id="rId8"/>
+    <p:sldLayoutId id="2147483657" r:id="rId9"/>
+    <p:sldLayoutId id="2147483658" r:id="rId10"/>
+    <p:sldLayoutId id="2147483659" r:id="rId11"/>
+    <p:sldLayoutId id="2147483660" r:id="rId12"/>
   </p:sldLayoutIdLst>
-  <p:transition xmlns:p14="http://schemas.microsoft.com/office/powerpoint/2010/main" spd="med" advClick="1"/>
+  <p:transition spd="med"/>
   <p:txStyles>
     <p:titleStyle>
       <a:lvl1pPr marL="0" marR="0" indent="0" algn="ctr" defTabSz="584200" rtl="0" latinLnBrk="0">
@@ -2174,7 +2263,7 @@
         <a:buFontTx/>
         <a:buNone/>
         <a:tabLst/>
-        <a:defRPr b="0" baseline="0" cap="none" i="0" spc="0" strike="noStrike" sz="7800" u="none">
+        <a:defRPr sz="7800" b="0" i="0" u="none" strike="noStrike" cap="none" spc="0" baseline="0">
           <a:solidFill>
             <a:srgbClr val="000000"/>
           </a:solidFill>
@@ -2200,7 +2289,7 @@
         <a:buFontTx/>
         <a:buNone/>
         <a:tabLst/>
-        <a:defRPr b="0" baseline="0" cap="none" i="0" spc="0" strike="noStrike" sz="7800" u="none">
+        <a:defRPr sz="7800" b="0" i="0" u="none" strike="noStrike" cap="none" spc="0" baseline="0">
           <a:solidFill>
             <a:srgbClr val="000000"/>
           </a:solidFill>
@@ -2226,7 +2315,7 @@
         <a:buFontTx/>
         <a:buNone/>
         <a:tabLst/>
-        <a:defRPr b="0" baseline="0" cap="none" i="0" spc="0" strike="noStrike" sz="7800" u="none">
+        <a:defRPr sz="7800" b="0" i="0" u="none" strike="noStrike" cap="none" spc="0" baseline="0">
           <a:solidFill>
             <a:srgbClr val="000000"/>
           </a:solidFill>
@@ -2252,7 +2341,7 @@
         <a:buFontTx/>
         <a:buNone/>
         <a:tabLst/>
-        <a:defRPr b="0" baseline="0" cap="none" i="0" spc="0" strike="noStrike" sz="7800" u="none">
+        <a:defRPr sz="7800" b="0" i="0" u="none" strike="noStrike" cap="none" spc="0" baseline="0">
           <a:solidFill>
             <a:srgbClr val="000000"/>
           </a:solidFill>
@@ -2278,7 +2367,7 @@
         <a:buFontTx/>
         <a:buNone/>
         <a:tabLst/>
-        <a:defRPr b="0" baseline="0" cap="none" i="0" spc="0" strike="noStrike" sz="7800" u="none">
+        <a:defRPr sz="7800" b="0" i="0" u="none" strike="noStrike" cap="none" spc="0" baseline="0">
           <a:solidFill>
             <a:srgbClr val="000000"/>
           </a:solidFill>
@@ -2304,7 +2393,7 @@
         <a:buFontTx/>
         <a:buNone/>
         <a:tabLst/>
-        <a:defRPr b="0" baseline="0" cap="none" i="0" spc="0" strike="noStrike" sz="7800" u="none">
+        <a:defRPr sz="7800" b="0" i="0" u="none" strike="noStrike" cap="none" spc="0" baseline="0">
           <a:solidFill>
             <a:srgbClr val="000000"/>
           </a:solidFill>
@@ -2330,7 +2419,7 @@
         <a:buFontTx/>
         <a:buNone/>
         <a:tabLst/>
-        <a:defRPr b="0" baseline="0" cap="none" i="0" spc="0" strike="noStrike" sz="7800" u="none">
+        <a:defRPr sz="7800" b="0" i="0" u="none" strike="noStrike" cap="none" spc="0" baseline="0">
           <a:solidFill>
             <a:srgbClr val="000000"/>
           </a:solidFill>
@@ -2356,7 +2445,7 @@
         <a:buFontTx/>
         <a:buNone/>
         <a:tabLst/>
-        <a:defRPr b="0" baseline="0" cap="none" i="0" spc="0" strike="noStrike" sz="7800" u="none">
+        <a:defRPr sz="7800" b="0" i="0" u="none" strike="noStrike" cap="none" spc="0" baseline="0">
           <a:solidFill>
             <a:srgbClr val="000000"/>
           </a:solidFill>
@@ -2382,7 +2471,7 @@
         <a:buFontTx/>
         <a:buNone/>
         <a:tabLst/>
-        <a:defRPr b="0" baseline="0" cap="none" i="0" spc="0" strike="noStrike" sz="7800" u="none">
+        <a:defRPr sz="7800" b="0" i="0" u="none" strike="noStrike" cap="none" spc="0" baseline="0">
           <a:solidFill>
             <a:srgbClr val="000000"/>
           </a:solidFill>
@@ -2410,7 +2499,7 @@
         <a:buFontTx/>
         <a:buNone/>
         <a:tabLst/>
-        <a:defRPr b="0" baseline="0" cap="none" i="0" spc="0" strike="noStrike" sz="3000" u="none">
+        <a:defRPr sz="3000" b="0" i="0" u="none" strike="noStrike" cap="none" spc="0" baseline="0">
           <a:solidFill>
             <a:srgbClr val="000000"/>
           </a:solidFill>
@@ -2436,7 +2525,7 @@
         <a:buFontTx/>
         <a:buNone/>
         <a:tabLst/>
-        <a:defRPr b="0" baseline="0" cap="none" i="0" spc="0" strike="noStrike" sz="3000" u="none">
+        <a:defRPr sz="3000" b="0" i="0" u="none" strike="noStrike" cap="none" spc="0" baseline="0">
           <a:solidFill>
             <a:srgbClr val="000000"/>
           </a:solidFill>
@@ -2462,7 +2551,7 @@
         <a:buFontTx/>
         <a:buNone/>
         <a:tabLst/>
-        <a:defRPr b="0" baseline="0" cap="none" i="0" spc="0" strike="noStrike" sz="3000" u="none">
+        <a:defRPr sz="3000" b="0" i="0" u="none" strike="noStrike" cap="none" spc="0" baseline="0">
           <a:solidFill>
             <a:srgbClr val="000000"/>
           </a:solidFill>
@@ -2488,7 +2577,7 @@
         <a:buFontTx/>
         <a:buNone/>
         <a:tabLst/>
-        <a:defRPr b="0" baseline="0" cap="none" i="0" spc="0" strike="noStrike" sz="3000" u="none">
+        <a:defRPr sz="3000" b="0" i="0" u="none" strike="noStrike" cap="none" spc="0" baseline="0">
           <a:solidFill>
             <a:srgbClr val="000000"/>
           </a:solidFill>
@@ -2514,7 +2603,7 @@
         <a:buFontTx/>
         <a:buNone/>
         <a:tabLst/>
-        <a:defRPr b="0" baseline="0" cap="none" i="0" spc="0" strike="noStrike" sz="3000" u="none">
+        <a:defRPr sz="3000" b="0" i="0" u="none" strike="noStrike" cap="none" spc="0" baseline="0">
           <a:solidFill>
             <a:srgbClr val="000000"/>
           </a:solidFill>
@@ -2540,7 +2629,7 @@
         <a:buFontTx/>
         <a:buNone/>
         <a:tabLst/>
-        <a:defRPr b="0" baseline="0" cap="none" i="0" spc="0" strike="noStrike" sz="3000" u="none">
+        <a:defRPr sz="3000" b="0" i="0" u="none" strike="noStrike" cap="none" spc="0" baseline="0">
           <a:solidFill>
             <a:srgbClr val="000000"/>
           </a:solidFill>
@@ -2566,7 +2655,7 @@
         <a:buFontTx/>
         <a:buNone/>
         <a:tabLst/>
-        <a:defRPr b="0" baseline="0" cap="none" i="0" spc="0" strike="noStrike" sz="3000" u="none">
+        <a:defRPr sz="3000" b="0" i="0" u="none" strike="noStrike" cap="none" spc="0" baseline="0">
           <a:solidFill>
             <a:srgbClr val="000000"/>
           </a:solidFill>
@@ -2592,7 +2681,7 @@
         <a:buFontTx/>
         <a:buNone/>
         <a:tabLst/>
-        <a:defRPr b="0" baseline="0" cap="none" i="0" spc="0" strike="noStrike" sz="3000" u="none">
+        <a:defRPr sz="3000" b="0" i="0" u="none" strike="noStrike" cap="none" spc="0" baseline="0">
           <a:solidFill>
             <a:srgbClr val="000000"/>
           </a:solidFill>
@@ -2618,7 +2707,7 @@
         <a:buFontTx/>
         <a:buNone/>
         <a:tabLst/>
-        <a:defRPr b="0" baseline="0" cap="none" i="0" spc="0" strike="noStrike" sz="3000" u="none">
+        <a:defRPr sz="3000" b="0" i="0" u="none" strike="noStrike" cap="none" spc="0" baseline="0">
           <a:solidFill>
             <a:srgbClr val="000000"/>
           </a:solidFill>
@@ -2646,7 +2735,7 @@
         <a:buFontTx/>
         <a:buNone/>
         <a:tabLst/>
-        <a:defRPr b="0" baseline="0" cap="none" i="0" spc="0" strike="noStrike" sz="1600" u="none">
+        <a:defRPr sz="1600" b="0" i="0" u="none" strike="noStrike" cap="none" spc="0" baseline="0">
           <a:solidFill>
             <a:schemeClr val="tx1"/>
           </a:solidFill>
@@ -2672,7 +2761,7 @@
         <a:buFontTx/>
         <a:buNone/>
         <a:tabLst/>
-        <a:defRPr b="0" baseline="0" cap="none" i="0" spc="0" strike="noStrike" sz="1600" u="none">
+        <a:defRPr sz="1600" b="0" i="0" u="none" strike="noStrike" cap="none" spc="0" baseline="0">
           <a:solidFill>
             <a:schemeClr val="tx1"/>
           </a:solidFill>
@@ -2698,7 +2787,7 @@
         <a:buFontTx/>
         <a:buNone/>
         <a:tabLst/>
-        <a:defRPr b="0" baseline="0" cap="none" i="0" spc="0" strike="noStrike" sz="1600" u="none">
+        <a:defRPr sz="1600" b="0" i="0" u="none" strike="noStrike" cap="none" spc="0" baseline="0">
           <a:solidFill>
             <a:schemeClr val="tx1"/>
           </a:solidFill>
@@ -2724,7 +2813,7 @@
         <a:buFontTx/>
         <a:buNone/>
         <a:tabLst/>
-        <a:defRPr b="0" baseline="0" cap="none" i="0" spc="0" strike="noStrike" sz="1600" u="none">
+        <a:defRPr sz="1600" b="0" i="0" u="none" strike="noStrike" cap="none" spc="0" baseline="0">
           <a:solidFill>
             <a:schemeClr val="tx1"/>
           </a:solidFill>
@@ -2750,7 +2839,7 @@
         <a:buFontTx/>
         <a:buNone/>
         <a:tabLst/>
-        <a:defRPr b="0" baseline="0" cap="none" i="0" spc="0" strike="noStrike" sz="1600" u="none">
+        <a:defRPr sz="1600" b="0" i="0" u="none" strike="noStrike" cap="none" spc="0" baseline="0">
           <a:solidFill>
             <a:schemeClr val="tx1"/>
           </a:solidFill>
@@ -2776,7 +2865,7 @@
         <a:buFontTx/>
         <a:buNone/>
         <a:tabLst/>
-        <a:defRPr b="0" baseline="0" cap="none" i="0" spc="0" strike="noStrike" sz="1600" u="none">
+        <a:defRPr sz="1600" b="0" i="0" u="none" strike="noStrike" cap="none" spc="0" baseline="0">
           <a:solidFill>
             <a:schemeClr val="tx1"/>
           </a:solidFill>
@@ -2802,7 +2891,7 @@
         <a:buFontTx/>
         <a:buNone/>
         <a:tabLst/>
-        <a:defRPr b="0" baseline="0" cap="none" i="0" spc="0" strike="noStrike" sz="1600" u="none">
+        <a:defRPr sz="1600" b="0" i="0" u="none" strike="noStrike" cap="none" spc="0" baseline="0">
           <a:solidFill>
             <a:schemeClr val="tx1"/>
           </a:solidFill>
@@ -2828,7 +2917,7 @@
         <a:buFontTx/>
         <a:buNone/>
         <a:tabLst/>
-        <a:defRPr b="0" baseline="0" cap="none" i="0" spc="0" strike="noStrike" sz="1600" u="none">
+        <a:defRPr sz="1600" b="0" i="0" u="none" strike="noStrike" cap="none" spc="0" baseline="0">
           <a:solidFill>
             <a:schemeClr val="tx1"/>
           </a:solidFill>
@@ -2854,7 +2943,7 @@
         <a:buFontTx/>
         <a:buNone/>
         <a:tabLst/>
-        <a:defRPr b="0" baseline="0" cap="none" i="0" spc="0" strike="noStrike" sz="1600" u="none">
+        <a:defRPr sz="1600" b="0" i="0" u="none" strike="noStrike" cap="none" spc="0" baseline="0">
           <a:solidFill>
             <a:schemeClr val="tx1"/>
           </a:solidFill>
@@ -2871,7 +2960,7 @@
 </file>
 
 <file path=ppt/slides/slide1.xml><?xml version="1.0" encoding="utf-8"?>
-<p:sld xmlns:a="http://schemas.openxmlformats.org/drawingml/2006/main" xmlns:r="http://schemas.openxmlformats.org/officeDocument/2006/relationships" xmlns:p="http://schemas.openxmlformats.org/presentationml/2006/main" xmlns:m="http://schemas.openxmlformats.org/officeDocument/2006/math" xmlns:a14="http://schemas.microsoft.com/office/drawing/2010/main" showMasterSp="1" showMasterPhAnim="1">
+<p:sld xmlns:a="http://schemas.openxmlformats.org/drawingml/2006/main" xmlns:r="http://schemas.openxmlformats.org/officeDocument/2006/relationships" xmlns:p="http://schemas.openxmlformats.org/presentationml/2006/main">
   <p:cSld>
     <p:spTree>
       <p:nvGrpSpPr>
@@ -2906,7 +2995,7 @@
           </a:ln>
           <a:extLst>
             <a:ext uri="{C572A759-6A51-4108-AA02-DFA0A04FC94B}">
-              <ma14:wrappingTextBoxFlag xmlns:ma14="http://schemas.microsoft.com/office/mac/drawingml/2011/main" val="1"/>
+              <ma14:wrappingTextBoxFlag xmlns:ma14="http://schemas.microsoft.com/office/mac/drawingml/2011/main" xmlns:a14="http://schemas.microsoft.com/office/drawing/2010/main" xmlns:m="http://schemas.openxmlformats.org/officeDocument/2006/math" xmlns="" val="1"/>
             </a:ext>
           </a:extLst>
         </p:spPr>
@@ -2917,7 +3006,7 @@
           <a:lstStyle/>
           <a:p>
             <a:pPr>
-              <a:defRPr b="1" sz="8700">
+              <a:defRPr sz="8700" b="1">
                 <a:solidFill>
                   <a:srgbClr val="000000"/>
                 </a:solidFill>
@@ -2933,7 +3022,7 @@
           </a:p>
           <a:p>
             <a:pPr>
-              <a:defRPr b="1" sz="8700">
+              <a:defRPr sz="8700" b="1">
                 <a:solidFill>
                   <a:srgbClr val="000000"/>
                 </a:solidFill>
@@ -2949,7 +3038,7 @@
           </a:p>
           <a:p>
             <a:pPr>
-              <a:defRPr b="1" sz="8700">
+              <a:defRPr sz="8700" b="1">
                 <a:solidFill>
                   <a:srgbClr val="000000"/>
                 </a:solidFill>
@@ -2965,7 +3054,7 @@
           </a:p>
           <a:p>
             <a:pPr>
-              <a:defRPr b="1" sz="7900">
+              <a:defRPr sz="7900" b="1">
                 <a:solidFill>
                   <a:srgbClr val="FFFFFF"/>
                 </a:solidFill>
@@ -2975,10 +3064,11 @@
                 <a:sym typeface="Circular Std"/>
               </a:defRPr>
             </a:pPr>
+            <a:endParaRPr/>
           </a:p>
           <a:p>
             <a:pPr>
-              <a:defRPr b="1" sz="6200">
+              <a:defRPr sz="6200" b="1">
                 <a:solidFill>
                   <a:srgbClr val="000000"/>
                 </a:solidFill>
@@ -3003,9 +3093,7 @@
           <p:nvPr/>
         </p:nvPicPr>
         <p:blipFill>
-          <a:blip r:embed="rId2">
-            <a:extLst/>
-          </a:blip>
+          <a:blip r:embed="rId2"/>
           <a:stretch>
             <a:fillRect/>
           </a:stretch>
@@ -3032,9 +3120,7 @@
           <p:nvPr/>
         </p:nvPicPr>
         <p:blipFill>
-          <a:blip r:embed="rId3">
-            <a:extLst/>
-          </a:blip>
+          <a:blip r:embed="rId3"/>
           <a:stretch>
             <a:fillRect/>
           </a:stretch>
@@ -3057,12 +3143,12 @@
   <p:clrMapOvr>
     <a:masterClrMapping/>
   </p:clrMapOvr>
-  <p:transition xmlns:p14="http://schemas.microsoft.com/office/powerpoint/2010/main" spd="med" advClick="1"/>
+  <p:transition spd="med"/>
 </p:sld>
 </file>
 
 <file path=ppt/slides/slide10.xml><?xml version="1.0" encoding="utf-8"?>
-<p:sld xmlns:a="http://schemas.openxmlformats.org/drawingml/2006/main" xmlns:r="http://schemas.openxmlformats.org/officeDocument/2006/relationships" xmlns:p="http://schemas.openxmlformats.org/presentationml/2006/main" xmlns:m="http://schemas.openxmlformats.org/officeDocument/2006/math" xmlns:a14="http://schemas.microsoft.com/office/drawing/2010/main" showMasterSp="1" showMasterPhAnim="1">
+<p:sld xmlns:a="http://schemas.openxmlformats.org/drawingml/2006/main" xmlns:r="http://schemas.openxmlformats.org/officeDocument/2006/relationships" xmlns:p="http://schemas.openxmlformats.org/presentationml/2006/main">
   <p:cSld>
     <p:spTree>
       <p:nvGrpSpPr>
@@ -3080,7 +3166,7 @@
       </p:grpSpPr>
       <p:sp>
         <p:nvSpPr>
-          <p:cNvPr id="147" name="Iterators"/>
+          <p:cNvPr id="141" name="Iterators"/>
           <p:cNvSpPr txBox="1"/>
           <p:nvPr/>
         </p:nvSpPr>
@@ -3097,7 +3183,7 @@
           </a:ln>
           <a:extLst>
             <a:ext uri="{C572A759-6A51-4108-AA02-DFA0A04FC94B}">
-              <ma14:wrappingTextBoxFlag xmlns:ma14="http://schemas.microsoft.com/office/mac/drawingml/2011/main" val="1"/>
+              <ma14:wrappingTextBoxFlag xmlns:ma14="http://schemas.microsoft.com/office/mac/drawingml/2011/main" xmlns:a14="http://schemas.microsoft.com/office/drawing/2010/main" xmlns:m="http://schemas.openxmlformats.org/officeDocument/2006/math" xmlns="" val="1"/>
             </a:ext>
           </a:extLst>
         </p:spPr>
@@ -3139,14 +3225,14 @@
       </p:sp>
       <p:sp>
         <p:nvSpPr>
-          <p:cNvPr id="148" name="1. Loop (cont.)…"/>
+          <p:cNvPr id="142" name="Another way to loop in Ruby!…"/>
           <p:cNvSpPr txBox="1"/>
           <p:nvPr/>
         </p:nvSpPr>
         <p:spPr>
           <a:xfrm>
-            <a:off x="555246" y="2520480"/>
-            <a:ext cx="12332894" cy="6920955"/>
+            <a:off x="335953" y="3244849"/>
+            <a:ext cx="12332894" cy="4711701"/>
           </a:xfrm>
           <a:prstGeom prst="rect">
             <a:avLst/>
@@ -3156,7 +3242,7 @@
           </a:ln>
           <a:extLst>
             <a:ext uri="{C572A759-6A51-4108-AA02-DFA0A04FC94B}">
-              <ma14:wrappingTextBoxFlag xmlns:ma14="http://schemas.microsoft.com/office/mac/drawingml/2011/main" val="1"/>
+              <ma14:wrappingTextBoxFlag xmlns:ma14="http://schemas.microsoft.com/office/mac/drawingml/2011/main" xmlns:a14="http://schemas.microsoft.com/office/drawing/2010/main" xmlns:m="http://schemas.openxmlformats.org/officeDocument/2006/math" xmlns="" val="1"/>
             </a:ext>
           </a:extLst>
         </p:spPr>
@@ -3165,22 +3251,6 @@
             <a:spAutoFit/>
           </a:bodyPr>
           <a:lstStyle/>
-          <a:p>
-            <a:pPr algn="l" defTabSz="457200">
-              <a:defRPr b="1" sz="3500">
-                <a:solidFill>
-                  <a:srgbClr val="FA1116"/>
-                </a:solidFill>
-                <a:latin typeface="Helvetica"/>
-                <a:ea typeface="Helvetica"/>
-                <a:cs typeface="Helvetica"/>
-                <a:sym typeface="Helvetica"/>
-              </a:defRPr>
-            </a:pPr>
-            <a:r>
-              <a:t>1. Loop (cont.)</a:t>
-            </a:r>
-          </a:p>
           <a:p>
             <a:pPr algn="l" defTabSz="457200">
               <a:spcBef>
@@ -3193,15 +3263,10 @@
                 <a:sym typeface="Helvetica"/>
               </a:defRPr>
             </a:pPr>
-            <a:endParaRPr b="1">
-              <a:solidFill>
-                <a:schemeClr val="accent5">
-                  <a:hueOff val="-444211"/>
-                  <a:satOff val="-14915"/>
-                  <a:lumOff val="22857"/>
-                </a:schemeClr>
-              </a:solidFill>
-            </a:endParaRPr>
+            <a:r>
+              <a:rPr dirty="0"/>
+              <a:t>Another way to loop in Ruby!</a:t>
+            </a:r>
           </a:p>
           <a:p>
             <a:pPr algn="l" defTabSz="457200">
@@ -3215,16 +3280,7 @@
                 <a:sym typeface="Helvetica"/>
               </a:defRPr>
             </a:pPr>
-            <a:r>
-              <a:t>when using the loop iterator, we need to use “</a:t>
-            </a:r>
-            <a:r>
-              <a:rPr b="1"/>
-              <a:t>break"</a:t>
-            </a:r>
-            <a:r>
-              <a:t> to break the loop as soon as a certain condition is met</a:t>
-            </a:r>
+            <a:endParaRPr dirty="0"/>
           </a:p>
           <a:p>
             <a:pPr algn="l" defTabSz="457200">
@@ -3238,79 +3294,31 @@
                 <a:sym typeface="Helvetica"/>
               </a:defRPr>
             </a:pPr>
-          </a:p>
-          <a:p>
-            <a:pPr algn="l" defTabSz="457200">
-              <a:tabLst>
-                <a:tab pos="571500" algn="l"/>
-                <a:tab pos="1155700" algn="l"/>
-                <a:tab pos="1739900" algn="l"/>
-                <a:tab pos="2324100" algn="l"/>
-                <a:tab pos="2908300" algn="l"/>
-                <a:tab pos="3479800" algn="l"/>
-                <a:tab pos="4064000" algn="l"/>
-                <a:tab pos="4648200" algn="l"/>
-                <a:tab pos="5232400" algn="l"/>
-                <a:tab pos="5816600" algn="l"/>
-                <a:tab pos="6388100" algn="l"/>
-                <a:tab pos="6972300" algn="l"/>
-                <a:tab pos="7556500" algn="l"/>
-                <a:tab pos="8140700" algn="l"/>
-                <a:tab pos="8724900" algn="l"/>
-                <a:tab pos="9296400" algn="l"/>
-              </a:tabLst>
-              <a:defRPr sz="3500">
-                <a:solidFill>
-                  <a:schemeClr val="accent1">
-                    <a:hueOff val="47394"/>
-                    <a:satOff val="-25753"/>
-                    <a:lumOff val="-7544"/>
-                  </a:schemeClr>
-                </a:solidFill>
-                <a:latin typeface="Consolas"/>
-                <a:ea typeface="Consolas"/>
-                <a:cs typeface="Consolas"/>
-                <a:sym typeface="Consolas"/>
-              </a:defRPr>
-            </a:pPr>
-            <a:r>
-              <a:t>number = 0</a:t>
-            </a:r>
-          </a:p>
-          <a:p>
-            <a:pPr algn="l" defTabSz="457200">
-              <a:tabLst>
-                <a:tab pos="571500" algn="l"/>
-                <a:tab pos="1155700" algn="l"/>
-                <a:tab pos="1739900" algn="l"/>
-                <a:tab pos="2324100" algn="l"/>
-                <a:tab pos="2908300" algn="l"/>
-                <a:tab pos="3479800" algn="l"/>
-                <a:tab pos="4064000" algn="l"/>
-                <a:tab pos="4648200" algn="l"/>
-                <a:tab pos="5232400" algn="l"/>
-                <a:tab pos="5816600" algn="l"/>
-                <a:tab pos="6388100" algn="l"/>
-                <a:tab pos="6972300" algn="l"/>
-                <a:tab pos="7556500" algn="l"/>
-                <a:tab pos="8140700" algn="l"/>
-                <a:tab pos="8724900" algn="l"/>
-                <a:tab pos="9296400" algn="l"/>
-              </a:tabLst>
-              <a:defRPr sz="3500">
-                <a:solidFill>
-                  <a:schemeClr val="accent1">
-                    <a:hueOff val="47394"/>
-                    <a:satOff val="-25753"/>
-                    <a:lumOff val="-7544"/>
-                  </a:schemeClr>
-                </a:solidFill>
-                <a:latin typeface="Consolas"/>
-                <a:ea typeface="Consolas"/>
-                <a:cs typeface="Consolas"/>
-                <a:sym typeface="Consolas"/>
-              </a:defRPr>
-            </a:pPr>
+            <a:r>
+              <a:rPr dirty="0"/>
+              <a:t>An </a:t>
+            </a:r>
+            <a:r>
+              <a:rPr b="1" dirty="0">
+                <a:solidFill>
+                  <a:srgbClr val="FA1116"/>
+                </a:solidFill>
+              </a:rPr>
+              <a:t>iterator</a:t>
+            </a:r>
+            <a:r>
+              <a:rPr i="1" dirty="0"/>
+              <a:t> </a:t>
+            </a:r>
+            <a:r>
+              <a:rPr dirty="0"/>
+              <a:t>is a Ruby method that repeatedly invokes a `block` of code</a:t>
+            </a:r>
+            <a:r>
+              <a:rPr lang="en-CA" dirty="0"/>
+              <a:t> (but not infinitely like loops do)</a:t>
+            </a:r>
+            <a:endParaRPr dirty="0"/>
           </a:p>
           <a:p>
             <a:pPr algn="l" defTabSz="457200">
@@ -3318,22 +3326,13 @@
                 <a:spcPts val="500"/>
               </a:spcBef>
               <a:defRPr sz="3500">
-                <a:solidFill>
-                  <a:schemeClr val="accent1">
-                    <a:hueOff val="47394"/>
-                    <a:satOff val="-25753"/>
-                    <a:lumOff val="-7544"/>
-                  </a:schemeClr>
-                </a:solidFill>
-                <a:latin typeface="Consolas"/>
-                <a:ea typeface="Consolas"/>
-                <a:cs typeface="Consolas"/>
-                <a:sym typeface="Consolas"/>
-              </a:defRPr>
-            </a:pPr>
-            <a:r>
-              <a:t>loop do</a:t>
-            </a:r>
+                <a:latin typeface="Helvetica"/>
+                <a:ea typeface="Helvetica"/>
+                <a:cs typeface="Helvetica"/>
+                <a:sym typeface="Helvetica"/>
+              </a:defRPr>
+            </a:pPr>
+            <a:endParaRPr dirty="0"/>
           </a:p>
           <a:p>
             <a:pPr algn="l" defTabSz="457200">
@@ -3341,21 +3340,15 @@
                 <a:spcPts val="500"/>
               </a:spcBef>
               <a:defRPr sz="3500">
-                <a:solidFill>
-                  <a:schemeClr val="accent1">
-                    <a:hueOff val="47394"/>
-                    <a:satOff val="-25753"/>
-                    <a:lumOff val="-7544"/>
-                  </a:schemeClr>
-                </a:solidFill>
-                <a:latin typeface="Consolas"/>
-                <a:ea typeface="Consolas"/>
-                <a:cs typeface="Consolas"/>
-                <a:sym typeface="Consolas"/>
-              </a:defRPr>
-            </a:pPr>
-            <a:r>
-              <a:t>     number += 1</a:t>
+                <a:latin typeface="Helvetica"/>
+                <a:ea typeface="Helvetica"/>
+                <a:cs typeface="Helvetica"/>
+                <a:sym typeface="Helvetica"/>
+              </a:defRPr>
+            </a:pPr>
+            <a:r>
+              <a:rPr dirty="0"/>
+              <a:t>That `block` of code is the bit that contains the instructions to be repeated</a:t>
             </a:r>
           </a:p>
           <a:p>
@@ -3364,52 +3357,6 @@
                 <a:spcPts val="500"/>
               </a:spcBef>
               <a:defRPr sz="3500">
-                <a:solidFill>
-                  <a:schemeClr val="accent1">
-                    <a:hueOff val="47394"/>
-                    <a:satOff val="-25753"/>
-                    <a:lumOff val="-7544"/>
-                  </a:schemeClr>
-                </a:solidFill>
-                <a:latin typeface="Consolas"/>
-                <a:ea typeface="Consolas"/>
-                <a:cs typeface="Consolas"/>
-                <a:sym typeface="Consolas"/>
-              </a:defRPr>
-            </a:pPr>
-            <a:r>
-              <a:t>     print number</a:t>
-            </a:r>
-          </a:p>
-          <a:p>
-            <a:pPr algn="l" defTabSz="457200">
-              <a:spcBef>
-                <a:spcPts val="500"/>
-              </a:spcBef>
-              <a:defRPr sz="3500">
-                <a:solidFill>
-                  <a:schemeClr val="accent1">
-                    <a:hueOff val="47394"/>
-                    <a:satOff val="-25753"/>
-                    <a:lumOff val="-7544"/>
-                  </a:schemeClr>
-                </a:solidFill>
-                <a:latin typeface="Consolas"/>
-                <a:ea typeface="Consolas"/>
-                <a:cs typeface="Consolas"/>
-                <a:sym typeface="Consolas"/>
-              </a:defRPr>
-            </a:pPr>
-            <a:r>
-              <a:t>     break if number &gt; 5</a:t>
-            </a:r>
-          </a:p>
-          <a:p>
-            <a:pPr algn="l" defTabSz="457200">
-              <a:defRPr sz="3500">
-                <a:solidFill>
-                  <a:srgbClr val="C0C0C0"/>
-                </a:solidFill>
                 <a:latin typeface="Helvetica"/>
                 <a:ea typeface="Helvetica"/>
                 <a:cs typeface="Helvetica"/>
@@ -3417,31 +3364,17 @@
               </a:defRPr>
             </a:pPr>
             <a:r>
-              <a:rPr>
-                <a:solidFill>
-                  <a:schemeClr val="accent1">
-                    <a:hueOff val="47394"/>
-                    <a:satOff val="-25753"/>
-                    <a:lumOff val="-7544"/>
-                  </a:schemeClr>
-                </a:solidFill>
-                <a:latin typeface="Consolas"/>
-                <a:ea typeface="Consolas"/>
-                <a:cs typeface="Consolas"/>
-                <a:sym typeface="Consolas"/>
+              <a:rPr dirty="0"/>
+              <a:t>(and those instructions may be anything you want!) </a:t>
+            </a:r>
+            <a:r>
+              <a:rPr dirty="0">
+                <a:latin typeface="Apple Color Emoji"/>
+                <a:ea typeface="Apple Color Emoji"/>
+                <a:cs typeface="Apple Color Emoji"/>
+                <a:sym typeface="Apple Color Emoji"/>
               </a:rPr>
-              <a:t>end</a:t>
-            </a:r>
-            <a:r>
-              <a:t>    </a:t>
-            </a:r>
-            <a:r>
-              <a:rPr>
-                <a:solidFill>
-                  <a:srgbClr val="363636"/>
-                </a:solidFill>
-              </a:rPr>
-              <a:t>(the loop stops after printing the numbers from 1 to 6)</a:t>
+              <a:t>🙌🏻</a:t>
             </a:r>
           </a:p>
         </p:txBody>
@@ -3451,12 +3384,12 @@
   <p:clrMapOvr>
     <a:masterClrMapping/>
   </p:clrMapOvr>
-  <p:transition xmlns:p14="http://schemas.microsoft.com/office/powerpoint/2010/main" spd="med" advClick="1"/>
+  <p:transition spd="med"/>
 </p:sld>
 </file>
 
 <file path=ppt/slides/slide11.xml><?xml version="1.0" encoding="utf-8"?>
-<p:sld xmlns:a="http://schemas.openxmlformats.org/drawingml/2006/main" xmlns:r="http://schemas.openxmlformats.org/officeDocument/2006/relationships" xmlns:p="http://schemas.openxmlformats.org/presentationml/2006/main" xmlns:m="http://schemas.openxmlformats.org/officeDocument/2006/math" xmlns:a14="http://schemas.microsoft.com/office/drawing/2010/main" showMasterSp="1" showMasterPhAnim="1">
+<p:sld xmlns:a="http://schemas.openxmlformats.org/drawingml/2006/main" xmlns:r="http://schemas.openxmlformats.org/officeDocument/2006/relationships" xmlns:p="http://schemas.openxmlformats.org/presentationml/2006/main">
   <p:cSld>
     <p:spTree>
       <p:nvGrpSpPr>
@@ -3491,7 +3424,7 @@
           </a:ln>
           <a:extLst>
             <a:ext uri="{C572A759-6A51-4108-AA02-DFA0A04FC94B}">
-              <ma14:wrappingTextBoxFlag xmlns:ma14="http://schemas.microsoft.com/office/mac/drawingml/2011/main" val="1"/>
+              <ma14:wrappingTextBoxFlag xmlns:ma14="http://schemas.microsoft.com/office/mac/drawingml/2011/main" xmlns:a14="http://schemas.microsoft.com/office/drawing/2010/main" xmlns:m="http://schemas.openxmlformats.org/officeDocument/2006/math" xmlns="" val="1"/>
             </a:ext>
           </a:extLst>
         </p:spPr>
@@ -3550,7 +3483,7 @@
           </a:ln>
           <a:extLst>
             <a:ext uri="{C572A759-6A51-4108-AA02-DFA0A04FC94B}">
-              <ma14:wrappingTextBoxFlag xmlns:ma14="http://schemas.microsoft.com/office/mac/drawingml/2011/main" val="1"/>
+              <ma14:wrappingTextBoxFlag xmlns:ma14="http://schemas.microsoft.com/office/mac/drawingml/2011/main" xmlns:a14="http://schemas.microsoft.com/office/drawing/2010/main" xmlns:m="http://schemas.openxmlformats.org/officeDocument/2006/math" xmlns="" val="1"/>
             </a:ext>
           </a:extLst>
         </p:spPr>
@@ -3561,7 +3494,7 @@
           <a:lstStyle/>
           <a:p>
             <a:pPr algn="l" defTabSz="457200">
-              <a:defRPr b="1" sz="3500">
+              <a:defRPr sz="3500" b="1">
                 <a:solidFill>
                   <a:srgbClr val="FA1116"/>
                 </a:solidFill>
@@ -3639,6 +3572,7 @@
                 <a:sym typeface="Helvetica"/>
               </a:defRPr>
             </a:pPr>
+            <a:endParaRPr/>
           </a:p>
           <a:p>
             <a:pPr algn="l" defTabSz="457200">
@@ -3784,6 +3718,7 @@
                 <a:sym typeface="Monaco"/>
               </a:defRPr>
             </a:pPr>
+            <a:endParaRPr/>
           </a:p>
           <a:p>
             <a:pPr algn="l" defTabSz="457200">
@@ -3830,12 +3765,12 @@
   <p:clrMapOvr>
     <a:masterClrMapping/>
   </p:clrMapOvr>
-  <p:transition xmlns:p14="http://schemas.microsoft.com/office/powerpoint/2010/main" spd="med" advClick="1"/>
+  <p:transition spd="med"/>
 </p:sld>
 </file>
 
 <file path=ppt/slides/slide12.xml><?xml version="1.0" encoding="utf-8"?>
-<p:sld xmlns:a="http://schemas.openxmlformats.org/drawingml/2006/main" xmlns:r="http://schemas.openxmlformats.org/officeDocument/2006/relationships" xmlns:p="http://schemas.openxmlformats.org/presentationml/2006/main" xmlns:m="http://schemas.openxmlformats.org/officeDocument/2006/math" xmlns:a14="http://schemas.microsoft.com/office/drawing/2010/main" showMasterSp="1" showMasterPhAnim="1">
+<p:sld xmlns:a="http://schemas.openxmlformats.org/drawingml/2006/main" xmlns:r="http://schemas.openxmlformats.org/officeDocument/2006/relationships" xmlns:p="http://schemas.openxmlformats.org/presentationml/2006/main">
   <p:cSld>
     <p:spTree>
       <p:nvGrpSpPr>
@@ -3870,7 +3805,7 @@
           </a:ln>
           <a:extLst>
             <a:ext uri="{C572A759-6A51-4108-AA02-DFA0A04FC94B}">
-              <ma14:wrappingTextBoxFlag xmlns:ma14="http://schemas.microsoft.com/office/mac/drawingml/2011/main" val="1"/>
+              <ma14:wrappingTextBoxFlag xmlns:ma14="http://schemas.microsoft.com/office/mac/drawingml/2011/main" xmlns:a14="http://schemas.microsoft.com/office/drawing/2010/main" xmlns:m="http://schemas.openxmlformats.org/officeDocument/2006/math" xmlns="" val="1"/>
             </a:ext>
           </a:extLst>
         </p:spPr>
@@ -3929,7 +3864,7 @@
           </a:ln>
           <a:extLst>
             <a:ext uri="{C572A759-6A51-4108-AA02-DFA0A04FC94B}">
-              <ma14:wrappingTextBoxFlag xmlns:ma14="http://schemas.microsoft.com/office/mac/drawingml/2011/main" val="1"/>
+              <ma14:wrappingTextBoxFlag xmlns:ma14="http://schemas.microsoft.com/office/mac/drawingml/2011/main" xmlns:a14="http://schemas.microsoft.com/office/drawing/2010/main" xmlns:m="http://schemas.openxmlformats.org/officeDocument/2006/math" xmlns="" val="1"/>
             </a:ext>
           </a:extLst>
         </p:spPr>
@@ -3940,7 +3875,7 @@
           <a:lstStyle/>
           <a:p>
             <a:pPr algn="l" defTabSz="457200">
-              <a:defRPr b="1" sz="3500">
+              <a:defRPr sz="3500" b="1">
                 <a:solidFill>
                   <a:srgbClr val="FA1116"/>
                 </a:solidFill>
@@ -3995,7 +3930,6 @@
               <a:rPr b="1"/>
               <a:t>specified number of times</a:t>
             </a:r>
-            <a:endParaRPr b="1"/>
           </a:p>
           <a:p>
             <a:pPr algn="l" defTabSz="457200">
@@ -4009,6 +3943,7 @@
                 <a:sym typeface="Helvetica"/>
               </a:defRPr>
             </a:pPr>
+            <a:endParaRPr b="1"/>
           </a:p>
           <a:p>
             <a:pPr algn="l" defTabSz="457200">
@@ -4131,12 +4066,12 @@
   <p:clrMapOvr>
     <a:masterClrMapping/>
   </p:clrMapOvr>
-  <p:transition xmlns:p14="http://schemas.microsoft.com/office/powerpoint/2010/main" spd="med" advClick="1"/>
+  <p:transition spd="med"/>
 </p:sld>
 </file>
 
 <file path=ppt/slides/slide13.xml><?xml version="1.0" encoding="utf-8"?>
-<p:sld xmlns:a="http://schemas.openxmlformats.org/drawingml/2006/main" xmlns:r="http://schemas.openxmlformats.org/officeDocument/2006/relationships" xmlns:p="http://schemas.openxmlformats.org/presentationml/2006/main" xmlns:m="http://schemas.openxmlformats.org/officeDocument/2006/math" xmlns:a14="http://schemas.microsoft.com/office/drawing/2010/main" showMasterSp="1" showMasterPhAnim="1">
+<p:sld xmlns:a="http://schemas.openxmlformats.org/drawingml/2006/main" xmlns:r="http://schemas.openxmlformats.org/officeDocument/2006/relationships" xmlns:p="http://schemas.openxmlformats.org/presentationml/2006/main">
   <p:cSld>
     <p:spTree>
       <p:nvGrpSpPr>
@@ -4188,7 +4123,7 @@
             <a:effectLst/>
             <a:extLst>
               <a:ext uri="{C572A759-6A51-4108-AA02-DFA0A04FC94B}">
-                <ma14:wrappingTextBoxFlag xmlns:ma14="http://schemas.microsoft.com/office/mac/drawingml/2011/main" val="1"/>
+                <ma14:wrappingTextBoxFlag xmlns:ma14="http://schemas.microsoft.com/office/mac/drawingml/2011/main" xmlns:a14="http://schemas.microsoft.com/office/drawing/2010/main" xmlns:m="http://schemas.openxmlformats.org/officeDocument/2006/math" xmlns="" val="1"/>
               </a:ext>
             </a:extLst>
           </p:spPr>
@@ -4210,7 +4145,6 @@
               </a:lvl1pPr>
             </a:lstStyle>
             <a:p>
-              <a:pPr/>
               <a:r>
                 <a:t>Thank</a:t>
               </a:r>
@@ -4243,7 +4177,7 @@
             <a:effectLst/>
             <a:extLst>
               <a:ext uri="{C572A759-6A51-4108-AA02-DFA0A04FC94B}">
-                <ma14:wrappingTextBoxFlag xmlns:ma14="http://schemas.microsoft.com/office/mac/drawingml/2011/main" val="1"/>
+                <ma14:wrappingTextBoxFlag xmlns:ma14="http://schemas.microsoft.com/office/mac/drawingml/2011/main" xmlns:a14="http://schemas.microsoft.com/office/drawing/2010/main" xmlns:m="http://schemas.openxmlformats.org/officeDocument/2006/math" xmlns="" val="1"/>
               </a:ext>
             </a:extLst>
           </p:spPr>
@@ -4265,7 +4199,6 @@
               </a:lvl1pPr>
             </a:lstStyle>
             <a:p>
-              <a:pPr/>
               <a:r>
                 <a:t>you.</a:t>
               </a:r>
@@ -4282,9 +4215,7 @@
           <p:nvPr/>
         </p:nvPicPr>
         <p:blipFill>
-          <a:blip r:embed="rId2">
-            <a:extLst/>
-          </a:blip>
+          <a:blip r:embed="rId2"/>
           <a:stretch>
             <a:fillRect/>
           </a:stretch>
@@ -4307,12 +4238,12 @@
   <p:clrMapOvr>
     <a:masterClrMapping/>
   </p:clrMapOvr>
-  <p:transition xmlns:p14="http://schemas.microsoft.com/office/powerpoint/2010/main" spd="med" advClick="1"/>
+  <p:transition spd="med"/>
 </p:sld>
 </file>
 
 <file path=ppt/slides/slide2.xml><?xml version="1.0" encoding="utf-8"?>
-<p:sld xmlns:a="http://schemas.openxmlformats.org/drawingml/2006/main" xmlns:r="http://schemas.openxmlformats.org/officeDocument/2006/relationships" xmlns:p="http://schemas.openxmlformats.org/presentationml/2006/main" xmlns:m="http://schemas.openxmlformats.org/officeDocument/2006/math" xmlns:a14="http://schemas.microsoft.com/office/drawing/2010/main" showMasterSp="1" showMasterPhAnim="1">
+<p:sld xmlns:a="http://schemas.openxmlformats.org/drawingml/2006/main" xmlns:r="http://schemas.openxmlformats.org/officeDocument/2006/relationships" xmlns:p="http://schemas.openxmlformats.org/presentationml/2006/main">
   <p:cSld>
     <p:spTree>
       <p:nvGrpSpPr>
@@ -4347,7 +4278,7 @@
           </a:ln>
           <a:extLst>
             <a:ext uri="{C572A759-6A51-4108-AA02-DFA0A04FC94B}">
-              <ma14:wrappingTextBoxFlag xmlns:ma14="http://schemas.microsoft.com/office/mac/drawingml/2011/main" val="1"/>
+              <ma14:wrappingTextBoxFlag xmlns:ma14="http://schemas.microsoft.com/office/mac/drawingml/2011/main" xmlns:a14="http://schemas.microsoft.com/office/drawing/2010/main" xmlns:m="http://schemas.openxmlformats.org/officeDocument/2006/math" xmlns="" val="1"/>
             </a:ext>
           </a:extLst>
         </p:spPr>
@@ -4406,7 +4337,7 @@
           </a:ln>
           <a:extLst>
             <a:ext uri="{C572A759-6A51-4108-AA02-DFA0A04FC94B}">
-              <ma14:wrappingTextBoxFlag xmlns:ma14="http://schemas.microsoft.com/office/mac/drawingml/2011/main" val="1"/>
+              <ma14:wrappingTextBoxFlag xmlns:ma14="http://schemas.microsoft.com/office/mac/drawingml/2011/main" xmlns:a14="http://schemas.microsoft.com/office/drawing/2010/main" xmlns:m="http://schemas.openxmlformats.org/officeDocument/2006/math" xmlns="" val="1"/>
             </a:ext>
           </a:extLst>
         </p:spPr>
@@ -4417,7 +4348,7 @@
           <a:lstStyle/>
           <a:p>
             <a:pPr defTabSz="457200">
-              <a:defRPr b="1" sz="5000">
+              <a:defRPr sz="5000" b="1">
                 <a:latin typeface="Helvetica"/>
                 <a:ea typeface="Helvetica"/>
                 <a:cs typeface="Helvetica"/>
@@ -4437,6 +4368,7 @@
                 <a:sym typeface="Helvetica"/>
               </a:defRPr>
             </a:pPr>
+            <a:endParaRPr/>
           </a:p>
           <a:p>
             <a:pPr defTabSz="457200">
@@ -4458,12 +4390,12 @@
   <p:clrMapOvr>
     <a:masterClrMapping/>
   </p:clrMapOvr>
-  <p:transition xmlns:p14="http://schemas.microsoft.com/office/powerpoint/2010/main" spd="med" advClick="1"/>
+  <p:transition spd="med"/>
 </p:sld>
 </file>
 
 <file path=ppt/slides/slide3.xml><?xml version="1.0" encoding="utf-8"?>
-<p:sld xmlns:a="http://schemas.openxmlformats.org/drawingml/2006/main" xmlns:r="http://schemas.openxmlformats.org/officeDocument/2006/relationships" xmlns:p="http://schemas.openxmlformats.org/presentationml/2006/main" xmlns:m="http://schemas.openxmlformats.org/officeDocument/2006/math" xmlns:a14="http://schemas.microsoft.com/office/drawing/2010/main" showMasterSp="1" showMasterPhAnim="1">
+<p:sld xmlns:a="http://schemas.openxmlformats.org/drawingml/2006/main" xmlns:r="http://schemas.openxmlformats.org/officeDocument/2006/relationships" xmlns:p="http://schemas.openxmlformats.org/presentationml/2006/main">
   <p:cSld>
     <p:spTree>
       <p:nvGrpSpPr>
@@ -4498,7 +4430,7 @@
           </a:ln>
           <a:extLst>
             <a:ext uri="{C572A759-6A51-4108-AA02-DFA0A04FC94B}">
-              <ma14:wrappingTextBoxFlag xmlns:ma14="http://schemas.microsoft.com/office/mac/drawingml/2011/main" val="1"/>
+              <ma14:wrappingTextBoxFlag xmlns:ma14="http://schemas.microsoft.com/office/mac/drawingml/2011/main" xmlns:a14="http://schemas.microsoft.com/office/drawing/2010/main" xmlns:m="http://schemas.openxmlformats.org/officeDocument/2006/math" xmlns="" val="1"/>
             </a:ext>
           </a:extLst>
         </p:spPr>
@@ -4557,7 +4489,7 @@
           </a:ln>
           <a:extLst>
             <a:ext uri="{C572A759-6A51-4108-AA02-DFA0A04FC94B}">
-              <ma14:wrappingTextBoxFlag xmlns:ma14="http://schemas.microsoft.com/office/mac/drawingml/2011/main" val="1"/>
+              <ma14:wrappingTextBoxFlag xmlns:ma14="http://schemas.microsoft.com/office/mac/drawingml/2011/main" xmlns:a14="http://schemas.microsoft.com/office/drawing/2010/main" xmlns:m="http://schemas.openxmlformats.org/officeDocument/2006/math" xmlns="" val="1"/>
             </a:ext>
           </a:extLst>
         </p:spPr>
@@ -4603,6 +4535,7 @@
                 <a:sym typeface="Helvetica"/>
               </a:defRPr>
             </a:pPr>
+            <a:endParaRPr b="1"/>
           </a:p>
           <a:p>
             <a:pPr algn="l" defTabSz="457200">
@@ -4645,6 +4578,7 @@
                 <a:sym typeface="Helvetica"/>
               </a:defRPr>
             </a:pPr>
+            <a:endParaRPr b="1"/>
           </a:p>
           <a:p>
             <a:pPr algn="l" defTabSz="457200">
@@ -4688,12 +4622,12 @@
   <p:clrMapOvr>
     <a:masterClrMapping/>
   </p:clrMapOvr>
-  <p:transition xmlns:p14="http://schemas.microsoft.com/office/powerpoint/2010/main" spd="med" advClick="1"/>
+  <p:transition spd="med"/>
 </p:sld>
 </file>
 
 <file path=ppt/slides/slide4.xml><?xml version="1.0" encoding="utf-8"?>
-<p:sld xmlns:a="http://schemas.openxmlformats.org/drawingml/2006/main" xmlns:r="http://schemas.openxmlformats.org/officeDocument/2006/relationships" xmlns:p="http://schemas.openxmlformats.org/presentationml/2006/main" xmlns:m="http://schemas.openxmlformats.org/officeDocument/2006/math" xmlns:a14="http://schemas.microsoft.com/office/drawing/2010/main" showMasterSp="1" showMasterPhAnim="1">
+<p:sld xmlns:a="http://schemas.openxmlformats.org/drawingml/2006/main" xmlns:r="http://schemas.openxmlformats.org/officeDocument/2006/relationships" xmlns:p="http://schemas.openxmlformats.org/presentationml/2006/main">
   <p:cSld>
     <p:spTree>
       <p:nvGrpSpPr>
@@ -4728,7 +4662,7 @@
           </a:ln>
           <a:extLst>
             <a:ext uri="{C572A759-6A51-4108-AA02-DFA0A04FC94B}">
-              <ma14:wrappingTextBoxFlag xmlns:ma14="http://schemas.microsoft.com/office/mac/drawingml/2011/main" val="1"/>
+              <ma14:wrappingTextBoxFlag xmlns:ma14="http://schemas.microsoft.com/office/mac/drawingml/2011/main" xmlns:a14="http://schemas.microsoft.com/office/drawing/2010/main" xmlns:m="http://schemas.openxmlformats.org/officeDocument/2006/math" xmlns="" val="1"/>
             </a:ext>
           </a:extLst>
         </p:spPr>
@@ -4787,7 +4721,7 @@
           </a:ln>
           <a:extLst>
             <a:ext uri="{C572A759-6A51-4108-AA02-DFA0A04FC94B}">
-              <ma14:wrappingTextBoxFlag xmlns:ma14="http://schemas.microsoft.com/office/mac/drawingml/2011/main" val="1"/>
+              <ma14:wrappingTextBoxFlag xmlns:ma14="http://schemas.microsoft.com/office/mac/drawingml/2011/main" xmlns:a14="http://schemas.microsoft.com/office/drawing/2010/main" xmlns:m="http://schemas.openxmlformats.org/officeDocument/2006/math" xmlns="" val="1"/>
             </a:ext>
           </a:extLst>
         </p:spPr>
@@ -4888,6 +4822,7 @@
                 <a:sym typeface="Helvetica"/>
               </a:defRPr>
             </a:pPr>
+            <a:endParaRPr b="1"/>
           </a:p>
           <a:p>
             <a:pPr algn="l" defTabSz="457200">
@@ -4931,12 +4866,12 @@
   <p:clrMapOvr>
     <a:masterClrMapping/>
   </p:clrMapOvr>
-  <p:transition xmlns:p14="http://schemas.microsoft.com/office/powerpoint/2010/main" spd="med" advClick="1"/>
+  <p:transition spd="med"/>
 </p:sld>
 </file>
 
 <file path=ppt/slides/slide5.xml><?xml version="1.0" encoding="utf-8"?>
-<p:sld xmlns:a="http://schemas.openxmlformats.org/drawingml/2006/main" xmlns:r="http://schemas.openxmlformats.org/officeDocument/2006/relationships" xmlns:p="http://schemas.openxmlformats.org/presentationml/2006/main" xmlns:m="http://schemas.openxmlformats.org/officeDocument/2006/math" xmlns:a14="http://schemas.microsoft.com/office/drawing/2010/main" showMasterSp="1" showMasterPhAnim="1">
+<p:sld xmlns:a="http://schemas.openxmlformats.org/drawingml/2006/main" xmlns:r="http://schemas.openxmlformats.org/officeDocument/2006/relationships" xmlns:p="http://schemas.openxmlformats.org/presentationml/2006/main">
   <p:cSld>
     <p:spTree>
       <p:nvGrpSpPr>
@@ -4971,7 +4906,7 @@
           </a:ln>
           <a:extLst>
             <a:ext uri="{C572A759-6A51-4108-AA02-DFA0A04FC94B}">
-              <ma14:wrappingTextBoxFlag xmlns:ma14="http://schemas.microsoft.com/office/mac/drawingml/2011/main" val="1"/>
+              <ma14:wrappingTextBoxFlag xmlns:ma14="http://schemas.microsoft.com/office/mac/drawingml/2011/main" xmlns:a14="http://schemas.microsoft.com/office/drawing/2010/main" xmlns:m="http://schemas.openxmlformats.org/officeDocument/2006/math" xmlns="" val="1"/>
             </a:ext>
           </a:extLst>
         </p:spPr>
@@ -5030,7 +4965,7 @@
           </a:ln>
           <a:extLst>
             <a:ext uri="{C572A759-6A51-4108-AA02-DFA0A04FC94B}">
-              <ma14:wrappingTextBoxFlag xmlns:ma14="http://schemas.microsoft.com/office/mac/drawingml/2011/main" val="1"/>
+              <ma14:wrappingTextBoxFlag xmlns:ma14="http://schemas.microsoft.com/office/mac/drawingml/2011/main" xmlns:a14="http://schemas.microsoft.com/office/drawing/2010/main" xmlns:m="http://schemas.openxmlformats.org/officeDocument/2006/math" xmlns="" val="1"/>
             </a:ext>
           </a:extLst>
         </p:spPr>
@@ -5081,6 +5016,7 @@
                 <a:sym typeface="Consolas"/>
               </a:defRPr>
             </a:pPr>
+            <a:endParaRPr/>
           </a:p>
           <a:p>
             <a:pPr algn="l" defTabSz="457200">
@@ -5183,6 +5119,7 @@
                 <a:sym typeface="Helvetica"/>
               </a:defRPr>
             </a:pPr>
+            <a:endParaRPr/>
           </a:p>
           <a:p>
             <a:pPr algn="l" defTabSz="457200">
@@ -5224,6 +5161,7 @@
                 <a:sym typeface="Helvetica"/>
               </a:defRPr>
             </a:pPr>
+            <a:endParaRPr/>
           </a:p>
           <a:p>
             <a:pPr algn="l" defTabSz="457200">
@@ -5254,12 +5192,12 @@
   <p:clrMapOvr>
     <a:masterClrMapping/>
   </p:clrMapOvr>
-  <p:transition xmlns:p14="http://schemas.microsoft.com/office/powerpoint/2010/main" spd="med" advClick="1"/>
+  <p:transition spd="med"/>
 </p:sld>
 </file>
 
 <file path=ppt/slides/slide6.xml><?xml version="1.0" encoding="utf-8"?>
-<p:sld xmlns:a="http://schemas.openxmlformats.org/drawingml/2006/main" xmlns:r="http://schemas.openxmlformats.org/officeDocument/2006/relationships" xmlns:p="http://schemas.openxmlformats.org/presentationml/2006/main" xmlns:m="http://schemas.openxmlformats.org/officeDocument/2006/math" xmlns:a14="http://schemas.microsoft.com/office/drawing/2010/main" showMasterSp="1" showMasterPhAnim="1">
+<p:sld xmlns:a="http://schemas.openxmlformats.org/drawingml/2006/main" xmlns:r="http://schemas.openxmlformats.org/officeDocument/2006/relationships" xmlns:p="http://schemas.openxmlformats.org/presentationml/2006/main">
   <p:cSld>
     <p:spTree>
       <p:nvGrpSpPr>
@@ -5294,7 +5232,7 @@
           </a:ln>
           <a:extLst>
             <a:ext uri="{C572A759-6A51-4108-AA02-DFA0A04FC94B}">
-              <ma14:wrappingTextBoxFlag xmlns:ma14="http://schemas.microsoft.com/office/mac/drawingml/2011/main" val="1"/>
+              <ma14:wrappingTextBoxFlag xmlns:ma14="http://schemas.microsoft.com/office/mac/drawingml/2011/main" xmlns:a14="http://schemas.microsoft.com/office/drawing/2010/main" xmlns:m="http://schemas.openxmlformats.org/officeDocument/2006/math" xmlns="" val="1"/>
             </a:ext>
           </a:extLst>
         </p:spPr>
@@ -5353,7 +5291,7 @@
           </a:ln>
           <a:extLst>
             <a:ext uri="{C572A759-6A51-4108-AA02-DFA0A04FC94B}">
-              <ma14:wrappingTextBoxFlag xmlns:ma14="http://schemas.microsoft.com/office/mac/drawingml/2011/main" val="1"/>
+              <ma14:wrappingTextBoxFlag xmlns:ma14="http://schemas.microsoft.com/office/mac/drawingml/2011/main" xmlns:a14="http://schemas.microsoft.com/office/drawing/2010/main" xmlns:m="http://schemas.openxmlformats.org/officeDocument/2006/math" xmlns="" val="1"/>
             </a:ext>
           </a:extLst>
         </p:spPr>
@@ -5463,6 +5401,7 @@
                 <a:sym typeface="Helvetica"/>
               </a:defRPr>
             </a:pPr>
+            <a:endParaRPr b="1"/>
           </a:p>
           <a:p>
             <a:pPr algn="l" defTabSz="457200">
@@ -5490,6 +5429,7 @@
                 <a:sym typeface="Helvetica"/>
               </a:defRPr>
             </a:pPr>
+            <a:endParaRPr b="1"/>
           </a:p>
           <a:p>
             <a:pPr algn="l" defTabSz="457200">
@@ -5517,6 +5457,7 @@
                 <a:sym typeface="Helvetica"/>
               </a:defRPr>
             </a:pPr>
+            <a:endParaRPr b="1"/>
           </a:p>
         </p:txBody>
       </p:sp>
@@ -5525,12 +5466,12 @@
   <p:clrMapOvr>
     <a:masterClrMapping/>
   </p:clrMapOvr>
-  <p:transition xmlns:p14="http://schemas.microsoft.com/office/powerpoint/2010/main" spd="med" advClick="1"/>
+  <p:transition spd="med"/>
 </p:sld>
 </file>
 
 <file path=ppt/slides/slide7.xml><?xml version="1.0" encoding="utf-8"?>
-<p:sld xmlns:a="http://schemas.openxmlformats.org/drawingml/2006/main" xmlns:r="http://schemas.openxmlformats.org/officeDocument/2006/relationships" xmlns:p="http://schemas.openxmlformats.org/presentationml/2006/main" xmlns:m="http://schemas.openxmlformats.org/officeDocument/2006/math" xmlns:a14="http://schemas.microsoft.com/office/drawing/2010/main" showMasterSp="1" showMasterPhAnim="1">
+<p:sld xmlns:a="http://schemas.openxmlformats.org/drawingml/2006/main" xmlns:r="http://schemas.openxmlformats.org/officeDocument/2006/relationships" xmlns:p="http://schemas.openxmlformats.org/presentationml/2006/main">
   <p:cSld>
     <p:spTree>
       <p:nvGrpSpPr>
@@ -5565,7 +5506,7 @@
           </a:ln>
           <a:extLst>
             <a:ext uri="{C572A759-6A51-4108-AA02-DFA0A04FC94B}">
-              <ma14:wrappingTextBoxFlag xmlns:ma14="http://schemas.microsoft.com/office/mac/drawingml/2011/main" val="1"/>
+              <ma14:wrappingTextBoxFlag xmlns:ma14="http://schemas.microsoft.com/office/mac/drawingml/2011/main" xmlns:a14="http://schemas.microsoft.com/office/drawing/2010/main" xmlns:m="http://schemas.openxmlformats.org/officeDocument/2006/math" xmlns="" val="1"/>
             </a:ext>
           </a:extLst>
         </p:spPr>
@@ -5624,7 +5565,7 @@
           </a:ln>
           <a:extLst>
             <a:ext uri="{C572A759-6A51-4108-AA02-DFA0A04FC94B}">
-              <ma14:wrappingTextBoxFlag xmlns:ma14="http://schemas.microsoft.com/office/mac/drawingml/2011/main" val="1"/>
+              <ma14:wrappingTextBoxFlag xmlns:ma14="http://schemas.microsoft.com/office/mac/drawingml/2011/main" xmlns:a14="http://schemas.microsoft.com/office/drawing/2010/main" xmlns:m="http://schemas.openxmlformats.org/officeDocument/2006/math" xmlns="" val="1"/>
             </a:ext>
           </a:extLst>
         </p:spPr>
@@ -5661,6 +5602,7 @@
                 <a:sym typeface="Helvetica Neue"/>
               </a:defRPr>
             </a:pPr>
+            <a:endParaRPr/>
           </a:p>
           <a:p>
             <a:pPr algn="l" defTabSz="457200">
@@ -5769,6 +5711,7 @@
                 <a:sym typeface="Helvetica"/>
               </a:defRPr>
             </a:pPr>
+            <a:endParaRPr/>
           </a:p>
           <a:p>
             <a:pPr algn="l" defTabSz="457200">
@@ -5793,241 +5736,12 @@
   <p:clrMapOvr>
     <a:masterClrMapping/>
   </p:clrMapOvr>
-  <p:transition xmlns:p14="http://schemas.microsoft.com/office/powerpoint/2010/main" spd="med" advClick="1"/>
+  <p:transition spd="med"/>
 </p:sld>
 </file>
 
 <file path=ppt/slides/slide8.xml><?xml version="1.0" encoding="utf-8"?>
-<p:sld xmlns:a="http://schemas.openxmlformats.org/drawingml/2006/main" xmlns:r="http://schemas.openxmlformats.org/officeDocument/2006/relationships" xmlns:p="http://schemas.openxmlformats.org/presentationml/2006/main" xmlns:m="http://schemas.openxmlformats.org/officeDocument/2006/math" xmlns:a14="http://schemas.microsoft.com/office/drawing/2010/main" showMasterSp="1" showMasterPhAnim="1">
-  <p:cSld>
-    <p:spTree>
-      <p:nvGrpSpPr>
-        <p:cNvPr id="1" name=""/>
-        <p:cNvGrpSpPr/>
-        <p:nvPr/>
-      </p:nvGrpSpPr>
-      <p:grpSpPr>
-        <a:xfrm>
-          <a:off x="0" y="0"/>
-          <a:ext cx="0" cy="0"/>
-          <a:chOff x="0" y="0"/>
-          <a:chExt cx="0" cy="0"/>
-        </a:xfrm>
-      </p:grpSpPr>
-      <p:sp>
-        <p:nvSpPr>
-          <p:cNvPr id="141" name="Iterators"/>
-          <p:cNvSpPr txBox="1"/>
-          <p:nvPr/>
-        </p:nvSpPr>
-        <p:spPr>
-          <a:xfrm>
-            <a:off x="4737698" y="596900"/>
-            <a:ext cx="3967989" cy="1295401"/>
-          </a:xfrm>
-          <a:prstGeom prst="rect">
-            <a:avLst/>
-          </a:prstGeom>
-          <a:ln w="3175">
-            <a:miter lim="400000"/>
-          </a:ln>
-          <a:extLst>
-            <a:ext uri="{C572A759-6A51-4108-AA02-DFA0A04FC94B}">
-              <ma14:wrappingTextBoxFlag xmlns:ma14="http://schemas.microsoft.com/office/mac/drawingml/2011/main" val="1"/>
-            </a:ext>
-          </a:extLst>
-        </p:spPr>
-        <p:txBody>
-          <a:bodyPr wrap="none" lIns="38100" tIns="38100" rIns="38100" bIns="38100" anchor="ctr">
-            <a:spAutoFit/>
-          </a:bodyPr>
-          <a:lstStyle/>
-          <a:p>
-            <a:pPr>
-              <a:defRPr sz="8000">
-                <a:solidFill>
-                  <a:schemeClr val="accent5">
-                    <a:hueOff val="-444211"/>
-                    <a:satOff val="-14915"/>
-                    <a:lumOff val="22857"/>
-                  </a:schemeClr>
-                </a:solidFill>
-              </a:defRPr>
-            </a:pPr>
-            <a:r>
-              <a:rPr>
-                <a:solidFill>
-                  <a:srgbClr val="FA1116"/>
-                </a:solidFill>
-              </a:rPr>
-              <a:t>I</a:t>
-            </a:r>
-            <a:r>
-              <a:rPr>
-                <a:solidFill>
-                  <a:srgbClr val="000000"/>
-                </a:solidFill>
-              </a:rPr>
-              <a:t>terators</a:t>
-            </a:r>
-          </a:p>
-        </p:txBody>
-      </p:sp>
-      <p:sp>
-        <p:nvSpPr>
-          <p:cNvPr id="142" name="Another way to loop in Ruby!…"/>
-          <p:cNvSpPr txBox="1"/>
-          <p:nvPr/>
-        </p:nvSpPr>
-        <p:spPr>
-          <a:xfrm>
-            <a:off x="335953" y="3244849"/>
-            <a:ext cx="12332894" cy="4711701"/>
-          </a:xfrm>
-          <a:prstGeom prst="rect">
-            <a:avLst/>
-          </a:prstGeom>
-          <a:ln w="3175">
-            <a:miter lim="400000"/>
-          </a:ln>
-          <a:extLst>
-            <a:ext uri="{C572A759-6A51-4108-AA02-DFA0A04FC94B}">
-              <ma14:wrappingTextBoxFlag xmlns:ma14="http://schemas.microsoft.com/office/mac/drawingml/2011/main" val="1"/>
-            </a:ext>
-          </a:extLst>
-        </p:spPr>
-        <p:txBody>
-          <a:bodyPr lIns="38100" tIns="38100" rIns="38100" bIns="38100" anchor="ctr">
-            <a:spAutoFit/>
-          </a:bodyPr>
-          <a:lstStyle/>
-          <a:p>
-            <a:pPr algn="l" defTabSz="457200">
-              <a:spcBef>
-                <a:spcPts val="500"/>
-              </a:spcBef>
-              <a:defRPr sz="3500">
-                <a:latin typeface="Helvetica"/>
-                <a:ea typeface="Helvetica"/>
-                <a:cs typeface="Helvetica"/>
-                <a:sym typeface="Helvetica"/>
-              </a:defRPr>
-            </a:pPr>
-            <a:r>
-              <a:t>Another way to loop in Ruby!</a:t>
-            </a:r>
-          </a:p>
-          <a:p>
-            <a:pPr algn="l" defTabSz="457200">
-              <a:spcBef>
-                <a:spcPts val="500"/>
-              </a:spcBef>
-              <a:defRPr sz="3500">
-                <a:latin typeface="Helvetica"/>
-                <a:ea typeface="Helvetica"/>
-                <a:cs typeface="Helvetica"/>
-                <a:sym typeface="Helvetica"/>
-              </a:defRPr>
-            </a:pPr>
-          </a:p>
-          <a:p>
-            <a:pPr algn="l" defTabSz="457200">
-              <a:spcBef>
-                <a:spcPts val="500"/>
-              </a:spcBef>
-              <a:defRPr sz="3500">
-                <a:latin typeface="Helvetica"/>
-                <a:ea typeface="Helvetica"/>
-                <a:cs typeface="Helvetica"/>
-                <a:sym typeface="Helvetica"/>
-              </a:defRPr>
-            </a:pPr>
-            <a:r>
-              <a:t>An </a:t>
-            </a:r>
-            <a:r>
-              <a:rPr b="1">
-                <a:solidFill>
-                  <a:srgbClr val="FA1116"/>
-                </a:solidFill>
-              </a:rPr>
-              <a:t>iterator</a:t>
-            </a:r>
-            <a:r>
-              <a:rPr i="1"/>
-              <a:t> </a:t>
-            </a:r>
-            <a:r>
-              <a:t>is a Ruby method that repeatedly invokes a `block` of code</a:t>
-            </a:r>
-          </a:p>
-          <a:p>
-            <a:pPr algn="l" defTabSz="457200">
-              <a:spcBef>
-                <a:spcPts val="500"/>
-              </a:spcBef>
-              <a:defRPr sz="3500">
-                <a:latin typeface="Helvetica"/>
-                <a:ea typeface="Helvetica"/>
-                <a:cs typeface="Helvetica"/>
-                <a:sym typeface="Helvetica"/>
-              </a:defRPr>
-            </a:pPr>
-          </a:p>
-          <a:p>
-            <a:pPr algn="l" defTabSz="457200">
-              <a:spcBef>
-                <a:spcPts val="500"/>
-              </a:spcBef>
-              <a:defRPr sz="3500">
-                <a:latin typeface="Helvetica"/>
-                <a:ea typeface="Helvetica"/>
-                <a:cs typeface="Helvetica"/>
-                <a:sym typeface="Helvetica"/>
-              </a:defRPr>
-            </a:pPr>
-            <a:r>
-              <a:t>That `block` of code is the bit that contains the instructions to be repeated</a:t>
-            </a:r>
-          </a:p>
-          <a:p>
-            <a:pPr algn="l" defTabSz="457200">
-              <a:spcBef>
-                <a:spcPts val="500"/>
-              </a:spcBef>
-              <a:defRPr sz="3500">
-                <a:latin typeface="Helvetica"/>
-                <a:ea typeface="Helvetica"/>
-                <a:cs typeface="Helvetica"/>
-                <a:sym typeface="Helvetica"/>
-              </a:defRPr>
-            </a:pPr>
-            <a:r>
-              <a:t>(and those instructions may be anything you want!) </a:t>
-            </a:r>
-            <a:r>
-              <a:rPr>
-                <a:latin typeface="Apple Color Emoji"/>
-                <a:ea typeface="Apple Color Emoji"/>
-                <a:cs typeface="Apple Color Emoji"/>
-                <a:sym typeface="Apple Color Emoji"/>
-              </a:rPr>
-              <a:t>🙌🏻</a:t>
-            </a:r>
-          </a:p>
-        </p:txBody>
-      </p:sp>
-    </p:spTree>
-  </p:cSld>
-  <p:clrMapOvr>
-    <a:masterClrMapping/>
-  </p:clrMapOvr>
-  <p:transition xmlns:p14="http://schemas.microsoft.com/office/powerpoint/2010/main" spd="med" advClick="1"/>
-</p:sld>
-</file>
-
-<file path=ppt/slides/slide9.xml><?xml version="1.0" encoding="utf-8"?>
-<p:sld xmlns:a="http://schemas.openxmlformats.org/drawingml/2006/main" xmlns:r="http://schemas.openxmlformats.org/officeDocument/2006/relationships" xmlns:p="http://schemas.openxmlformats.org/presentationml/2006/main" xmlns:m="http://schemas.openxmlformats.org/officeDocument/2006/math" xmlns:a14="http://schemas.microsoft.com/office/drawing/2010/main" showMasterSp="1" showMasterPhAnim="1">
+<p:sld xmlns:a="http://schemas.openxmlformats.org/drawingml/2006/main" xmlns:r="http://schemas.openxmlformats.org/officeDocument/2006/relationships" xmlns:p="http://schemas.openxmlformats.org/presentationml/2006/main">
   <p:cSld>
     <p:spTree>
       <p:nvGrpSpPr>
@@ -6051,8 +5765,8 @@
         </p:nvSpPr>
         <p:spPr>
           <a:xfrm>
-            <a:off x="4737698" y="596900"/>
-            <a:ext cx="3967989" cy="1295401"/>
+            <a:off x="5586766" y="590576"/>
+            <a:ext cx="2269852" cy="1308050"/>
           </a:xfrm>
           <a:prstGeom prst="rect">
             <a:avLst/>
@@ -6062,7 +5776,7 @@
           </a:ln>
           <a:extLst>
             <a:ext uri="{C572A759-6A51-4108-AA02-DFA0A04FC94B}">
-              <ma14:wrappingTextBoxFlag xmlns:ma14="http://schemas.microsoft.com/office/mac/drawingml/2011/main" val="1"/>
+              <ma14:wrappingTextBoxFlag xmlns:ma14="http://schemas.microsoft.com/office/mac/drawingml/2011/main" xmlns:a14="http://schemas.microsoft.com/office/drawing/2010/main" xmlns:m="http://schemas.openxmlformats.org/officeDocument/2006/math" xmlns="" val="1"/>
             </a:ext>
           </a:extLst>
         </p:spPr>
@@ -6084,21 +5798,26 @@
               </a:defRPr>
             </a:pPr>
             <a:r>
-              <a:rPr>
+              <a:rPr lang="en-CA" dirty="0">
                 <a:solidFill>
                   <a:srgbClr val="FA1116"/>
                 </a:solidFill>
               </a:rPr>
-              <a:t>I</a:t>
-            </a:r>
-            <a:r>
-              <a:rPr>
+              <a:t>L</a:t>
+            </a:r>
+            <a:r>
+              <a:rPr lang="en-CA" dirty="0">
                 <a:solidFill>
                   <a:srgbClr val="000000"/>
                 </a:solidFill>
               </a:rPr>
-              <a:t>terators</a:t>
-            </a:r>
+              <a:t>oop</a:t>
+            </a:r>
+            <a:endParaRPr dirty="0">
+              <a:solidFill>
+                <a:srgbClr val="000000"/>
+              </a:solidFill>
+            </a:endParaRPr>
           </a:p>
         </p:txBody>
       </p:sp>
@@ -6110,8 +5829,8 @@
         </p:nvSpPr>
         <p:spPr>
           <a:xfrm>
-            <a:off x="555246" y="2850289"/>
-            <a:ext cx="12332894" cy="6261337"/>
+            <a:off x="555246" y="3057080"/>
+            <a:ext cx="12332894" cy="5847755"/>
           </a:xfrm>
           <a:prstGeom prst="rect">
             <a:avLst/>
@@ -6121,7 +5840,7 @@
           </a:ln>
           <a:extLst>
             <a:ext uri="{C572A759-6A51-4108-AA02-DFA0A04FC94B}">
-              <ma14:wrappingTextBoxFlag xmlns:ma14="http://schemas.microsoft.com/office/mac/drawingml/2011/main" val="1"/>
+              <ma14:wrappingTextBoxFlag xmlns:ma14="http://schemas.microsoft.com/office/mac/drawingml/2011/main" xmlns:a14="http://schemas.microsoft.com/office/drawing/2010/main" xmlns:m="http://schemas.openxmlformats.org/officeDocument/2006/math" xmlns="" val="1"/>
             </a:ext>
           </a:extLst>
         </p:spPr>
@@ -6130,22 +5849,6 @@
             <a:spAutoFit/>
           </a:bodyPr>
           <a:lstStyle/>
-          <a:p>
-            <a:pPr algn="l" defTabSz="457200">
-              <a:defRPr b="1" sz="3500">
-                <a:solidFill>
-                  <a:srgbClr val="FA1116"/>
-                </a:solidFill>
-                <a:latin typeface="Helvetica"/>
-                <a:ea typeface="Helvetica"/>
-                <a:cs typeface="Helvetica"/>
-                <a:sym typeface="Helvetica"/>
-              </a:defRPr>
-            </a:pPr>
-            <a:r>
-              <a:t>1. Loop</a:t>
-            </a:r>
-          </a:p>
           <a:p>
             <a:pPr algn="l" defTabSz="457200">
               <a:spcBef>
@@ -6158,15 +5861,10 @@
                 <a:sym typeface="Helvetica"/>
               </a:defRPr>
             </a:pPr>
-            <a:endParaRPr b="1">
-              <a:solidFill>
-                <a:schemeClr val="accent5">
-                  <a:hueOff val="-444211"/>
-                  <a:satOff val="-14915"/>
-                  <a:lumOff val="22857"/>
-                </a:schemeClr>
-              </a:solidFill>
-            </a:endParaRPr>
+            <a:r>
+              <a:rPr lang="en-US" dirty="0"/>
+              <a:t>Repeatedly invokes a `block` of code</a:t>
+            </a:r>
           </a:p>
           <a:p>
             <a:pPr algn="l" defTabSz="457200">
@@ -6180,9 +5878,7 @@
                 <a:sym typeface="Helvetica"/>
               </a:defRPr>
             </a:pPr>
-            <a:r>
-              <a:t>It’s the simplest iterator of all:</a:t>
-            </a:r>
+            <a:endParaRPr lang="en-US" dirty="0"/>
           </a:p>
           <a:p>
             <a:pPr algn="l" defTabSz="457200">
@@ -6196,6 +5892,7 @@
                 <a:sym typeface="Helvetica"/>
               </a:defRPr>
             </a:pPr>
+            <a:endParaRPr dirty="0"/>
           </a:p>
           <a:p>
             <a:pPr algn="l" defTabSz="457200">
@@ -6217,6 +5914,7 @@
               </a:defRPr>
             </a:pPr>
             <a:r>
+              <a:rPr dirty="0"/>
               <a:t>loop { print "Hello, world!" }</a:t>
             </a:r>
           </a:p>
@@ -6250,6 +5948,7 @@
                 <a:sym typeface="Helvetica"/>
               </a:defRPr>
             </a:pPr>
+            <a:endParaRPr dirty="0"/>
           </a:p>
           <a:p>
             <a:pPr algn="l" defTabSz="457200">
@@ -6279,6 +5978,7 @@
               </a:defRPr>
             </a:pPr>
             <a:r>
+              <a:rPr dirty="0"/>
               <a:t>is the same as:</a:t>
             </a:r>
           </a:p>
@@ -6312,6 +6012,7 @@
                 <a:sym typeface="Helvetica"/>
               </a:defRPr>
             </a:pPr>
+            <a:endParaRPr dirty="0"/>
           </a:p>
           <a:p>
             <a:pPr algn="l" defTabSz="457200">
@@ -6333,6 +6034,7 @@
               </a:defRPr>
             </a:pPr>
             <a:r>
+              <a:rPr dirty="0"/>
               <a:t>loop do</a:t>
             </a:r>
           </a:p>
@@ -6356,6 +6058,7 @@
               </a:defRPr>
             </a:pPr>
             <a:r>
+              <a:rPr dirty="0"/>
               <a:t>  print "Hello, world!"</a:t>
             </a:r>
           </a:p>
@@ -6379,6 +6082,7 @@
               </a:defRPr>
             </a:pPr>
             <a:r>
+              <a:rPr dirty="0"/>
               <a:t>end</a:t>
             </a:r>
           </a:p>
@@ -6389,12 +6093,420 @@
   <p:clrMapOvr>
     <a:masterClrMapping/>
   </p:clrMapOvr>
-  <p:transition xmlns:p14="http://schemas.microsoft.com/office/powerpoint/2010/main" spd="med" advClick="1"/>
+  <p:transition spd="med"/>
+</p:sld>
+</file>
+
+<file path=ppt/slides/slide9.xml><?xml version="1.0" encoding="utf-8"?>
+<p:sld xmlns:a="http://schemas.openxmlformats.org/drawingml/2006/main" xmlns:r="http://schemas.openxmlformats.org/officeDocument/2006/relationships" xmlns:p="http://schemas.openxmlformats.org/presentationml/2006/main">
+  <p:cSld>
+    <p:spTree>
+      <p:nvGrpSpPr>
+        <p:cNvPr id="1" name=""/>
+        <p:cNvGrpSpPr/>
+        <p:nvPr/>
+      </p:nvGrpSpPr>
+      <p:grpSpPr>
+        <a:xfrm>
+          <a:off x="0" y="0"/>
+          <a:ext cx="0" cy="0"/>
+          <a:chOff x="0" y="0"/>
+          <a:chExt cx="0" cy="0"/>
+        </a:xfrm>
+      </p:grpSpPr>
+      <p:sp>
+        <p:nvSpPr>
+          <p:cNvPr id="147" name="Iterators"/>
+          <p:cNvSpPr txBox="1"/>
+          <p:nvPr/>
+        </p:nvSpPr>
+        <p:spPr>
+          <a:xfrm>
+            <a:off x="3944489" y="500929"/>
+            <a:ext cx="5632952" cy="1308050"/>
+          </a:xfrm>
+          <a:prstGeom prst="rect">
+            <a:avLst/>
+          </a:prstGeom>
+          <a:ln w="3175">
+            <a:miter lim="400000"/>
+          </a:ln>
+          <a:extLst>
+            <a:ext uri="{C572A759-6A51-4108-AA02-DFA0A04FC94B}">
+              <ma14:wrappingTextBoxFlag xmlns:ma14="http://schemas.microsoft.com/office/mac/drawingml/2011/main" xmlns:a14="http://schemas.microsoft.com/office/drawing/2010/main" xmlns:m="http://schemas.openxmlformats.org/officeDocument/2006/math" xmlns="" val="1"/>
+            </a:ext>
+          </a:extLst>
+        </p:spPr>
+        <p:txBody>
+          <a:bodyPr wrap="none" lIns="38100" tIns="38100" rIns="38100" bIns="38100" anchor="ctr">
+            <a:spAutoFit/>
+          </a:bodyPr>
+          <a:lstStyle/>
+          <a:p>
+            <a:pPr>
+              <a:defRPr sz="8000">
+                <a:solidFill>
+                  <a:schemeClr val="accent5">
+                    <a:hueOff val="-444211"/>
+                    <a:satOff val="-14915"/>
+                    <a:lumOff val="22857"/>
+                  </a:schemeClr>
+                </a:solidFill>
+              </a:defRPr>
+            </a:pPr>
+            <a:r>
+              <a:rPr lang="en-CA" dirty="0">
+                <a:solidFill>
+                  <a:srgbClr val="FA1116"/>
+                </a:solidFill>
+              </a:rPr>
+              <a:t>L</a:t>
+            </a:r>
+            <a:r>
+              <a:rPr lang="en-CA" dirty="0">
+                <a:solidFill>
+                  <a:srgbClr val="000000"/>
+                </a:solidFill>
+              </a:rPr>
+              <a:t>oop </a:t>
+            </a:r>
+            <a:r>
+              <a:rPr lang="en-CA" dirty="0"/>
+              <a:t>(cont.)</a:t>
+            </a:r>
+          </a:p>
+        </p:txBody>
+      </p:sp>
+      <p:sp>
+        <p:nvSpPr>
+          <p:cNvPr id="148" name="1. Loop (cont.)…"/>
+          <p:cNvSpPr txBox="1"/>
+          <p:nvPr/>
+        </p:nvSpPr>
+        <p:spPr>
+          <a:xfrm>
+            <a:off x="555246" y="2819835"/>
+            <a:ext cx="12332894" cy="6322244"/>
+          </a:xfrm>
+          <a:prstGeom prst="rect">
+            <a:avLst/>
+          </a:prstGeom>
+          <a:ln w="3175">
+            <a:miter lim="400000"/>
+          </a:ln>
+          <a:extLst>
+            <a:ext uri="{C572A759-6A51-4108-AA02-DFA0A04FC94B}">
+              <ma14:wrappingTextBoxFlag xmlns:ma14="http://schemas.microsoft.com/office/mac/drawingml/2011/main" xmlns:a14="http://schemas.microsoft.com/office/drawing/2010/main" xmlns:m="http://schemas.openxmlformats.org/officeDocument/2006/math" xmlns="" val="1"/>
+            </a:ext>
+          </a:extLst>
+        </p:spPr>
+        <p:txBody>
+          <a:bodyPr lIns="38100" tIns="38100" rIns="38100" bIns="38100" anchor="ctr">
+            <a:spAutoFit/>
+          </a:bodyPr>
+          <a:lstStyle/>
+          <a:p>
+            <a:pPr algn="l" defTabSz="457200">
+              <a:spcBef>
+                <a:spcPts val="500"/>
+              </a:spcBef>
+              <a:defRPr sz="3500">
+                <a:latin typeface="Helvetica"/>
+                <a:ea typeface="Helvetica"/>
+                <a:cs typeface="Helvetica"/>
+                <a:sym typeface="Helvetica"/>
+              </a:defRPr>
+            </a:pPr>
+            <a:r>
+              <a:rPr dirty="0"/>
+              <a:t>when using </a:t>
+            </a:r>
+            <a:r>
+              <a:rPr lang="en-CA" dirty="0"/>
+              <a:t>loop</a:t>
+            </a:r>
+            <a:r>
+              <a:rPr dirty="0"/>
+              <a:t>, we need to use “</a:t>
+            </a:r>
+            <a:r>
+              <a:rPr b="1" dirty="0"/>
+              <a:t>break"</a:t>
+            </a:r>
+            <a:r>
+              <a:rPr dirty="0"/>
+              <a:t> to break the loop as soon as a certain condition is met</a:t>
+            </a:r>
+          </a:p>
+          <a:p>
+            <a:pPr algn="l" defTabSz="457200">
+              <a:spcBef>
+                <a:spcPts val="500"/>
+              </a:spcBef>
+              <a:defRPr sz="3500">
+                <a:latin typeface="Helvetica"/>
+                <a:ea typeface="Helvetica"/>
+                <a:cs typeface="Helvetica"/>
+                <a:sym typeface="Helvetica"/>
+              </a:defRPr>
+            </a:pPr>
+            <a:endParaRPr dirty="0"/>
+          </a:p>
+          <a:p>
+            <a:pPr algn="l" defTabSz="457200">
+              <a:tabLst>
+                <a:tab pos="571500" algn="l"/>
+                <a:tab pos="1155700" algn="l"/>
+                <a:tab pos="1739900" algn="l"/>
+                <a:tab pos="2324100" algn="l"/>
+                <a:tab pos="2908300" algn="l"/>
+                <a:tab pos="3479800" algn="l"/>
+                <a:tab pos="4064000" algn="l"/>
+                <a:tab pos="4648200" algn="l"/>
+                <a:tab pos="5232400" algn="l"/>
+                <a:tab pos="5816600" algn="l"/>
+                <a:tab pos="6388100" algn="l"/>
+                <a:tab pos="6972300" algn="l"/>
+                <a:tab pos="7556500" algn="l"/>
+                <a:tab pos="8140700" algn="l"/>
+                <a:tab pos="8724900" algn="l"/>
+                <a:tab pos="9296400" algn="l"/>
+              </a:tabLst>
+              <a:defRPr sz="3500">
+                <a:solidFill>
+                  <a:schemeClr val="accent1">
+                    <a:hueOff val="47394"/>
+                    <a:satOff val="-25753"/>
+                    <a:lumOff val="-7544"/>
+                  </a:schemeClr>
+                </a:solidFill>
+                <a:latin typeface="Consolas"/>
+                <a:ea typeface="Consolas"/>
+                <a:cs typeface="Consolas"/>
+                <a:sym typeface="Consolas"/>
+              </a:defRPr>
+            </a:pPr>
+            <a:r>
+              <a:rPr dirty="0"/>
+              <a:t>number = 0</a:t>
+            </a:r>
+          </a:p>
+          <a:p>
+            <a:pPr algn="l" defTabSz="457200">
+              <a:tabLst>
+                <a:tab pos="571500" algn="l"/>
+                <a:tab pos="1155700" algn="l"/>
+                <a:tab pos="1739900" algn="l"/>
+                <a:tab pos="2324100" algn="l"/>
+                <a:tab pos="2908300" algn="l"/>
+                <a:tab pos="3479800" algn="l"/>
+                <a:tab pos="4064000" algn="l"/>
+                <a:tab pos="4648200" algn="l"/>
+                <a:tab pos="5232400" algn="l"/>
+                <a:tab pos="5816600" algn="l"/>
+                <a:tab pos="6388100" algn="l"/>
+                <a:tab pos="6972300" algn="l"/>
+                <a:tab pos="7556500" algn="l"/>
+                <a:tab pos="8140700" algn="l"/>
+                <a:tab pos="8724900" algn="l"/>
+                <a:tab pos="9296400" algn="l"/>
+              </a:tabLst>
+              <a:defRPr sz="3500">
+                <a:solidFill>
+                  <a:schemeClr val="accent1">
+                    <a:hueOff val="47394"/>
+                    <a:satOff val="-25753"/>
+                    <a:lumOff val="-7544"/>
+                  </a:schemeClr>
+                </a:solidFill>
+                <a:latin typeface="Consolas"/>
+                <a:ea typeface="Consolas"/>
+                <a:cs typeface="Consolas"/>
+                <a:sym typeface="Consolas"/>
+              </a:defRPr>
+            </a:pPr>
+            <a:endParaRPr dirty="0"/>
+          </a:p>
+          <a:p>
+            <a:pPr algn="l" defTabSz="457200">
+              <a:spcBef>
+                <a:spcPts val="500"/>
+              </a:spcBef>
+              <a:defRPr sz="3500">
+                <a:solidFill>
+                  <a:schemeClr val="accent1">
+                    <a:hueOff val="47394"/>
+                    <a:satOff val="-25753"/>
+                    <a:lumOff val="-7544"/>
+                  </a:schemeClr>
+                </a:solidFill>
+                <a:latin typeface="Consolas"/>
+                <a:ea typeface="Consolas"/>
+                <a:cs typeface="Consolas"/>
+                <a:sym typeface="Consolas"/>
+              </a:defRPr>
+            </a:pPr>
+            <a:r>
+              <a:rPr dirty="0"/>
+              <a:t>loop do</a:t>
+            </a:r>
+          </a:p>
+          <a:p>
+            <a:pPr algn="l" defTabSz="457200">
+              <a:spcBef>
+                <a:spcPts val="500"/>
+              </a:spcBef>
+              <a:defRPr sz="3500">
+                <a:solidFill>
+                  <a:schemeClr val="accent1">
+                    <a:hueOff val="47394"/>
+                    <a:satOff val="-25753"/>
+                    <a:lumOff val="-7544"/>
+                  </a:schemeClr>
+                </a:solidFill>
+                <a:latin typeface="Consolas"/>
+                <a:ea typeface="Consolas"/>
+                <a:cs typeface="Consolas"/>
+                <a:sym typeface="Consolas"/>
+              </a:defRPr>
+            </a:pPr>
+            <a:r>
+              <a:rPr dirty="0"/>
+              <a:t>     number += 1</a:t>
+            </a:r>
+          </a:p>
+          <a:p>
+            <a:pPr algn="l" defTabSz="457200">
+              <a:spcBef>
+                <a:spcPts val="500"/>
+              </a:spcBef>
+              <a:defRPr sz="3500">
+                <a:solidFill>
+                  <a:schemeClr val="accent1">
+                    <a:hueOff val="47394"/>
+                    <a:satOff val="-25753"/>
+                    <a:lumOff val="-7544"/>
+                  </a:schemeClr>
+                </a:solidFill>
+                <a:latin typeface="Consolas"/>
+                <a:ea typeface="Consolas"/>
+                <a:cs typeface="Consolas"/>
+                <a:sym typeface="Consolas"/>
+              </a:defRPr>
+            </a:pPr>
+            <a:r>
+              <a:rPr dirty="0"/>
+              <a:t>     print number</a:t>
+            </a:r>
+          </a:p>
+          <a:p>
+            <a:pPr algn="l" defTabSz="457200">
+              <a:spcBef>
+                <a:spcPts val="500"/>
+              </a:spcBef>
+              <a:defRPr sz="3500">
+                <a:solidFill>
+                  <a:schemeClr val="accent1">
+                    <a:hueOff val="47394"/>
+                    <a:satOff val="-25753"/>
+                    <a:lumOff val="-7544"/>
+                  </a:schemeClr>
+                </a:solidFill>
+                <a:latin typeface="Consolas"/>
+                <a:ea typeface="Consolas"/>
+                <a:cs typeface="Consolas"/>
+                <a:sym typeface="Consolas"/>
+              </a:defRPr>
+            </a:pPr>
+            <a:r>
+              <a:rPr dirty="0"/>
+              <a:t>     break if number &gt; 5</a:t>
+            </a:r>
+          </a:p>
+          <a:p>
+            <a:pPr algn="l" defTabSz="457200">
+              <a:defRPr sz="3500">
+                <a:solidFill>
+                  <a:srgbClr val="C0C0C0"/>
+                </a:solidFill>
+                <a:latin typeface="Helvetica"/>
+                <a:ea typeface="Helvetica"/>
+                <a:cs typeface="Helvetica"/>
+                <a:sym typeface="Helvetica"/>
+              </a:defRPr>
+            </a:pPr>
+            <a:r>
+              <a:rPr dirty="0">
+                <a:solidFill>
+                  <a:schemeClr val="accent1">
+                    <a:hueOff val="47394"/>
+                    <a:satOff val="-25753"/>
+                    <a:lumOff val="-7544"/>
+                  </a:schemeClr>
+                </a:solidFill>
+                <a:latin typeface="Consolas"/>
+                <a:ea typeface="Consolas"/>
+                <a:cs typeface="Consolas"/>
+                <a:sym typeface="Consolas"/>
+              </a:rPr>
+              <a:t>end</a:t>
+            </a:r>
+            <a:r>
+              <a:rPr dirty="0"/>
+              <a:t>    </a:t>
+            </a:r>
+            <a:endParaRPr lang="en-CA" dirty="0"/>
+          </a:p>
+          <a:p>
+            <a:pPr algn="l" defTabSz="457200">
+              <a:defRPr sz="3500">
+                <a:solidFill>
+                  <a:srgbClr val="C0C0C0"/>
+                </a:solidFill>
+                <a:latin typeface="Helvetica"/>
+                <a:ea typeface="Helvetica"/>
+                <a:cs typeface="Helvetica"/>
+                <a:sym typeface="Helvetica"/>
+              </a:defRPr>
+            </a:pPr>
+            <a:r>
+              <a:rPr dirty="0">
+                <a:solidFill>
+                  <a:srgbClr val="363636"/>
+                </a:solidFill>
+              </a:rPr>
+              <a:t>(the loop stops after printing the numbers </a:t>
+            </a:r>
+            <a:r>
+              <a:rPr lang="en-CA" dirty="0">
+                <a:solidFill>
+                  <a:srgbClr val="363636"/>
+                </a:solidFill>
+              </a:rPr>
+              <a:t>after 5</a:t>
+            </a:r>
+            <a:r>
+              <a:rPr dirty="0">
+                <a:solidFill>
+                  <a:srgbClr val="363636"/>
+                </a:solidFill>
+              </a:rPr>
+              <a:t>)</a:t>
+            </a:r>
+          </a:p>
+        </p:txBody>
+      </p:sp>
+    </p:spTree>
+  </p:cSld>
+  <p:clrMapOvr>
+    <a:masterClrMapping/>
+  </p:clrMapOvr>
+  <p:transition spd="med"/>
 </p:sld>
 </file>
 
 <file path=ppt/theme/theme1.xml><?xml version="1.0" encoding="utf-8"?>
-<a:theme xmlns:a="http://schemas.openxmlformats.org/drawingml/2006/main" xmlns:r="http://schemas.openxmlformats.org/officeDocument/2006/relationships" name="White">
+<a:theme xmlns:a="http://schemas.openxmlformats.org/drawingml/2006/main" name="White">
   <a:themeElements>
     <a:clrScheme name="White">
       <a:dk1>
@@ -6520,7 +6632,7 @@
       <a:effectStyleLst>
         <a:effectStyle>
           <a:effectLst>
-            <a:outerShdw sx="100000" sy="100000" kx="0" ky="0" algn="b" rotWithShape="0" blurRad="25400" dist="12700" dir="5400000">
+            <a:outerShdw blurRad="25400" dist="12700" dir="5400000" rotWithShape="0">
               <a:srgbClr val="000000">
                 <a:alpha val="50000"/>
               </a:srgbClr>
@@ -6529,7 +6641,7 @@
         </a:effectStyle>
         <a:effectStyle>
           <a:effectLst>
-            <a:outerShdw sx="100000" sy="100000" kx="0" ky="0" algn="b" rotWithShape="0" blurRad="25400" dist="0" dir="0">
+            <a:outerShdw blurRad="25400" rotWithShape="0">
               <a:srgbClr val="000000">
                 <a:alpha val="50000"/>
               </a:srgbClr>
@@ -6538,7 +6650,7 @@
         </a:effectStyle>
         <a:effectStyle>
           <a:effectLst>
-            <a:outerShdw sx="100000" sy="100000" kx="0" ky="0" algn="b" rotWithShape="0" blurRad="25400" dist="12700" dir="5400000">
+            <a:outerShdw blurRad="25400" dist="12700" dir="5400000" rotWithShape="0">
               <a:srgbClr val="000000">
                 <a:alpha val="50000"/>
               </a:srgbClr>
@@ -6602,8 +6714,8 @@
     <a:spDef>
       <a:spPr>
         <a:blipFill rotWithShape="1">
-          <a:blip r:embed="rId1"/>
-          <a:srcRect l="0" t="0" r="0" b="0"/>
+          <a:blip xmlns:r="http://schemas.openxmlformats.org/officeDocument/2006/relationships" r:embed="rId1"/>
+          <a:srcRect/>
           <a:tile tx="0" ty="0" sx="100000" sy="100000" flip="none" algn="tl"/>
         </a:blipFill>
         <a:ln w="3175" cap="flat">
@@ -6611,7 +6723,7 @@
           <a:miter lim="400000"/>
         </a:ln>
         <a:effectLst>
-          <a:outerShdw sx="100000" sy="100000" kx="0" ky="0" algn="b" rotWithShape="0" blurRad="25400" dist="12700" dir="5400000">
+          <a:outerShdw blurRad="25400" dist="12700" dir="5400000" rotWithShape="0">
             <a:srgbClr val="000000">
               <a:alpha val="50000"/>
             </a:srgbClr>
@@ -6619,7 +6731,7 @@
         </a:effectLst>
         <a:sp3d/>
       </a:spPr>
-      <a:bodyPr rot="0" spcFirstLastPara="1" vertOverflow="overflow" horzOverflow="overflow" vert="horz" wrap="square" lIns="38100" tIns="38100" rIns="38100" bIns="38100" numCol="1" spcCol="38100" rtlCol="0" anchor="ctr" upright="0">
+      <a:bodyPr rot="0" spcFirstLastPara="1" vertOverflow="overflow" horzOverflow="overflow" vert="horz" wrap="square" lIns="38100" tIns="38100" rIns="38100" bIns="38100" numCol="1" spcCol="38100" rtlCol="0" anchor="ctr">
         <a:spAutoFit/>
       </a:bodyPr>
       <a:lstStyle>
@@ -6638,7 +6750,7 @@
           <a:buFontTx/>
           <a:buNone/>
           <a:tabLst/>
-          <a:defRPr b="0" baseline="0" cap="none" i="0" spc="0" strike="noStrike" sz="2200" u="none" kumimoji="0" normalizeH="0">
+          <a:defRPr kumimoji="0" sz="2200" b="0" i="0" u="none" strike="noStrike" cap="none" spc="0" normalizeH="0" baseline="0">
             <a:ln>
               <a:noFill/>
             </a:ln>
@@ -6668,7 +6780,7 @@
           <a:buFontTx/>
           <a:buNone/>
           <a:tabLst/>
-          <a:defRPr b="0" baseline="0" cap="none" i="0" spc="0" strike="noStrike" sz="1800" u="none" kumimoji="0" normalizeH="0">
+          <a:defRPr kumimoji="0" sz="1800" b="0" i="0" u="none" strike="noStrike" cap="none" spc="0" normalizeH="0" baseline="0">
             <a:ln>
               <a:noFill/>
             </a:ln>
@@ -6694,7 +6806,7 @@
           <a:buFontTx/>
           <a:buNone/>
           <a:tabLst/>
-          <a:defRPr b="0" baseline="0" cap="none" i="0" spc="0" strike="noStrike" sz="1800" u="none" kumimoji="0" normalizeH="0">
+          <a:defRPr kumimoji="0" sz="1800" b="0" i="0" u="none" strike="noStrike" cap="none" spc="0" normalizeH="0" baseline="0">
             <a:ln>
               <a:noFill/>
             </a:ln>
@@ -6720,7 +6832,7 @@
           <a:buFontTx/>
           <a:buNone/>
           <a:tabLst/>
-          <a:defRPr b="0" baseline="0" cap="none" i="0" spc="0" strike="noStrike" sz="1800" u="none" kumimoji="0" normalizeH="0">
+          <a:defRPr kumimoji="0" sz="1800" b="0" i="0" u="none" strike="noStrike" cap="none" spc="0" normalizeH="0" baseline="0">
             <a:ln>
               <a:noFill/>
             </a:ln>
@@ -6746,7 +6858,7 @@
           <a:buFontTx/>
           <a:buNone/>
           <a:tabLst/>
-          <a:defRPr b="0" baseline="0" cap="none" i="0" spc="0" strike="noStrike" sz="1800" u="none" kumimoji="0" normalizeH="0">
+          <a:defRPr kumimoji="0" sz="1800" b="0" i="0" u="none" strike="noStrike" cap="none" spc="0" normalizeH="0" baseline="0">
             <a:ln>
               <a:noFill/>
             </a:ln>
@@ -6772,7 +6884,7 @@
           <a:buFontTx/>
           <a:buNone/>
           <a:tabLst/>
-          <a:defRPr b="0" baseline="0" cap="none" i="0" spc="0" strike="noStrike" sz="1800" u="none" kumimoji="0" normalizeH="0">
+          <a:defRPr kumimoji="0" sz="1800" b="0" i="0" u="none" strike="noStrike" cap="none" spc="0" normalizeH="0" baseline="0">
             <a:ln>
               <a:noFill/>
             </a:ln>
@@ -6798,7 +6910,7 @@
           <a:buFontTx/>
           <a:buNone/>
           <a:tabLst/>
-          <a:defRPr b="0" baseline="0" cap="none" i="0" spc="0" strike="noStrike" sz="1800" u="none" kumimoji="0" normalizeH="0">
+          <a:defRPr kumimoji="0" sz="1800" b="0" i="0" u="none" strike="noStrike" cap="none" spc="0" normalizeH="0" baseline="0">
             <a:ln>
               <a:noFill/>
             </a:ln>
@@ -6824,7 +6936,7 @@
           <a:buFontTx/>
           <a:buNone/>
           <a:tabLst/>
-          <a:defRPr b="0" baseline="0" cap="none" i="0" spc="0" strike="noStrike" sz="1800" u="none" kumimoji="0" normalizeH="0">
+          <a:defRPr kumimoji="0" sz="1800" b="0" i="0" u="none" strike="noStrike" cap="none" spc="0" normalizeH="0" baseline="0">
             <a:ln>
               <a:noFill/>
             </a:ln>
@@ -6850,7 +6962,7 @@
           <a:buFontTx/>
           <a:buNone/>
           <a:tabLst/>
-          <a:defRPr b="0" baseline="0" cap="none" i="0" spc="0" strike="noStrike" sz="1800" u="none" kumimoji="0" normalizeH="0">
+          <a:defRPr kumimoji="0" sz="1800" b="0" i="0" u="none" strike="noStrike" cap="none" spc="0" normalizeH="0" baseline="0">
             <a:ln>
               <a:noFill/>
             </a:ln>
@@ -6876,7 +6988,7 @@
           <a:buFontTx/>
           <a:buNone/>
           <a:tabLst/>
-          <a:defRPr b="0" baseline="0" cap="none" i="0" spc="0" strike="noStrike" sz="1800" u="none" kumimoji="0" normalizeH="0">
+          <a:defRPr kumimoji="0" sz="1800" b="0" i="0" u="none" strike="noStrike" cap="none" spc="0" normalizeH="0" baseline="0">
             <a:ln>
               <a:noFill/>
             </a:ln>
@@ -6889,9 +7001,15 @@
         </a:lvl9pPr>
       </a:lstStyle>
       <a:style>
-        <a:lnRef idx="0"/>
-        <a:fillRef idx="0"/>
-        <a:effectRef idx="0"/>
+        <a:lnRef idx="0">
+          <a:scrgbClr r="0" g="0" b="0"/>
+        </a:lnRef>
+        <a:fillRef idx="0">
+          <a:scrgbClr r="0" g="0" b="0"/>
+        </a:fillRef>
+        <a:effectRef idx="0">
+          <a:scrgbClr r="0" g="0" b="0"/>
+        </a:effectRef>
         <a:fontRef idx="none"/>
       </a:style>
     </a:spDef>
@@ -6908,7 +7026,7 @@
         <a:effectLst/>
         <a:sp3d/>
       </a:spPr>
-      <a:bodyPr rot="0" spcFirstLastPara="1" vertOverflow="overflow" horzOverflow="overflow" vert="horz" wrap="square" lIns="91439" tIns="45719" rIns="91439" bIns="45719" numCol="1" spcCol="38100" rtlCol="0" anchor="t" upright="0">
+      <a:bodyPr rot="0" spcFirstLastPara="1" vertOverflow="overflow" horzOverflow="overflow" vert="horz" wrap="square" lIns="91439" tIns="45719" rIns="91439" bIns="45719" numCol="1" spcCol="38100" rtlCol="0" anchor="t">
         <a:noAutofit/>
       </a:bodyPr>
       <a:lstStyle>
@@ -6927,7 +7045,7 @@
           <a:buFontTx/>
           <a:buNone/>
           <a:tabLst/>
-          <a:defRPr b="0" baseline="0" cap="none" i="0" spc="0" strike="noStrike" sz="1800" u="none" kumimoji="0" normalizeH="0">
+          <a:defRPr kumimoji="0" sz="1800" b="0" i="0" u="none" strike="noStrike" cap="none" spc="0" normalizeH="0" baseline="0">
             <a:ln>
               <a:noFill/>
             </a:ln>
@@ -6953,7 +7071,7 @@
           <a:buFontTx/>
           <a:buNone/>
           <a:tabLst/>
-          <a:defRPr b="0" baseline="0" cap="none" i="0" spc="0" strike="noStrike" sz="1800" u="none" kumimoji="0" normalizeH="0">
+          <a:defRPr kumimoji="0" sz="1800" b="0" i="0" u="none" strike="noStrike" cap="none" spc="0" normalizeH="0" baseline="0">
             <a:ln>
               <a:noFill/>
             </a:ln>
@@ -6979,7 +7097,7 @@
           <a:buFontTx/>
           <a:buNone/>
           <a:tabLst/>
-          <a:defRPr b="0" baseline="0" cap="none" i="0" spc="0" strike="noStrike" sz="1800" u="none" kumimoji="0" normalizeH="0">
+          <a:defRPr kumimoji="0" sz="1800" b="0" i="0" u="none" strike="noStrike" cap="none" spc="0" normalizeH="0" baseline="0">
             <a:ln>
               <a:noFill/>
             </a:ln>
@@ -7005,7 +7123,7 @@
           <a:buFontTx/>
           <a:buNone/>
           <a:tabLst/>
-          <a:defRPr b="0" baseline="0" cap="none" i="0" spc="0" strike="noStrike" sz="1800" u="none" kumimoji="0" normalizeH="0">
+          <a:defRPr kumimoji="0" sz="1800" b="0" i="0" u="none" strike="noStrike" cap="none" spc="0" normalizeH="0" baseline="0">
             <a:ln>
               <a:noFill/>
             </a:ln>
@@ -7031,7 +7149,7 @@
           <a:buFontTx/>
           <a:buNone/>
           <a:tabLst/>
-          <a:defRPr b="0" baseline="0" cap="none" i="0" spc="0" strike="noStrike" sz="1800" u="none" kumimoji="0" normalizeH="0">
+          <a:defRPr kumimoji="0" sz="1800" b="0" i="0" u="none" strike="noStrike" cap="none" spc="0" normalizeH="0" baseline="0">
             <a:ln>
               <a:noFill/>
             </a:ln>
@@ -7057,7 +7175,7 @@
           <a:buFontTx/>
           <a:buNone/>
           <a:tabLst/>
-          <a:defRPr b="0" baseline="0" cap="none" i="0" spc="0" strike="noStrike" sz="1800" u="none" kumimoji="0" normalizeH="0">
+          <a:defRPr kumimoji="0" sz="1800" b="0" i="0" u="none" strike="noStrike" cap="none" spc="0" normalizeH="0" baseline="0">
             <a:ln>
               <a:noFill/>
             </a:ln>
@@ -7083,7 +7201,7 @@
           <a:buFontTx/>
           <a:buNone/>
           <a:tabLst/>
-          <a:defRPr b="0" baseline="0" cap="none" i="0" spc="0" strike="noStrike" sz="1800" u="none" kumimoji="0" normalizeH="0">
+          <a:defRPr kumimoji="0" sz="1800" b="0" i="0" u="none" strike="noStrike" cap="none" spc="0" normalizeH="0" baseline="0">
             <a:ln>
               <a:noFill/>
             </a:ln>
@@ -7109,7 +7227,7 @@
           <a:buFontTx/>
           <a:buNone/>
           <a:tabLst/>
-          <a:defRPr b="0" baseline="0" cap="none" i="0" spc="0" strike="noStrike" sz="1800" u="none" kumimoji="0" normalizeH="0">
+          <a:defRPr kumimoji="0" sz="1800" b="0" i="0" u="none" strike="noStrike" cap="none" spc="0" normalizeH="0" baseline="0">
             <a:ln>
               <a:noFill/>
             </a:ln>
@@ -7135,7 +7253,7 @@
           <a:buFontTx/>
           <a:buNone/>
           <a:tabLst/>
-          <a:defRPr b="0" baseline="0" cap="none" i="0" spc="0" strike="noStrike" sz="1800" u="none" kumimoji="0" normalizeH="0">
+          <a:defRPr kumimoji="0" sz="1800" b="0" i="0" u="none" strike="noStrike" cap="none" spc="0" normalizeH="0" baseline="0">
             <a:ln>
               <a:noFill/>
             </a:ln>
@@ -7161,7 +7279,7 @@
           <a:buFontTx/>
           <a:buNone/>
           <a:tabLst/>
-          <a:defRPr b="0" baseline="0" cap="none" i="0" spc="0" strike="noStrike" sz="1800" u="none" kumimoji="0" normalizeH="0">
+          <a:defRPr kumimoji="0" sz="1800" b="0" i="0" u="none" strike="noStrike" cap="none" spc="0" normalizeH="0" baseline="0">
             <a:ln>
               <a:noFill/>
             </a:ln>
@@ -7174,9 +7292,15 @@
         </a:lvl9pPr>
       </a:lstStyle>
       <a:style>
-        <a:lnRef idx="0"/>
-        <a:fillRef idx="0"/>
-        <a:effectRef idx="0"/>
+        <a:lnRef idx="0">
+          <a:scrgbClr r="0" g="0" b="0"/>
+        </a:lnRef>
+        <a:fillRef idx="0">
+          <a:scrgbClr r="0" g="0" b="0"/>
+        </a:fillRef>
+        <a:effectRef idx="0">
+          <a:scrgbClr r="0" g="0" b="0"/>
+        </a:effectRef>
         <a:fontRef idx="none"/>
       </a:style>
     </a:lnDef>
@@ -7190,7 +7314,7 @@
         <a:effectLst/>
         <a:sp3d/>
       </a:spPr>
-      <a:bodyPr rot="0" spcFirstLastPara="1" vertOverflow="overflow" horzOverflow="overflow" vert="horz" wrap="square" lIns="38100" tIns="38100" rIns="38100" bIns="38100" numCol="1" spcCol="38100" rtlCol="0" anchor="ctr" upright="0">
+      <a:bodyPr rot="0" spcFirstLastPara="1" vertOverflow="overflow" horzOverflow="overflow" vert="horz" wrap="square" lIns="38100" tIns="38100" rIns="38100" bIns="38100" numCol="1" spcCol="38100" rtlCol="0" anchor="ctr">
         <a:spAutoFit/>
       </a:bodyPr>
       <a:lstStyle>
@@ -7209,7 +7333,7 @@
           <a:buFontTx/>
           <a:buNone/>
           <a:tabLst/>
-          <a:defRPr b="0" baseline="0" cap="none" i="0" spc="0" strike="noStrike" sz="5800" u="none" kumimoji="0" normalizeH="0">
+          <a:defRPr kumimoji="0" sz="5800" b="0" i="0" u="none" strike="noStrike" cap="none" spc="0" normalizeH="0" baseline="0">
             <a:ln>
               <a:noFill/>
             </a:ln>
@@ -7239,7 +7363,7 @@
           <a:buFontTx/>
           <a:buNone/>
           <a:tabLst/>
-          <a:defRPr b="0" baseline="0" cap="none" i="0" spc="0" strike="noStrike" sz="1800" u="none" kumimoji="0" normalizeH="0">
+          <a:defRPr kumimoji="0" sz="1800" b="0" i="0" u="none" strike="noStrike" cap="none" spc="0" normalizeH="0" baseline="0">
             <a:ln>
               <a:noFill/>
             </a:ln>
@@ -7265,7 +7389,7 @@
           <a:buFontTx/>
           <a:buNone/>
           <a:tabLst/>
-          <a:defRPr b="0" baseline="0" cap="none" i="0" spc="0" strike="noStrike" sz="1800" u="none" kumimoji="0" normalizeH="0">
+          <a:defRPr kumimoji="0" sz="1800" b="0" i="0" u="none" strike="noStrike" cap="none" spc="0" normalizeH="0" baseline="0">
             <a:ln>
               <a:noFill/>
             </a:ln>
@@ -7291,7 +7415,7 @@
           <a:buFontTx/>
           <a:buNone/>
           <a:tabLst/>
-          <a:defRPr b="0" baseline="0" cap="none" i="0" spc="0" strike="noStrike" sz="1800" u="none" kumimoji="0" normalizeH="0">
+          <a:defRPr kumimoji="0" sz="1800" b="0" i="0" u="none" strike="noStrike" cap="none" spc="0" normalizeH="0" baseline="0">
             <a:ln>
               <a:noFill/>
             </a:ln>
@@ -7317,7 +7441,7 @@
           <a:buFontTx/>
           <a:buNone/>
           <a:tabLst/>
-          <a:defRPr b="0" baseline="0" cap="none" i="0" spc="0" strike="noStrike" sz="1800" u="none" kumimoji="0" normalizeH="0">
+          <a:defRPr kumimoji="0" sz="1800" b="0" i="0" u="none" strike="noStrike" cap="none" spc="0" normalizeH="0" baseline="0">
             <a:ln>
               <a:noFill/>
             </a:ln>
@@ -7343,7 +7467,7 @@
           <a:buFontTx/>
           <a:buNone/>
           <a:tabLst/>
-          <a:defRPr b="0" baseline="0" cap="none" i="0" spc="0" strike="noStrike" sz="1800" u="none" kumimoji="0" normalizeH="0">
+          <a:defRPr kumimoji="0" sz="1800" b="0" i="0" u="none" strike="noStrike" cap="none" spc="0" normalizeH="0" baseline="0">
             <a:ln>
               <a:noFill/>
             </a:ln>
@@ -7369,7 +7493,7 @@
           <a:buFontTx/>
           <a:buNone/>
           <a:tabLst/>
-          <a:defRPr b="0" baseline="0" cap="none" i="0" spc="0" strike="noStrike" sz="1800" u="none" kumimoji="0" normalizeH="0">
+          <a:defRPr kumimoji="0" sz="1800" b="0" i="0" u="none" strike="noStrike" cap="none" spc="0" normalizeH="0" baseline="0">
             <a:ln>
               <a:noFill/>
             </a:ln>
@@ -7395,7 +7519,7 @@
           <a:buFontTx/>
           <a:buNone/>
           <a:tabLst/>
-          <a:defRPr b="0" baseline="0" cap="none" i="0" spc="0" strike="noStrike" sz="1800" u="none" kumimoji="0" normalizeH="0">
+          <a:defRPr kumimoji="0" sz="1800" b="0" i="0" u="none" strike="noStrike" cap="none" spc="0" normalizeH="0" baseline="0">
             <a:ln>
               <a:noFill/>
             </a:ln>
@@ -7421,7 +7545,7 @@
           <a:buFontTx/>
           <a:buNone/>
           <a:tabLst/>
-          <a:defRPr b="0" baseline="0" cap="none" i="0" spc="0" strike="noStrike" sz="1800" u="none" kumimoji="0" normalizeH="0">
+          <a:defRPr kumimoji="0" sz="1800" b="0" i="0" u="none" strike="noStrike" cap="none" spc="0" normalizeH="0" baseline="0">
             <a:ln>
               <a:noFill/>
             </a:ln>
@@ -7447,7 +7571,7 @@
           <a:buFontTx/>
           <a:buNone/>
           <a:tabLst/>
-          <a:defRPr b="0" baseline="0" cap="none" i="0" spc="0" strike="noStrike" sz="1800" u="none" kumimoji="0" normalizeH="0">
+          <a:defRPr kumimoji="0" sz="1800" b="0" i="0" u="none" strike="noStrike" cap="none" spc="0" normalizeH="0" baseline="0">
             <a:ln>
               <a:noFill/>
             </a:ln>
@@ -7460,18 +7584,25 @@
         </a:lvl9pPr>
       </a:lstStyle>
       <a:style>
-        <a:lnRef idx="0"/>
-        <a:fillRef idx="0"/>
-        <a:effectRef idx="0"/>
+        <a:lnRef idx="0">
+          <a:scrgbClr r="0" g="0" b="0"/>
+        </a:lnRef>
+        <a:fillRef idx="0">
+          <a:scrgbClr r="0" g="0" b="0"/>
+        </a:fillRef>
+        <a:effectRef idx="0">
+          <a:scrgbClr r="0" g="0" b="0"/>
+        </a:effectRef>
         <a:fontRef idx="none"/>
       </a:style>
     </a:txDef>
   </a:objectDefaults>
+  <a:extraClrSchemeLst/>
 </a:theme>
 </file>
 
 <file path=ppt/theme/theme2.xml><?xml version="1.0" encoding="utf-8"?>
-<a:theme xmlns:a="http://schemas.openxmlformats.org/drawingml/2006/main" xmlns:r="http://schemas.openxmlformats.org/officeDocument/2006/relationships" name="White">
+<a:theme xmlns:a="http://schemas.openxmlformats.org/drawingml/2006/main" name="White">
   <a:themeElements>
     <a:clrScheme name="White">
       <a:dk1>
@@ -7597,7 +7728,7 @@
       <a:effectStyleLst>
         <a:effectStyle>
           <a:effectLst>
-            <a:outerShdw sx="100000" sy="100000" kx="0" ky="0" algn="b" rotWithShape="0" blurRad="25400" dist="12700" dir="5400000">
+            <a:outerShdw blurRad="25400" dist="12700" dir="5400000" rotWithShape="0">
               <a:srgbClr val="000000">
                 <a:alpha val="50000"/>
               </a:srgbClr>
@@ -7606,7 +7737,7 @@
         </a:effectStyle>
         <a:effectStyle>
           <a:effectLst>
-            <a:outerShdw sx="100000" sy="100000" kx="0" ky="0" algn="b" rotWithShape="0" blurRad="25400" dist="0" dir="0">
+            <a:outerShdw blurRad="25400" rotWithShape="0">
               <a:srgbClr val="000000">
                 <a:alpha val="50000"/>
               </a:srgbClr>
@@ -7615,7 +7746,7 @@
         </a:effectStyle>
         <a:effectStyle>
           <a:effectLst>
-            <a:outerShdw sx="100000" sy="100000" kx="0" ky="0" algn="b" rotWithShape="0" blurRad="25400" dist="12700" dir="5400000">
+            <a:outerShdw blurRad="25400" dist="12700" dir="5400000" rotWithShape="0">
               <a:srgbClr val="000000">
                 <a:alpha val="50000"/>
               </a:srgbClr>
@@ -7679,8 +7810,8 @@
     <a:spDef>
       <a:spPr>
         <a:blipFill rotWithShape="1">
-          <a:blip r:embed="rId1"/>
-          <a:srcRect l="0" t="0" r="0" b="0"/>
+          <a:blip xmlns:r="http://schemas.openxmlformats.org/officeDocument/2006/relationships" r:embed="rId1"/>
+          <a:srcRect/>
           <a:tile tx="0" ty="0" sx="100000" sy="100000" flip="none" algn="tl"/>
         </a:blipFill>
         <a:ln w="3175" cap="flat">
@@ -7688,7 +7819,7 @@
           <a:miter lim="400000"/>
         </a:ln>
         <a:effectLst>
-          <a:outerShdw sx="100000" sy="100000" kx="0" ky="0" algn="b" rotWithShape="0" blurRad="25400" dist="12700" dir="5400000">
+          <a:outerShdw blurRad="25400" dist="12700" dir="5400000" rotWithShape="0">
             <a:srgbClr val="000000">
               <a:alpha val="50000"/>
             </a:srgbClr>
@@ -7696,7 +7827,7 @@
         </a:effectLst>
         <a:sp3d/>
       </a:spPr>
-      <a:bodyPr rot="0" spcFirstLastPara="1" vertOverflow="overflow" horzOverflow="overflow" vert="horz" wrap="square" lIns="38100" tIns="38100" rIns="38100" bIns="38100" numCol="1" spcCol="38100" rtlCol="0" anchor="ctr" upright="0">
+      <a:bodyPr rot="0" spcFirstLastPara="1" vertOverflow="overflow" horzOverflow="overflow" vert="horz" wrap="square" lIns="38100" tIns="38100" rIns="38100" bIns="38100" numCol="1" spcCol="38100" rtlCol="0" anchor="ctr">
         <a:spAutoFit/>
       </a:bodyPr>
       <a:lstStyle>
@@ -7715,7 +7846,7 @@
           <a:buFontTx/>
           <a:buNone/>
           <a:tabLst/>
-          <a:defRPr b="0" baseline="0" cap="none" i="0" spc="0" strike="noStrike" sz="2200" u="none" kumimoji="0" normalizeH="0">
+          <a:defRPr kumimoji="0" sz="2200" b="0" i="0" u="none" strike="noStrike" cap="none" spc="0" normalizeH="0" baseline="0">
             <a:ln>
               <a:noFill/>
             </a:ln>
@@ -7745,7 +7876,7 @@
           <a:buFontTx/>
           <a:buNone/>
           <a:tabLst/>
-          <a:defRPr b="0" baseline="0" cap="none" i="0" spc="0" strike="noStrike" sz="1800" u="none" kumimoji="0" normalizeH="0">
+          <a:defRPr kumimoji="0" sz="1800" b="0" i="0" u="none" strike="noStrike" cap="none" spc="0" normalizeH="0" baseline="0">
             <a:ln>
               <a:noFill/>
             </a:ln>
@@ -7771,7 +7902,7 @@
           <a:buFontTx/>
           <a:buNone/>
           <a:tabLst/>
-          <a:defRPr b="0" baseline="0" cap="none" i="0" spc="0" strike="noStrike" sz="1800" u="none" kumimoji="0" normalizeH="0">
+          <a:defRPr kumimoji="0" sz="1800" b="0" i="0" u="none" strike="noStrike" cap="none" spc="0" normalizeH="0" baseline="0">
             <a:ln>
               <a:noFill/>
             </a:ln>
@@ -7797,7 +7928,7 @@
           <a:buFontTx/>
           <a:buNone/>
           <a:tabLst/>
-          <a:defRPr b="0" baseline="0" cap="none" i="0" spc="0" strike="noStrike" sz="1800" u="none" kumimoji="0" normalizeH="0">
+          <a:defRPr kumimoji="0" sz="1800" b="0" i="0" u="none" strike="noStrike" cap="none" spc="0" normalizeH="0" baseline="0">
             <a:ln>
               <a:noFill/>
             </a:ln>
@@ -7823,7 +7954,7 @@
           <a:buFontTx/>
           <a:buNone/>
           <a:tabLst/>
-          <a:defRPr b="0" baseline="0" cap="none" i="0" spc="0" strike="noStrike" sz="1800" u="none" kumimoji="0" normalizeH="0">
+          <a:defRPr kumimoji="0" sz="1800" b="0" i="0" u="none" strike="noStrike" cap="none" spc="0" normalizeH="0" baseline="0">
             <a:ln>
               <a:noFill/>
             </a:ln>
@@ -7849,7 +7980,7 @@
           <a:buFontTx/>
           <a:buNone/>
           <a:tabLst/>
-          <a:defRPr b="0" baseline="0" cap="none" i="0" spc="0" strike="noStrike" sz="1800" u="none" kumimoji="0" normalizeH="0">
+          <a:defRPr kumimoji="0" sz="1800" b="0" i="0" u="none" strike="noStrike" cap="none" spc="0" normalizeH="0" baseline="0">
             <a:ln>
               <a:noFill/>
             </a:ln>
@@ -7875,7 +8006,7 @@
           <a:buFontTx/>
           <a:buNone/>
           <a:tabLst/>
-          <a:defRPr b="0" baseline="0" cap="none" i="0" spc="0" strike="noStrike" sz="1800" u="none" kumimoji="0" normalizeH="0">
+          <a:defRPr kumimoji="0" sz="1800" b="0" i="0" u="none" strike="noStrike" cap="none" spc="0" normalizeH="0" baseline="0">
             <a:ln>
               <a:noFill/>
             </a:ln>
@@ -7901,7 +8032,7 @@
           <a:buFontTx/>
           <a:buNone/>
           <a:tabLst/>
-          <a:defRPr b="0" baseline="0" cap="none" i="0" spc="0" strike="noStrike" sz="1800" u="none" kumimoji="0" normalizeH="0">
+          <a:defRPr kumimoji="0" sz="1800" b="0" i="0" u="none" strike="noStrike" cap="none" spc="0" normalizeH="0" baseline="0">
             <a:ln>
               <a:noFill/>
             </a:ln>
@@ -7927,7 +8058,7 @@
           <a:buFontTx/>
           <a:buNone/>
           <a:tabLst/>
-          <a:defRPr b="0" baseline="0" cap="none" i="0" spc="0" strike="noStrike" sz="1800" u="none" kumimoji="0" normalizeH="0">
+          <a:defRPr kumimoji="0" sz="1800" b="0" i="0" u="none" strike="noStrike" cap="none" spc="0" normalizeH="0" baseline="0">
             <a:ln>
               <a:noFill/>
             </a:ln>
@@ -7953,7 +8084,7 @@
           <a:buFontTx/>
           <a:buNone/>
           <a:tabLst/>
-          <a:defRPr b="0" baseline="0" cap="none" i="0" spc="0" strike="noStrike" sz="1800" u="none" kumimoji="0" normalizeH="0">
+          <a:defRPr kumimoji="0" sz="1800" b="0" i="0" u="none" strike="noStrike" cap="none" spc="0" normalizeH="0" baseline="0">
             <a:ln>
               <a:noFill/>
             </a:ln>
@@ -7966,9 +8097,15 @@
         </a:lvl9pPr>
       </a:lstStyle>
       <a:style>
-        <a:lnRef idx="0"/>
-        <a:fillRef idx="0"/>
-        <a:effectRef idx="0"/>
+        <a:lnRef idx="0">
+          <a:scrgbClr r="0" g="0" b="0"/>
+        </a:lnRef>
+        <a:fillRef idx="0">
+          <a:scrgbClr r="0" g="0" b="0"/>
+        </a:fillRef>
+        <a:effectRef idx="0">
+          <a:scrgbClr r="0" g="0" b="0"/>
+        </a:effectRef>
         <a:fontRef idx="none"/>
       </a:style>
     </a:spDef>
@@ -7985,7 +8122,7 @@
         <a:effectLst/>
         <a:sp3d/>
       </a:spPr>
-      <a:bodyPr rot="0" spcFirstLastPara="1" vertOverflow="overflow" horzOverflow="overflow" vert="horz" wrap="square" lIns="91439" tIns="45719" rIns="91439" bIns="45719" numCol="1" spcCol="38100" rtlCol="0" anchor="t" upright="0">
+      <a:bodyPr rot="0" spcFirstLastPara="1" vertOverflow="overflow" horzOverflow="overflow" vert="horz" wrap="square" lIns="91439" tIns="45719" rIns="91439" bIns="45719" numCol="1" spcCol="38100" rtlCol="0" anchor="t">
         <a:noAutofit/>
       </a:bodyPr>
       <a:lstStyle>
@@ -8004,7 +8141,7 @@
           <a:buFontTx/>
           <a:buNone/>
           <a:tabLst/>
-          <a:defRPr b="0" baseline="0" cap="none" i="0" spc="0" strike="noStrike" sz="1800" u="none" kumimoji="0" normalizeH="0">
+          <a:defRPr kumimoji="0" sz="1800" b="0" i="0" u="none" strike="noStrike" cap="none" spc="0" normalizeH="0" baseline="0">
             <a:ln>
               <a:noFill/>
             </a:ln>
@@ -8030,7 +8167,7 @@
           <a:buFontTx/>
           <a:buNone/>
           <a:tabLst/>
-          <a:defRPr b="0" baseline="0" cap="none" i="0" spc="0" strike="noStrike" sz="1800" u="none" kumimoji="0" normalizeH="0">
+          <a:defRPr kumimoji="0" sz="1800" b="0" i="0" u="none" strike="noStrike" cap="none" spc="0" normalizeH="0" baseline="0">
             <a:ln>
               <a:noFill/>
             </a:ln>
@@ -8056,7 +8193,7 @@
           <a:buFontTx/>
           <a:buNone/>
           <a:tabLst/>
-          <a:defRPr b="0" baseline="0" cap="none" i="0" spc="0" strike="noStrike" sz="1800" u="none" kumimoji="0" normalizeH="0">
+          <a:defRPr kumimoji="0" sz="1800" b="0" i="0" u="none" strike="noStrike" cap="none" spc="0" normalizeH="0" baseline="0">
             <a:ln>
               <a:noFill/>
             </a:ln>
@@ -8082,7 +8219,7 @@
           <a:buFontTx/>
           <a:buNone/>
           <a:tabLst/>
-          <a:defRPr b="0" baseline="0" cap="none" i="0" spc="0" strike="noStrike" sz="1800" u="none" kumimoji="0" normalizeH="0">
+          <a:defRPr kumimoji="0" sz="1800" b="0" i="0" u="none" strike="noStrike" cap="none" spc="0" normalizeH="0" baseline="0">
             <a:ln>
               <a:noFill/>
             </a:ln>
@@ -8108,7 +8245,7 @@
           <a:buFontTx/>
           <a:buNone/>
           <a:tabLst/>
-          <a:defRPr b="0" baseline="0" cap="none" i="0" spc="0" strike="noStrike" sz="1800" u="none" kumimoji="0" normalizeH="0">
+          <a:defRPr kumimoji="0" sz="1800" b="0" i="0" u="none" strike="noStrike" cap="none" spc="0" normalizeH="0" baseline="0">
             <a:ln>
               <a:noFill/>
             </a:ln>
@@ -8134,7 +8271,7 @@
           <a:buFontTx/>
           <a:buNone/>
           <a:tabLst/>
-          <a:defRPr b="0" baseline="0" cap="none" i="0" spc="0" strike="noStrike" sz="1800" u="none" kumimoji="0" normalizeH="0">
+          <a:defRPr kumimoji="0" sz="1800" b="0" i="0" u="none" strike="noStrike" cap="none" spc="0" normalizeH="0" baseline="0">
             <a:ln>
               <a:noFill/>
             </a:ln>
@@ -8160,7 +8297,7 @@
           <a:buFontTx/>
           <a:buNone/>
           <a:tabLst/>
-          <a:defRPr b="0" baseline="0" cap="none" i="0" spc="0" strike="noStrike" sz="1800" u="none" kumimoji="0" normalizeH="0">
+          <a:defRPr kumimoji="0" sz="1800" b="0" i="0" u="none" strike="noStrike" cap="none" spc="0" normalizeH="0" baseline="0">
             <a:ln>
               <a:noFill/>
             </a:ln>
@@ -8186,7 +8323,7 @@
           <a:buFontTx/>
           <a:buNone/>
           <a:tabLst/>
-          <a:defRPr b="0" baseline="0" cap="none" i="0" spc="0" strike="noStrike" sz="1800" u="none" kumimoji="0" normalizeH="0">
+          <a:defRPr kumimoji="0" sz="1800" b="0" i="0" u="none" strike="noStrike" cap="none" spc="0" normalizeH="0" baseline="0">
             <a:ln>
               <a:noFill/>
             </a:ln>
@@ -8212,7 +8349,7 @@
           <a:buFontTx/>
           <a:buNone/>
           <a:tabLst/>
-          <a:defRPr b="0" baseline="0" cap="none" i="0" spc="0" strike="noStrike" sz="1800" u="none" kumimoji="0" normalizeH="0">
+          <a:defRPr kumimoji="0" sz="1800" b="0" i="0" u="none" strike="noStrike" cap="none" spc="0" normalizeH="0" baseline="0">
             <a:ln>
               <a:noFill/>
             </a:ln>
@@ -8238,7 +8375,7 @@
           <a:buFontTx/>
           <a:buNone/>
           <a:tabLst/>
-          <a:defRPr b="0" baseline="0" cap="none" i="0" spc="0" strike="noStrike" sz="1800" u="none" kumimoji="0" normalizeH="0">
+          <a:defRPr kumimoji="0" sz="1800" b="0" i="0" u="none" strike="noStrike" cap="none" spc="0" normalizeH="0" baseline="0">
             <a:ln>
               <a:noFill/>
             </a:ln>
@@ -8251,9 +8388,15 @@
         </a:lvl9pPr>
       </a:lstStyle>
       <a:style>
-        <a:lnRef idx="0"/>
-        <a:fillRef idx="0"/>
-        <a:effectRef idx="0"/>
+        <a:lnRef idx="0">
+          <a:scrgbClr r="0" g="0" b="0"/>
+        </a:lnRef>
+        <a:fillRef idx="0">
+          <a:scrgbClr r="0" g="0" b="0"/>
+        </a:fillRef>
+        <a:effectRef idx="0">
+          <a:scrgbClr r="0" g="0" b="0"/>
+        </a:effectRef>
         <a:fontRef idx="none"/>
       </a:style>
     </a:lnDef>
@@ -8267,7 +8410,7 @@
         <a:effectLst/>
         <a:sp3d/>
       </a:spPr>
-      <a:bodyPr rot="0" spcFirstLastPara="1" vertOverflow="overflow" horzOverflow="overflow" vert="horz" wrap="square" lIns="38100" tIns="38100" rIns="38100" bIns="38100" numCol="1" spcCol="38100" rtlCol="0" anchor="ctr" upright="0">
+      <a:bodyPr rot="0" spcFirstLastPara="1" vertOverflow="overflow" horzOverflow="overflow" vert="horz" wrap="square" lIns="38100" tIns="38100" rIns="38100" bIns="38100" numCol="1" spcCol="38100" rtlCol="0" anchor="ctr">
         <a:spAutoFit/>
       </a:bodyPr>
       <a:lstStyle>
@@ -8286,7 +8429,7 @@
           <a:buFontTx/>
           <a:buNone/>
           <a:tabLst/>
-          <a:defRPr b="0" baseline="0" cap="none" i="0" spc="0" strike="noStrike" sz="5800" u="none" kumimoji="0" normalizeH="0">
+          <a:defRPr kumimoji="0" sz="5800" b="0" i="0" u="none" strike="noStrike" cap="none" spc="0" normalizeH="0" baseline="0">
             <a:ln>
               <a:noFill/>
             </a:ln>
@@ -8316,7 +8459,7 @@
           <a:buFontTx/>
           <a:buNone/>
           <a:tabLst/>
-          <a:defRPr b="0" baseline="0" cap="none" i="0" spc="0" strike="noStrike" sz="1800" u="none" kumimoji="0" normalizeH="0">
+          <a:defRPr kumimoji="0" sz="1800" b="0" i="0" u="none" strike="noStrike" cap="none" spc="0" normalizeH="0" baseline="0">
             <a:ln>
               <a:noFill/>
             </a:ln>
@@ -8342,7 +8485,7 @@
           <a:buFontTx/>
           <a:buNone/>
           <a:tabLst/>
-          <a:defRPr b="0" baseline="0" cap="none" i="0" spc="0" strike="noStrike" sz="1800" u="none" kumimoji="0" normalizeH="0">
+          <a:defRPr kumimoji="0" sz="1800" b="0" i="0" u="none" strike="noStrike" cap="none" spc="0" normalizeH="0" baseline="0">
             <a:ln>
               <a:noFill/>
             </a:ln>
@@ -8368,7 +8511,7 @@
           <a:buFontTx/>
           <a:buNone/>
           <a:tabLst/>
-          <a:defRPr b="0" baseline="0" cap="none" i="0" spc="0" strike="noStrike" sz="1800" u="none" kumimoji="0" normalizeH="0">
+          <a:defRPr kumimoji="0" sz="1800" b="0" i="0" u="none" strike="noStrike" cap="none" spc="0" normalizeH="0" baseline="0">
             <a:ln>
               <a:noFill/>
             </a:ln>
@@ -8394,7 +8537,7 @@
           <a:buFontTx/>
           <a:buNone/>
           <a:tabLst/>
-          <a:defRPr b="0" baseline="0" cap="none" i="0" spc="0" strike="noStrike" sz="1800" u="none" kumimoji="0" normalizeH="0">
+          <a:defRPr kumimoji="0" sz="1800" b="0" i="0" u="none" strike="noStrike" cap="none" spc="0" normalizeH="0" baseline="0">
             <a:ln>
               <a:noFill/>
             </a:ln>
@@ -8420,7 +8563,7 @@
           <a:buFontTx/>
           <a:buNone/>
           <a:tabLst/>
-          <a:defRPr b="0" baseline="0" cap="none" i="0" spc="0" strike="noStrike" sz="1800" u="none" kumimoji="0" normalizeH="0">
+          <a:defRPr kumimoji="0" sz="1800" b="0" i="0" u="none" strike="noStrike" cap="none" spc="0" normalizeH="0" baseline="0">
             <a:ln>
               <a:noFill/>
             </a:ln>
@@ -8446,7 +8589,7 @@
           <a:buFontTx/>
           <a:buNone/>
           <a:tabLst/>
-          <a:defRPr b="0" baseline="0" cap="none" i="0" spc="0" strike="noStrike" sz="1800" u="none" kumimoji="0" normalizeH="0">
+          <a:defRPr kumimoji="0" sz="1800" b="0" i="0" u="none" strike="noStrike" cap="none" spc="0" normalizeH="0" baseline="0">
             <a:ln>
               <a:noFill/>
             </a:ln>
@@ -8472,7 +8615,7 @@
           <a:buFontTx/>
           <a:buNone/>
           <a:tabLst/>
-          <a:defRPr b="0" baseline="0" cap="none" i="0" spc="0" strike="noStrike" sz="1800" u="none" kumimoji="0" normalizeH="0">
+          <a:defRPr kumimoji="0" sz="1800" b="0" i="0" u="none" strike="noStrike" cap="none" spc="0" normalizeH="0" baseline="0">
             <a:ln>
               <a:noFill/>
             </a:ln>
@@ -8498,7 +8641,7 @@
           <a:buFontTx/>
           <a:buNone/>
           <a:tabLst/>
-          <a:defRPr b="0" baseline="0" cap="none" i="0" spc="0" strike="noStrike" sz="1800" u="none" kumimoji="0" normalizeH="0">
+          <a:defRPr kumimoji="0" sz="1800" b="0" i="0" u="none" strike="noStrike" cap="none" spc="0" normalizeH="0" baseline="0">
             <a:ln>
               <a:noFill/>
             </a:ln>
@@ -8524,7 +8667,7 @@
           <a:buFontTx/>
           <a:buNone/>
           <a:tabLst/>
-          <a:defRPr b="0" baseline="0" cap="none" i="0" spc="0" strike="noStrike" sz="1800" u="none" kumimoji="0" normalizeH="0">
+          <a:defRPr kumimoji="0" sz="1800" b="0" i="0" u="none" strike="noStrike" cap="none" spc="0" normalizeH="0" baseline="0">
             <a:ln>
               <a:noFill/>
             </a:ln>
@@ -8537,12 +8680,19 @@
         </a:lvl9pPr>
       </a:lstStyle>
       <a:style>
-        <a:lnRef idx="0"/>
-        <a:fillRef idx="0"/>
-        <a:effectRef idx="0"/>
+        <a:lnRef idx="0">
+          <a:scrgbClr r="0" g="0" b="0"/>
+        </a:lnRef>
+        <a:fillRef idx="0">
+          <a:scrgbClr r="0" g="0" b="0"/>
+        </a:fillRef>
+        <a:effectRef idx="0">
+          <a:scrgbClr r="0" g="0" b="0"/>
+        </a:effectRef>
         <a:fontRef idx="none"/>
       </a:style>
     </a:txDef>
   </a:objectDefaults>
+  <a:extraClrSchemeLst/>
 </a:theme>
 </file>
</xml_diff>

<commit_message>
Fixed order of slides
</commit_message>
<xml_diff>
--- a/Presentations/Presentations Power Point/03_Looping.pptx
+++ b/Presentations/Presentations Power Point/03_Looping.pptx
@@ -13,11 +13,11 @@
     <p:sldId id="258" r:id="rId4"/>
     <p:sldId id="259" r:id="rId5"/>
     <p:sldId id="260" r:id="rId6"/>
-    <p:sldId id="261" r:id="rId7"/>
-    <p:sldId id="262" r:id="rId8"/>
-    <p:sldId id="264" r:id="rId9"/>
-    <p:sldId id="265" r:id="rId10"/>
-    <p:sldId id="263" r:id="rId11"/>
+    <p:sldId id="264" r:id="rId7"/>
+    <p:sldId id="265" r:id="rId8"/>
+    <p:sldId id="263" r:id="rId9"/>
+    <p:sldId id="261" r:id="rId10"/>
+    <p:sldId id="262" r:id="rId11"/>
     <p:sldId id="266" r:id="rId12"/>
     <p:sldId id="267" r:id="rId13"/>
     <p:sldId id="268" r:id="rId14"/>
@@ -3166,14 +3166,14 @@
       </p:grpSpPr>
       <p:sp>
         <p:nvSpPr>
-          <p:cNvPr id="141" name="Iterators"/>
+          <p:cNvPr id="138" name="Next"/>
           <p:cNvSpPr txBox="1"/>
           <p:nvPr/>
         </p:nvSpPr>
         <p:spPr>
           <a:xfrm>
-            <a:off x="4737698" y="596900"/>
-            <a:ext cx="3967989" cy="1295401"/>
+            <a:off x="3438259" y="351541"/>
+            <a:ext cx="6128281" cy="2539157"/>
           </a:xfrm>
           <a:prstGeom prst="rect">
             <a:avLst/>
@@ -3205,7 +3205,7 @@
               </a:defRPr>
             </a:pPr>
             <a:r>
-              <a:rPr>
+              <a:rPr lang="en-CA" dirty="0">
                 <a:solidFill>
                   <a:srgbClr val="FA1116"/>
                 </a:solidFill>
@@ -3213,26 +3213,68 @@
               <a:t>I</a:t>
             </a:r>
             <a:r>
-              <a:rPr>
+              <a:rPr lang="en-CA" dirty="0">
                 <a:solidFill>
                   <a:srgbClr val="000000"/>
                 </a:solidFill>
               </a:rPr>
-              <a:t>terators</a:t>
+              <a:t>terators: </a:t>
+            </a:r>
+            <a:r>
+              <a:rPr lang="en-CA" dirty="0">
+                <a:solidFill>
+                  <a:srgbClr val="FF0000"/>
+                </a:solidFill>
+              </a:rPr>
+              <a:t>For</a:t>
+            </a:r>
+            <a:endParaRPr lang="en-CA" dirty="0">
+              <a:solidFill>
+                <a:srgbClr val="000000"/>
+              </a:solidFill>
+            </a:endParaRPr>
+          </a:p>
+          <a:p>
+            <a:pPr>
+              <a:defRPr sz="8000">
+                <a:solidFill>
+                  <a:schemeClr val="accent5">
+                    <a:hueOff val="-444211"/>
+                    <a:satOff val="-14915"/>
+                    <a:lumOff val="22857"/>
+                  </a:schemeClr>
+                </a:solidFill>
+              </a:defRPr>
+            </a:pPr>
+            <a:r>
+              <a:rPr dirty="0">
+                <a:solidFill>
+                  <a:srgbClr val="FA1116"/>
+                </a:solidFill>
+              </a:rPr>
+              <a:t>N</a:t>
+            </a:r>
+            <a:r>
+              <a:rPr dirty="0">
+                <a:solidFill>
+                  <a:srgbClr val="000000"/>
+                </a:solidFill>
+              </a:rPr>
+              <a:t>ext</a:t>
             </a:r>
           </a:p>
         </p:txBody>
       </p:sp>
       <p:sp>
         <p:nvSpPr>
-          <p:cNvPr id="142" name="Another way to loop in Ruby!…"/>
+          <p:cNvPr id="139" name="Used to skip over certain steps in the loop…"/>
           <p:cNvSpPr txBox="1"/>
           <p:nvPr/>
         </p:nvSpPr>
         <p:spPr>
           <a:xfrm>
-            <a:off x="335953" y="3244849"/>
-            <a:ext cx="12332894" cy="4711701"/>
+            <a:off x="555246" y="3504469"/>
+            <a:ext cx="12332894" cy="4952976"/>
           </a:xfrm>
           <a:prstGeom prst="rect">
             <a:avLst/>
@@ -3257,15 +3299,14 @@
                 <a:spcPts val="500"/>
               </a:spcBef>
               <a:defRPr sz="3500">
-                <a:latin typeface="Helvetica"/>
-                <a:ea typeface="Helvetica"/>
-                <a:cs typeface="Helvetica"/>
-                <a:sym typeface="Helvetica"/>
-              </a:defRPr>
-            </a:pPr>
-            <a:r>
-              <a:rPr dirty="0"/>
-              <a:t>Another way to loop in Ruby!</a:t>
+                <a:latin typeface="Helvetica Neue"/>
+                <a:ea typeface="Helvetica Neue"/>
+                <a:cs typeface="Helvetica Neue"/>
+                <a:sym typeface="Helvetica Neue"/>
+              </a:defRPr>
+            </a:pPr>
+            <a:r>
+              <a:t>Used to skip over certain steps in the loop</a:t>
             </a:r>
           </a:p>
           <a:p>
@@ -3274,13 +3315,13 @@
                 <a:spcPts val="500"/>
               </a:spcBef>
               <a:defRPr sz="3500">
-                <a:latin typeface="Helvetica"/>
-                <a:ea typeface="Helvetica"/>
-                <a:cs typeface="Helvetica"/>
-                <a:sym typeface="Helvetica"/>
-              </a:defRPr>
-            </a:pPr>
-            <a:endParaRPr dirty="0"/>
+                <a:latin typeface="Helvetica Neue"/>
+                <a:ea typeface="Helvetica Neue"/>
+                <a:cs typeface="Helvetica Neue"/>
+                <a:sym typeface="Helvetica Neue"/>
+              </a:defRPr>
+            </a:pPr>
+            <a:endParaRPr/>
           </a:p>
           <a:p>
             <a:pPr algn="l" defTabSz="457200">
@@ -3288,37 +3329,22 @@
                 <a:spcPts val="500"/>
               </a:spcBef>
               <a:defRPr sz="3500">
-                <a:latin typeface="Helvetica"/>
-                <a:ea typeface="Helvetica"/>
-                <a:cs typeface="Helvetica"/>
-                <a:sym typeface="Helvetica"/>
-              </a:defRPr>
-            </a:pPr>
-            <a:r>
-              <a:rPr dirty="0"/>
-              <a:t>An </a:t>
-            </a:r>
-            <a:r>
-              <a:rPr b="1" dirty="0">
-                <a:solidFill>
-                  <a:srgbClr val="FA1116"/>
-                </a:solidFill>
-              </a:rPr>
-              <a:t>iterator</a:t>
-            </a:r>
-            <a:r>
-              <a:rPr i="1" dirty="0"/>
-              <a:t> </a:t>
-            </a:r>
-            <a:r>
-              <a:rPr dirty="0"/>
-              <a:t>is a Ruby method that repeatedly invokes a `block` of code</a:t>
-            </a:r>
-            <a:r>
-              <a:rPr lang="en-CA" dirty="0"/>
-              <a:t> (but not infinitely like loops do)</a:t>
-            </a:r>
-            <a:endParaRPr dirty="0"/>
+                <a:solidFill>
+                  <a:schemeClr val="accent1">
+                    <a:hueOff val="47394"/>
+                    <a:satOff val="-25753"/>
+                    <a:lumOff val="-7544"/>
+                  </a:schemeClr>
+                </a:solidFill>
+                <a:latin typeface="Consolas"/>
+                <a:ea typeface="Consolas"/>
+                <a:cs typeface="Consolas"/>
+                <a:sym typeface="Consolas"/>
+              </a:defRPr>
+            </a:pPr>
+            <a:r>
+              <a:t>for number in 1..5</a:t>
+            </a:r>
           </a:p>
           <a:p>
             <a:pPr algn="l" defTabSz="457200">
@@ -3326,13 +3352,22 @@
                 <a:spcPts val="500"/>
               </a:spcBef>
               <a:defRPr sz="3500">
-                <a:latin typeface="Helvetica"/>
-                <a:ea typeface="Helvetica"/>
-                <a:cs typeface="Helvetica"/>
-                <a:sym typeface="Helvetica"/>
-              </a:defRPr>
-            </a:pPr>
-            <a:endParaRPr dirty="0"/>
+                <a:solidFill>
+                  <a:schemeClr val="accent1">
+                    <a:hueOff val="47394"/>
+                    <a:satOff val="-25753"/>
+                    <a:lumOff val="-7544"/>
+                  </a:schemeClr>
+                </a:solidFill>
+                <a:latin typeface="Consolas"/>
+                <a:ea typeface="Consolas"/>
+                <a:cs typeface="Consolas"/>
+                <a:sym typeface="Consolas"/>
+              </a:defRPr>
+            </a:pPr>
+            <a:r>
+              <a:t>    next if number % 2 == 0</a:t>
+            </a:r>
           </a:p>
           <a:p>
             <a:pPr algn="l" defTabSz="457200">
@@ -3340,15 +3375,21 @@
                 <a:spcPts val="500"/>
               </a:spcBef>
               <a:defRPr sz="3500">
-                <a:latin typeface="Helvetica"/>
-                <a:ea typeface="Helvetica"/>
-                <a:cs typeface="Helvetica"/>
-                <a:sym typeface="Helvetica"/>
-              </a:defRPr>
-            </a:pPr>
-            <a:r>
-              <a:rPr dirty="0"/>
-              <a:t>That `block` of code is the bit that contains the instructions to be repeated</a:t>
+                <a:solidFill>
+                  <a:schemeClr val="accent1">
+                    <a:hueOff val="47394"/>
+                    <a:satOff val="-25753"/>
+                    <a:lumOff val="-7544"/>
+                  </a:schemeClr>
+                </a:solidFill>
+                <a:latin typeface="Consolas"/>
+                <a:ea typeface="Consolas"/>
+                <a:cs typeface="Consolas"/>
+                <a:sym typeface="Consolas"/>
+              </a:defRPr>
+            </a:pPr>
+            <a:r>
+              <a:t>    print number</a:t>
             </a:r>
           </a:p>
           <a:p>
@@ -3357,24 +3398,54 @@
                 <a:spcPts val="500"/>
               </a:spcBef>
               <a:defRPr sz="3500">
+                <a:solidFill>
+                  <a:schemeClr val="accent1">
+                    <a:hueOff val="47394"/>
+                    <a:satOff val="-25753"/>
+                    <a:lumOff val="-7544"/>
+                  </a:schemeClr>
+                </a:solidFill>
+                <a:latin typeface="Consolas"/>
+                <a:ea typeface="Consolas"/>
+                <a:cs typeface="Consolas"/>
+                <a:sym typeface="Consolas"/>
+              </a:defRPr>
+            </a:pPr>
+            <a:r>
+              <a:t>end</a:t>
+            </a:r>
+          </a:p>
+          <a:p>
+            <a:pPr algn="l" defTabSz="457200">
+              <a:spcBef>
+                <a:spcPts val="500"/>
+              </a:spcBef>
+              <a:defRPr sz="3500">
+                <a:solidFill>
+                  <a:srgbClr val="C0C0C0"/>
+                </a:solidFill>
                 <a:latin typeface="Helvetica"/>
                 <a:ea typeface="Helvetica"/>
                 <a:cs typeface="Helvetica"/>
                 <a:sym typeface="Helvetica"/>
               </a:defRPr>
             </a:pPr>
-            <a:r>
-              <a:rPr dirty="0"/>
-              <a:t>(and those instructions may be anything you want!) </a:t>
-            </a:r>
-            <a:r>
-              <a:rPr dirty="0">
-                <a:latin typeface="Apple Color Emoji"/>
-                <a:ea typeface="Apple Color Emoji"/>
-                <a:cs typeface="Apple Color Emoji"/>
-                <a:sym typeface="Apple Color Emoji"/>
-              </a:rPr>
-              <a:t>🙌🏻</a:t>
+            <a:endParaRPr/>
+          </a:p>
+          <a:p>
+            <a:pPr algn="l" defTabSz="457200">
+              <a:spcBef>
+                <a:spcPts val="500"/>
+              </a:spcBef>
+              <a:defRPr sz="3500">
+                <a:latin typeface="Helvetica Neue"/>
+                <a:ea typeface="Helvetica Neue"/>
+                <a:cs typeface="Helvetica Neue"/>
+                <a:sym typeface="Helvetica Neue"/>
+              </a:defRPr>
+            </a:pPr>
+            <a:r>
+              <a:t>(skips printing all the even numbers)</a:t>
             </a:r>
           </a:p>
         </p:txBody>
@@ -3413,8 +3484,8 @@
         </p:nvSpPr>
         <p:spPr>
           <a:xfrm>
-            <a:off x="4737698" y="596900"/>
-            <a:ext cx="3967989" cy="1295401"/>
+            <a:off x="3143792" y="590576"/>
+            <a:ext cx="7155805" cy="1308050"/>
           </a:xfrm>
           <a:prstGeom prst="rect">
             <a:avLst/>
@@ -3446,7 +3517,7 @@
               </a:defRPr>
             </a:pPr>
             <a:r>
-              <a:rPr>
+              <a:rPr dirty="0">
                 <a:solidFill>
                   <a:srgbClr val="FA1116"/>
                 </a:solidFill>
@@ -3454,13 +3525,34 @@
               <a:t>I</a:t>
             </a:r>
             <a:r>
-              <a:rPr>
+              <a:rPr dirty="0">
                 <a:solidFill>
                   <a:srgbClr val="000000"/>
                 </a:solidFill>
               </a:rPr>
               <a:t>terators</a:t>
             </a:r>
+            <a:r>
+              <a:rPr lang="en-CA" dirty="0">
+                <a:solidFill>
+                  <a:srgbClr val="000000"/>
+                </a:solidFill>
+              </a:rPr>
+              <a:t> - </a:t>
+            </a:r>
+            <a:r>
+              <a:rPr lang="en-CA" dirty="0">
+                <a:solidFill>
+                  <a:srgbClr val="FF0000"/>
+                </a:solidFill>
+              </a:rPr>
+              <a:t>Each</a:t>
+            </a:r>
+            <a:endParaRPr dirty="0">
+              <a:solidFill>
+                <a:srgbClr val="000000"/>
+              </a:solidFill>
+            </a:endParaRPr>
           </a:p>
         </p:txBody>
       </p:sp>
@@ -3505,6 +3597,7 @@
               </a:defRPr>
             </a:pPr>
             <a:r>
+              <a:rPr dirty="0"/>
               <a:t>2. Each</a:t>
             </a:r>
           </a:p>
@@ -3520,7 +3613,7 @@
                 <a:sym typeface="Helvetica"/>
               </a:defRPr>
             </a:pPr>
-            <a:endParaRPr b="1">
+            <a:endParaRPr b="1" dirty="0">
               <a:solidFill>
                 <a:schemeClr val="accent5">
                   <a:hueOff val="-444211"/>
@@ -3543,20 +3636,23 @@
               </a:defRPr>
             </a:pPr>
             <a:r>
+              <a:rPr dirty="0"/>
               <a:t>a more powerful iterator which can apply an expression to </a:t>
             </a:r>
             <a:r>
-              <a:rPr b="1"/>
+              <a:rPr b="1" dirty="0"/>
               <a:t>each element</a:t>
             </a:r>
             <a:r>
+              <a:rPr dirty="0"/>
               <a:t> of a </a:t>
             </a:r>
             <a:r>
-              <a:rPr b="1"/>
+              <a:rPr b="1" dirty="0"/>
               <a:t>collection</a:t>
             </a:r>
             <a:r>
+              <a:rPr dirty="0"/>
               <a:t>, one at a time</a:t>
             </a:r>
           </a:p>
@@ -3572,7 +3668,7 @@
                 <a:sym typeface="Helvetica"/>
               </a:defRPr>
             </a:pPr>
-            <a:endParaRPr/>
+            <a:endParaRPr dirty="0"/>
           </a:p>
           <a:p>
             <a:pPr algn="l" defTabSz="457200">
@@ -3609,7 +3705,12 @@
               </a:defRPr>
             </a:pPr>
             <a:r>
-              <a:t>collection_name.each do | item |</a:t>
+              <a:rPr dirty="0" err="1"/>
+              <a:t>collection_name.each</a:t>
+            </a:r>
+            <a:r>
+              <a:rPr dirty="0"/>
+              <a:t> do | item |</a:t>
             </a:r>
           </a:p>
           <a:p>
@@ -3647,6 +3748,7 @@
               </a:defRPr>
             </a:pPr>
             <a:r>
+              <a:rPr dirty="0"/>
               <a:t>    #do something to each item</a:t>
             </a:r>
           </a:p>
@@ -3685,6 +3787,7 @@
               </a:defRPr>
             </a:pPr>
             <a:r>
+              <a:rPr dirty="0"/>
               <a:t>end</a:t>
             </a:r>
           </a:p>
@@ -3718,7 +3821,7 @@
                 <a:sym typeface="Monaco"/>
               </a:defRPr>
             </a:pPr>
-            <a:endParaRPr/>
+            <a:endParaRPr dirty="0"/>
           </a:p>
           <a:p>
             <a:pPr algn="l" defTabSz="457200">
@@ -3748,13 +3851,15 @@
               </a:defRPr>
             </a:pPr>
             <a:r>
+              <a:rPr dirty="0"/>
               <a:t>the name between | | can be anything -&gt; it’s just a placeholder for each element of the collection you’re calling </a:t>
             </a:r>
             <a:r>
-              <a:rPr b="1"/>
+              <a:rPr b="1" dirty="0"/>
               <a:t>.each</a:t>
             </a:r>
             <a:r>
+              <a:rPr dirty="0"/>
               <a:t> on</a:t>
             </a:r>
           </a:p>
@@ -3794,8 +3899,8 @@
         </p:nvSpPr>
         <p:spPr>
           <a:xfrm>
-            <a:off x="4737698" y="596900"/>
-            <a:ext cx="3967989" cy="1295401"/>
+            <a:off x="2876090" y="590576"/>
+            <a:ext cx="7691209" cy="1308050"/>
           </a:xfrm>
           <a:prstGeom prst="rect">
             <a:avLst/>
@@ -3827,7 +3932,7 @@
               </a:defRPr>
             </a:pPr>
             <a:r>
-              <a:rPr>
+              <a:rPr dirty="0">
                 <a:solidFill>
                   <a:srgbClr val="FA1116"/>
                 </a:solidFill>
@@ -3835,13 +3940,34 @@
               <a:t>I</a:t>
             </a:r>
             <a:r>
-              <a:rPr>
+              <a:rPr dirty="0">
                 <a:solidFill>
                   <a:srgbClr val="000000"/>
                 </a:solidFill>
               </a:rPr>
               <a:t>terators</a:t>
             </a:r>
+            <a:r>
+              <a:rPr lang="en-CA" dirty="0">
+                <a:solidFill>
+                  <a:srgbClr val="000000"/>
+                </a:solidFill>
+              </a:rPr>
+              <a:t> - </a:t>
+            </a:r>
+            <a:r>
+              <a:rPr lang="en-CA" dirty="0">
+                <a:solidFill>
+                  <a:srgbClr val="FF0000"/>
+                </a:solidFill>
+              </a:rPr>
+              <a:t>Times</a:t>
+            </a:r>
+            <a:endParaRPr dirty="0">
+              <a:solidFill>
+                <a:srgbClr val="FF0000"/>
+              </a:solidFill>
+            </a:endParaRPr>
           </a:p>
         </p:txBody>
       </p:sp>
@@ -3853,7 +3979,7 @@
         </p:nvSpPr>
         <p:spPr>
           <a:xfrm>
-            <a:off x="555246" y="4037739"/>
+            <a:off x="555247" y="3320563"/>
             <a:ext cx="12332894" cy="3886437"/>
           </a:xfrm>
           <a:prstGeom prst="rect">
@@ -3886,6 +4012,7 @@
               </a:defRPr>
             </a:pPr>
             <a:r>
+              <a:rPr dirty="0"/>
               <a:t>3. Times</a:t>
             </a:r>
           </a:p>
@@ -3901,7 +4028,7 @@
                 <a:sym typeface="Helvetica"/>
               </a:defRPr>
             </a:pPr>
-            <a:endParaRPr b="1">
+            <a:endParaRPr b="1" dirty="0">
               <a:solidFill>
                 <a:schemeClr val="accent5">
                   <a:hueOff val="-444211"/>
@@ -3924,10 +4051,11 @@
               </a:defRPr>
             </a:pPr>
             <a:r>
+              <a:rPr dirty="0"/>
               <a:t>Does something a </a:t>
             </a:r>
             <a:r>
-              <a:rPr b="1"/>
+              <a:rPr b="1" dirty="0"/>
               <a:t>specified number of times</a:t>
             </a:r>
           </a:p>
@@ -3943,7 +4071,7 @@
                 <a:sym typeface="Helvetica"/>
               </a:defRPr>
             </a:pPr>
-            <a:endParaRPr b="1"/>
+            <a:endParaRPr b="1" dirty="0"/>
           </a:p>
           <a:p>
             <a:pPr algn="l" defTabSz="457200">
@@ -3980,6 +4108,7 @@
               </a:defRPr>
             </a:pPr>
             <a:r>
+              <a:rPr dirty="0"/>
               <a:t>10.times do</a:t>
             </a:r>
           </a:p>
@@ -4018,6 +4147,7 @@
               </a:defRPr>
             </a:pPr>
             <a:r>
+              <a:rPr dirty="0"/>
               <a:t>    #do something</a:t>
             </a:r>
           </a:p>
@@ -4056,6 +4186,7 @@
               </a:defRPr>
             </a:pPr>
             <a:r>
+              <a:rPr dirty="0"/>
               <a:t>end</a:t>
             </a:r>
           </a:p>
@@ -5215,550 +5346,6 @@
       </p:grpSpPr>
       <p:sp>
         <p:nvSpPr>
-          <p:cNvPr id="135" name="For loop"/>
-          <p:cNvSpPr txBox="1"/>
-          <p:nvPr/>
-        </p:nvSpPr>
-        <p:spPr>
-          <a:xfrm>
-            <a:off x="4772750" y="596900"/>
-            <a:ext cx="3897885" cy="1295401"/>
-          </a:xfrm>
-          <a:prstGeom prst="rect">
-            <a:avLst/>
-          </a:prstGeom>
-          <a:ln w="3175">
-            <a:miter lim="400000"/>
-          </a:ln>
-          <a:extLst>
-            <a:ext uri="{C572A759-6A51-4108-AA02-DFA0A04FC94B}">
-              <ma14:wrappingTextBoxFlag xmlns:ma14="http://schemas.microsoft.com/office/mac/drawingml/2011/main" xmlns:a14="http://schemas.microsoft.com/office/drawing/2010/main" xmlns:m="http://schemas.openxmlformats.org/officeDocument/2006/math" xmlns="" val="1"/>
-            </a:ext>
-          </a:extLst>
-        </p:spPr>
-        <p:txBody>
-          <a:bodyPr wrap="none" lIns="38100" tIns="38100" rIns="38100" bIns="38100" anchor="ctr">
-            <a:spAutoFit/>
-          </a:bodyPr>
-          <a:lstStyle/>
-          <a:p>
-            <a:pPr>
-              <a:defRPr sz="8000">
-                <a:solidFill>
-                  <a:schemeClr val="accent5">
-                    <a:hueOff val="-444211"/>
-                    <a:satOff val="-14915"/>
-                    <a:lumOff val="22857"/>
-                  </a:schemeClr>
-                </a:solidFill>
-              </a:defRPr>
-            </a:pPr>
-            <a:r>
-              <a:rPr>
-                <a:solidFill>
-                  <a:srgbClr val="FA1116"/>
-                </a:solidFill>
-              </a:rPr>
-              <a:t>F</a:t>
-            </a:r>
-            <a:r>
-              <a:rPr>
-                <a:solidFill>
-                  <a:srgbClr val="000000"/>
-                </a:solidFill>
-              </a:rPr>
-              <a:t>or loop</a:t>
-            </a:r>
-          </a:p>
-        </p:txBody>
-      </p:sp>
-      <p:sp>
-        <p:nvSpPr>
-          <p:cNvPr id="136" name="The number of times the action will be repeated is known…"/>
-          <p:cNvSpPr txBox="1"/>
-          <p:nvPr/>
-        </p:nvSpPr>
-        <p:spPr>
-          <a:xfrm>
-            <a:off x="555246" y="2977679"/>
-            <a:ext cx="12332894" cy="5727701"/>
-          </a:xfrm>
-          <a:prstGeom prst="rect">
-            <a:avLst/>
-          </a:prstGeom>
-          <a:ln w="3175">
-            <a:miter lim="400000"/>
-          </a:ln>
-          <a:extLst>
-            <a:ext uri="{C572A759-6A51-4108-AA02-DFA0A04FC94B}">
-              <ma14:wrappingTextBoxFlag xmlns:ma14="http://schemas.microsoft.com/office/mac/drawingml/2011/main" xmlns:a14="http://schemas.microsoft.com/office/drawing/2010/main" xmlns:m="http://schemas.openxmlformats.org/officeDocument/2006/math" xmlns="" val="1"/>
-            </a:ext>
-          </a:extLst>
-        </p:spPr>
-        <p:txBody>
-          <a:bodyPr lIns="38100" tIns="38100" rIns="38100" bIns="38100" anchor="ctr">
-            <a:spAutoFit/>
-          </a:bodyPr>
-          <a:lstStyle/>
-          <a:p>
-            <a:pPr algn="l" defTabSz="457200">
-              <a:spcBef>
-                <a:spcPts val="500"/>
-              </a:spcBef>
-              <a:defRPr sz="3500">
-                <a:latin typeface="Helvetica"/>
-                <a:ea typeface="Helvetica"/>
-                <a:cs typeface="Helvetica"/>
-                <a:sym typeface="Helvetica"/>
-              </a:defRPr>
-            </a:pPr>
-            <a:r>
-              <a:t>The number of times the action will be repeated is </a:t>
-            </a:r>
-            <a:r>
-              <a:rPr b="1">
-                <a:solidFill>
-                  <a:srgbClr val="FA1116"/>
-                </a:solidFill>
-              </a:rPr>
-              <a:t>known</a:t>
-            </a:r>
-            <a:r>
-              <a:rPr b="1">
-                <a:solidFill>
-                  <a:schemeClr val="accent5">
-                    <a:hueOff val="-444211"/>
-                    <a:satOff val="-14915"/>
-                    <a:lumOff val="22857"/>
-                  </a:schemeClr>
-                </a:solidFill>
-              </a:rPr>
-              <a:t> </a:t>
-            </a:r>
-            <a:endParaRPr b="1"/>
-          </a:p>
-          <a:p>
-            <a:pPr algn="l" defTabSz="457200">
-              <a:spcBef>
-                <a:spcPts val="500"/>
-              </a:spcBef>
-              <a:defRPr sz="3500">
-                <a:latin typeface="Helvetica"/>
-                <a:ea typeface="Helvetica"/>
-                <a:cs typeface="Helvetica"/>
-                <a:sym typeface="Helvetica"/>
-              </a:defRPr>
-            </a:pPr>
-            <a:endParaRPr b="1"/>
-          </a:p>
-          <a:p>
-            <a:pPr algn="l" defTabSz="457200">
-              <a:spcBef>
-                <a:spcPts val="500"/>
-              </a:spcBef>
-              <a:defRPr sz="3500">
-                <a:latin typeface="Helvetica"/>
-                <a:ea typeface="Helvetica"/>
-                <a:cs typeface="Helvetica"/>
-                <a:sym typeface="Helvetica"/>
-              </a:defRPr>
-            </a:pPr>
-            <a:r>
-              <a:t>To repeat an action in Ruby within a certain </a:t>
-            </a:r>
-            <a:r>
-              <a:rPr b="1"/>
-              <a:t>range</a:t>
-            </a:r>
-            <a:r>
-              <a:t> of elements</a:t>
-            </a:r>
-            <a:endParaRPr b="1"/>
-          </a:p>
-          <a:p>
-            <a:pPr algn="l" defTabSz="457200">
-              <a:spcBef>
-                <a:spcPts val="500"/>
-              </a:spcBef>
-              <a:defRPr sz="3500">
-                <a:latin typeface="Helvetica"/>
-                <a:ea typeface="Helvetica"/>
-                <a:cs typeface="Helvetica"/>
-                <a:sym typeface="Helvetica"/>
-              </a:defRPr>
-            </a:pPr>
-            <a:endParaRPr b="1"/>
-          </a:p>
-          <a:p>
-            <a:pPr algn="l" defTabSz="457200">
-              <a:spcBef>
-                <a:spcPts val="500"/>
-              </a:spcBef>
-              <a:defRPr sz="3500">
-                <a:latin typeface="Helvetica"/>
-                <a:ea typeface="Helvetica"/>
-                <a:cs typeface="Helvetica"/>
-                <a:sym typeface="Helvetica"/>
-              </a:defRPr>
-            </a:pPr>
-            <a:endParaRPr b="1"/>
-          </a:p>
-          <a:p>
-            <a:pPr algn="l" defTabSz="457200">
-              <a:defRPr sz="3500">
-                <a:latin typeface="Helvetica"/>
-                <a:ea typeface="Helvetica"/>
-                <a:cs typeface="Helvetica"/>
-                <a:sym typeface="Helvetica"/>
-              </a:defRPr>
-            </a:pPr>
-            <a:r>
-              <a:t>1..10 -&gt; a range which includes the numbers from 1 to </a:t>
-            </a:r>
-            <a:r>
-              <a:rPr b="1"/>
-              <a:t>10</a:t>
-            </a:r>
-          </a:p>
-          <a:p>
-            <a:pPr algn="l" defTabSz="457200">
-              <a:defRPr sz="3500">
-                <a:latin typeface="Helvetica"/>
-                <a:ea typeface="Helvetica"/>
-                <a:cs typeface="Helvetica"/>
-                <a:sym typeface="Helvetica"/>
-              </a:defRPr>
-            </a:pPr>
-            <a:endParaRPr b="1"/>
-          </a:p>
-          <a:p>
-            <a:pPr algn="l" defTabSz="457200">
-              <a:defRPr sz="3500">
-                <a:latin typeface="Helvetica"/>
-                <a:ea typeface="Helvetica"/>
-                <a:cs typeface="Helvetica"/>
-                <a:sym typeface="Helvetica"/>
-              </a:defRPr>
-            </a:pPr>
-            <a:r>
-              <a:t>1…10 -&gt; a range which includes the numbers from 1 to </a:t>
-            </a:r>
-            <a:r>
-              <a:rPr b="1"/>
-              <a:t>9</a:t>
-            </a:r>
-          </a:p>
-          <a:p>
-            <a:pPr algn="l" defTabSz="457200">
-              <a:defRPr sz="3500">
-                <a:latin typeface="Helvetica"/>
-                <a:ea typeface="Helvetica"/>
-                <a:cs typeface="Helvetica"/>
-                <a:sym typeface="Helvetica"/>
-              </a:defRPr>
-            </a:pPr>
-            <a:endParaRPr b="1"/>
-          </a:p>
-        </p:txBody>
-      </p:sp>
-    </p:spTree>
-  </p:cSld>
-  <p:clrMapOvr>
-    <a:masterClrMapping/>
-  </p:clrMapOvr>
-  <p:transition spd="med"/>
-</p:sld>
-</file>
-
-<file path=ppt/slides/slide7.xml><?xml version="1.0" encoding="utf-8"?>
-<p:sld xmlns:a="http://schemas.openxmlformats.org/drawingml/2006/main" xmlns:r="http://schemas.openxmlformats.org/officeDocument/2006/relationships" xmlns:p="http://schemas.openxmlformats.org/presentationml/2006/main">
-  <p:cSld>
-    <p:spTree>
-      <p:nvGrpSpPr>
-        <p:cNvPr id="1" name=""/>
-        <p:cNvGrpSpPr/>
-        <p:nvPr/>
-      </p:nvGrpSpPr>
-      <p:grpSpPr>
-        <a:xfrm>
-          <a:off x="0" y="0"/>
-          <a:ext cx="0" cy="0"/>
-          <a:chOff x="0" y="0"/>
-          <a:chExt cx="0" cy="0"/>
-        </a:xfrm>
-      </p:grpSpPr>
-      <p:sp>
-        <p:nvSpPr>
-          <p:cNvPr id="138" name="Next"/>
-          <p:cNvSpPr txBox="1"/>
-          <p:nvPr/>
-        </p:nvSpPr>
-        <p:spPr>
-          <a:xfrm>
-            <a:off x="5839080" y="596900"/>
-            <a:ext cx="2246885" cy="1295401"/>
-          </a:xfrm>
-          <a:prstGeom prst="rect">
-            <a:avLst/>
-          </a:prstGeom>
-          <a:ln w="3175">
-            <a:miter lim="400000"/>
-          </a:ln>
-          <a:extLst>
-            <a:ext uri="{C572A759-6A51-4108-AA02-DFA0A04FC94B}">
-              <ma14:wrappingTextBoxFlag xmlns:ma14="http://schemas.microsoft.com/office/mac/drawingml/2011/main" xmlns:a14="http://schemas.microsoft.com/office/drawing/2010/main" xmlns:m="http://schemas.openxmlformats.org/officeDocument/2006/math" xmlns="" val="1"/>
-            </a:ext>
-          </a:extLst>
-        </p:spPr>
-        <p:txBody>
-          <a:bodyPr wrap="none" lIns="38100" tIns="38100" rIns="38100" bIns="38100" anchor="ctr">
-            <a:spAutoFit/>
-          </a:bodyPr>
-          <a:lstStyle/>
-          <a:p>
-            <a:pPr>
-              <a:defRPr sz="8000">
-                <a:solidFill>
-                  <a:schemeClr val="accent5">
-                    <a:hueOff val="-444211"/>
-                    <a:satOff val="-14915"/>
-                    <a:lumOff val="22857"/>
-                  </a:schemeClr>
-                </a:solidFill>
-              </a:defRPr>
-            </a:pPr>
-            <a:r>
-              <a:rPr>
-                <a:solidFill>
-                  <a:srgbClr val="FA1116"/>
-                </a:solidFill>
-              </a:rPr>
-              <a:t>N</a:t>
-            </a:r>
-            <a:r>
-              <a:rPr>
-                <a:solidFill>
-                  <a:srgbClr val="000000"/>
-                </a:solidFill>
-              </a:rPr>
-              <a:t>ext</a:t>
-            </a:r>
-          </a:p>
-        </p:txBody>
-      </p:sp>
-      <p:sp>
-        <p:nvSpPr>
-          <p:cNvPr id="139" name="Used to skip over certain steps in the loop…"/>
-          <p:cNvSpPr txBox="1"/>
-          <p:nvPr/>
-        </p:nvSpPr>
-        <p:spPr>
-          <a:xfrm>
-            <a:off x="555246" y="3504469"/>
-            <a:ext cx="12332894" cy="4952976"/>
-          </a:xfrm>
-          <a:prstGeom prst="rect">
-            <a:avLst/>
-          </a:prstGeom>
-          <a:ln w="3175">
-            <a:miter lim="400000"/>
-          </a:ln>
-          <a:extLst>
-            <a:ext uri="{C572A759-6A51-4108-AA02-DFA0A04FC94B}">
-              <ma14:wrappingTextBoxFlag xmlns:ma14="http://schemas.microsoft.com/office/mac/drawingml/2011/main" xmlns:a14="http://schemas.microsoft.com/office/drawing/2010/main" xmlns:m="http://schemas.openxmlformats.org/officeDocument/2006/math" xmlns="" val="1"/>
-            </a:ext>
-          </a:extLst>
-        </p:spPr>
-        <p:txBody>
-          <a:bodyPr lIns="38100" tIns="38100" rIns="38100" bIns="38100" anchor="ctr">
-            <a:spAutoFit/>
-          </a:bodyPr>
-          <a:lstStyle/>
-          <a:p>
-            <a:pPr algn="l" defTabSz="457200">
-              <a:spcBef>
-                <a:spcPts val="500"/>
-              </a:spcBef>
-              <a:defRPr sz="3500">
-                <a:latin typeface="Helvetica Neue"/>
-                <a:ea typeface="Helvetica Neue"/>
-                <a:cs typeface="Helvetica Neue"/>
-                <a:sym typeface="Helvetica Neue"/>
-              </a:defRPr>
-            </a:pPr>
-            <a:r>
-              <a:t>Used to skip over certain steps in the loop</a:t>
-            </a:r>
-          </a:p>
-          <a:p>
-            <a:pPr algn="l" defTabSz="457200">
-              <a:spcBef>
-                <a:spcPts val="500"/>
-              </a:spcBef>
-              <a:defRPr sz="3500">
-                <a:latin typeface="Helvetica Neue"/>
-                <a:ea typeface="Helvetica Neue"/>
-                <a:cs typeface="Helvetica Neue"/>
-                <a:sym typeface="Helvetica Neue"/>
-              </a:defRPr>
-            </a:pPr>
-            <a:endParaRPr/>
-          </a:p>
-          <a:p>
-            <a:pPr algn="l" defTabSz="457200">
-              <a:spcBef>
-                <a:spcPts val="500"/>
-              </a:spcBef>
-              <a:defRPr sz="3500">
-                <a:solidFill>
-                  <a:schemeClr val="accent1">
-                    <a:hueOff val="47394"/>
-                    <a:satOff val="-25753"/>
-                    <a:lumOff val="-7544"/>
-                  </a:schemeClr>
-                </a:solidFill>
-                <a:latin typeface="Consolas"/>
-                <a:ea typeface="Consolas"/>
-                <a:cs typeface="Consolas"/>
-                <a:sym typeface="Consolas"/>
-              </a:defRPr>
-            </a:pPr>
-            <a:r>
-              <a:t>for number in 1..5</a:t>
-            </a:r>
-          </a:p>
-          <a:p>
-            <a:pPr algn="l" defTabSz="457200">
-              <a:spcBef>
-                <a:spcPts val="500"/>
-              </a:spcBef>
-              <a:defRPr sz="3500">
-                <a:solidFill>
-                  <a:schemeClr val="accent1">
-                    <a:hueOff val="47394"/>
-                    <a:satOff val="-25753"/>
-                    <a:lumOff val="-7544"/>
-                  </a:schemeClr>
-                </a:solidFill>
-                <a:latin typeface="Consolas"/>
-                <a:ea typeface="Consolas"/>
-                <a:cs typeface="Consolas"/>
-                <a:sym typeface="Consolas"/>
-              </a:defRPr>
-            </a:pPr>
-            <a:r>
-              <a:t>    next if number % 2 == 0</a:t>
-            </a:r>
-          </a:p>
-          <a:p>
-            <a:pPr algn="l" defTabSz="457200">
-              <a:spcBef>
-                <a:spcPts val="500"/>
-              </a:spcBef>
-              <a:defRPr sz="3500">
-                <a:solidFill>
-                  <a:schemeClr val="accent1">
-                    <a:hueOff val="47394"/>
-                    <a:satOff val="-25753"/>
-                    <a:lumOff val="-7544"/>
-                  </a:schemeClr>
-                </a:solidFill>
-                <a:latin typeface="Consolas"/>
-                <a:ea typeface="Consolas"/>
-                <a:cs typeface="Consolas"/>
-                <a:sym typeface="Consolas"/>
-              </a:defRPr>
-            </a:pPr>
-            <a:r>
-              <a:t>    print number</a:t>
-            </a:r>
-          </a:p>
-          <a:p>
-            <a:pPr algn="l" defTabSz="457200">
-              <a:spcBef>
-                <a:spcPts val="500"/>
-              </a:spcBef>
-              <a:defRPr sz="3500">
-                <a:solidFill>
-                  <a:schemeClr val="accent1">
-                    <a:hueOff val="47394"/>
-                    <a:satOff val="-25753"/>
-                    <a:lumOff val="-7544"/>
-                  </a:schemeClr>
-                </a:solidFill>
-                <a:latin typeface="Consolas"/>
-                <a:ea typeface="Consolas"/>
-                <a:cs typeface="Consolas"/>
-                <a:sym typeface="Consolas"/>
-              </a:defRPr>
-            </a:pPr>
-            <a:r>
-              <a:t>end</a:t>
-            </a:r>
-          </a:p>
-          <a:p>
-            <a:pPr algn="l" defTabSz="457200">
-              <a:spcBef>
-                <a:spcPts val="500"/>
-              </a:spcBef>
-              <a:defRPr sz="3500">
-                <a:solidFill>
-                  <a:srgbClr val="C0C0C0"/>
-                </a:solidFill>
-                <a:latin typeface="Helvetica"/>
-                <a:ea typeface="Helvetica"/>
-                <a:cs typeface="Helvetica"/>
-                <a:sym typeface="Helvetica"/>
-              </a:defRPr>
-            </a:pPr>
-            <a:endParaRPr/>
-          </a:p>
-          <a:p>
-            <a:pPr algn="l" defTabSz="457200">
-              <a:spcBef>
-                <a:spcPts val="500"/>
-              </a:spcBef>
-              <a:defRPr sz="3500">
-                <a:latin typeface="Helvetica Neue"/>
-                <a:ea typeface="Helvetica Neue"/>
-                <a:cs typeface="Helvetica Neue"/>
-                <a:sym typeface="Helvetica Neue"/>
-              </a:defRPr>
-            </a:pPr>
-            <a:r>
-              <a:t>(skips printing all the even numbers)</a:t>
-            </a:r>
-          </a:p>
-        </p:txBody>
-      </p:sp>
-    </p:spTree>
-  </p:cSld>
-  <p:clrMapOvr>
-    <a:masterClrMapping/>
-  </p:clrMapOvr>
-  <p:transition spd="med"/>
-</p:sld>
-</file>
-
-<file path=ppt/slides/slide8.xml><?xml version="1.0" encoding="utf-8"?>
-<p:sld xmlns:a="http://schemas.openxmlformats.org/drawingml/2006/main" xmlns:r="http://schemas.openxmlformats.org/officeDocument/2006/relationships" xmlns:p="http://schemas.openxmlformats.org/presentationml/2006/main">
-  <p:cSld>
-    <p:spTree>
-      <p:nvGrpSpPr>
-        <p:cNvPr id="1" name=""/>
-        <p:cNvGrpSpPr/>
-        <p:nvPr/>
-      </p:nvGrpSpPr>
-      <p:grpSpPr>
-        <a:xfrm>
-          <a:off x="0" y="0"/>
-          <a:ext cx="0" cy="0"/>
-          <a:chOff x="0" y="0"/>
-          <a:chExt cx="0" cy="0"/>
-        </a:xfrm>
-      </p:grpSpPr>
-      <p:sp>
-        <p:nvSpPr>
           <p:cNvPr id="144" name="Iterators"/>
           <p:cNvSpPr txBox="1"/>
           <p:nvPr/>
@@ -6097,7 +5684,7 @@
 </p:sld>
 </file>
 
-<file path=ppt/slides/slide9.xml><?xml version="1.0" encoding="utf-8"?>
+<file path=ppt/slides/slide7.xml><?xml version="1.0" encoding="utf-8"?>
 <p:sld xmlns:a="http://schemas.openxmlformats.org/drawingml/2006/main" xmlns:r="http://schemas.openxmlformats.org/officeDocument/2006/relationships" xmlns:p="http://schemas.openxmlformats.org/presentationml/2006/main">
   <p:cSld>
     <p:spTree>
@@ -6493,6 +6080,615 @@
               </a:rPr>
               <a:t>)</a:t>
             </a:r>
+          </a:p>
+        </p:txBody>
+      </p:sp>
+    </p:spTree>
+  </p:cSld>
+  <p:clrMapOvr>
+    <a:masterClrMapping/>
+  </p:clrMapOvr>
+  <p:transition spd="med"/>
+</p:sld>
+</file>
+
+<file path=ppt/slides/slide8.xml><?xml version="1.0" encoding="utf-8"?>
+<p:sld xmlns:a="http://schemas.openxmlformats.org/drawingml/2006/main" xmlns:r="http://schemas.openxmlformats.org/officeDocument/2006/relationships" xmlns:p="http://schemas.openxmlformats.org/presentationml/2006/main">
+  <p:cSld>
+    <p:spTree>
+      <p:nvGrpSpPr>
+        <p:cNvPr id="1" name=""/>
+        <p:cNvGrpSpPr/>
+        <p:nvPr/>
+      </p:nvGrpSpPr>
+      <p:grpSpPr>
+        <a:xfrm>
+          <a:off x="0" y="0"/>
+          <a:ext cx="0" cy="0"/>
+          <a:chOff x="0" y="0"/>
+          <a:chExt cx="0" cy="0"/>
+        </a:xfrm>
+      </p:grpSpPr>
+      <p:sp>
+        <p:nvSpPr>
+          <p:cNvPr id="141" name="Iterators"/>
+          <p:cNvSpPr txBox="1"/>
+          <p:nvPr/>
+        </p:nvSpPr>
+        <p:spPr>
+          <a:xfrm>
+            <a:off x="4737698" y="596900"/>
+            <a:ext cx="3967989" cy="1295401"/>
+          </a:xfrm>
+          <a:prstGeom prst="rect">
+            <a:avLst/>
+          </a:prstGeom>
+          <a:ln w="3175">
+            <a:miter lim="400000"/>
+          </a:ln>
+          <a:extLst>
+            <a:ext uri="{C572A759-6A51-4108-AA02-DFA0A04FC94B}">
+              <ma14:wrappingTextBoxFlag xmlns:ma14="http://schemas.microsoft.com/office/mac/drawingml/2011/main" xmlns:a14="http://schemas.microsoft.com/office/drawing/2010/main" xmlns:m="http://schemas.openxmlformats.org/officeDocument/2006/math" xmlns="" val="1"/>
+            </a:ext>
+          </a:extLst>
+        </p:spPr>
+        <p:txBody>
+          <a:bodyPr wrap="none" lIns="38100" tIns="38100" rIns="38100" bIns="38100" anchor="ctr">
+            <a:spAutoFit/>
+          </a:bodyPr>
+          <a:lstStyle/>
+          <a:p>
+            <a:pPr>
+              <a:defRPr sz="8000">
+                <a:solidFill>
+                  <a:schemeClr val="accent5">
+                    <a:hueOff val="-444211"/>
+                    <a:satOff val="-14915"/>
+                    <a:lumOff val="22857"/>
+                  </a:schemeClr>
+                </a:solidFill>
+              </a:defRPr>
+            </a:pPr>
+            <a:r>
+              <a:rPr>
+                <a:solidFill>
+                  <a:srgbClr val="FA1116"/>
+                </a:solidFill>
+              </a:rPr>
+              <a:t>I</a:t>
+            </a:r>
+            <a:r>
+              <a:rPr>
+                <a:solidFill>
+                  <a:srgbClr val="000000"/>
+                </a:solidFill>
+              </a:rPr>
+              <a:t>terators</a:t>
+            </a:r>
+          </a:p>
+        </p:txBody>
+      </p:sp>
+      <p:sp>
+        <p:nvSpPr>
+          <p:cNvPr id="142" name="Another way to loop in Ruby!…"/>
+          <p:cNvSpPr txBox="1"/>
+          <p:nvPr/>
+        </p:nvSpPr>
+        <p:spPr>
+          <a:xfrm>
+            <a:off x="529553" y="2468543"/>
+            <a:ext cx="11945694" cy="7053213"/>
+          </a:xfrm>
+          <a:prstGeom prst="rect">
+            <a:avLst/>
+          </a:prstGeom>
+          <a:ln w="3175">
+            <a:miter lim="400000"/>
+          </a:ln>
+          <a:extLst>
+            <a:ext uri="{C572A759-6A51-4108-AA02-DFA0A04FC94B}">
+              <ma14:wrappingTextBoxFlag xmlns:ma14="http://schemas.microsoft.com/office/mac/drawingml/2011/main" xmlns:a14="http://schemas.microsoft.com/office/drawing/2010/main" xmlns:m="http://schemas.openxmlformats.org/officeDocument/2006/math" xmlns="" val="1"/>
+            </a:ext>
+          </a:extLst>
+        </p:spPr>
+        <p:txBody>
+          <a:bodyPr wrap="square" lIns="38100" tIns="38100" rIns="38100" bIns="38100" anchor="ctr">
+            <a:spAutoFit/>
+          </a:bodyPr>
+          <a:lstStyle/>
+          <a:p>
+            <a:pPr algn="l" defTabSz="457200">
+              <a:spcBef>
+                <a:spcPts val="500"/>
+              </a:spcBef>
+              <a:defRPr sz="3500">
+                <a:latin typeface="Helvetica"/>
+                <a:ea typeface="Helvetica"/>
+                <a:cs typeface="Helvetica"/>
+                <a:sym typeface="Helvetica"/>
+              </a:defRPr>
+            </a:pPr>
+            <a:r>
+              <a:rPr dirty="0"/>
+              <a:t>Another way to loop in Ruby!</a:t>
+            </a:r>
+          </a:p>
+          <a:p>
+            <a:pPr algn="l" defTabSz="457200">
+              <a:spcBef>
+                <a:spcPts val="500"/>
+              </a:spcBef>
+              <a:defRPr sz="3500">
+                <a:latin typeface="Helvetica"/>
+                <a:ea typeface="Helvetica"/>
+                <a:cs typeface="Helvetica"/>
+                <a:sym typeface="Helvetica"/>
+              </a:defRPr>
+            </a:pPr>
+            <a:endParaRPr dirty="0"/>
+          </a:p>
+          <a:p>
+            <a:pPr algn="l" defTabSz="457200">
+              <a:spcBef>
+                <a:spcPts val="500"/>
+              </a:spcBef>
+              <a:defRPr sz="3500">
+                <a:latin typeface="Helvetica"/>
+                <a:ea typeface="Helvetica"/>
+                <a:cs typeface="Helvetica"/>
+                <a:sym typeface="Helvetica"/>
+              </a:defRPr>
+            </a:pPr>
+            <a:r>
+              <a:rPr dirty="0"/>
+              <a:t>An </a:t>
+            </a:r>
+            <a:r>
+              <a:rPr b="1" dirty="0">
+                <a:solidFill>
+                  <a:srgbClr val="FA1116"/>
+                </a:solidFill>
+              </a:rPr>
+              <a:t>iterator</a:t>
+            </a:r>
+            <a:r>
+              <a:rPr i="1" dirty="0"/>
+              <a:t> </a:t>
+            </a:r>
+            <a:r>
+              <a:rPr dirty="0"/>
+              <a:t>is a Ruby method that repeatedly invokes a `block` of cod</a:t>
+            </a:r>
+            <a:r>
+              <a:rPr lang="en-CA" dirty="0"/>
+              <a:t>e</a:t>
+            </a:r>
+          </a:p>
+          <a:p>
+            <a:pPr algn="l" defTabSz="457200">
+              <a:spcBef>
+                <a:spcPts val="500"/>
+              </a:spcBef>
+              <a:defRPr sz="3500">
+                <a:latin typeface="Helvetica"/>
+                <a:ea typeface="Helvetica"/>
+                <a:cs typeface="Helvetica"/>
+                <a:sym typeface="Helvetica"/>
+              </a:defRPr>
+            </a:pPr>
+            <a:endParaRPr dirty="0"/>
+          </a:p>
+          <a:p>
+            <a:pPr algn="l" defTabSz="457200">
+              <a:spcBef>
+                <a:spcPts val="500"/>
+              </a:spcBef>
+              <a:defRPr sz="3500">
+                <a:latin typeface="Helvetica"/>
+                <a:ea typeface="Helvetica"/>
+                <a:cs typeface="Helvetica"/>
+                <a:sym typeface="Helvetica"/>
+              </a:defRPr>
+            </a:pPr>
+            <a:r>
+              <a:rPr dirty="0"/>
+              <a:t>That `block` of code is the bit that contains the instructions to be repeated</a:t>
+            </a:r>
+          </a:p>
+          <a:p>
+            <a:pPr algn="l" defTabSz="457200">
+              <a:spcBef>
+                <a:spcPts val="500"/>
+              </a:spcBef>
+              <a:defRPr sz="3500">
+                <a:latin typeface="Helvetica"/>
+                <a:ea typeface="Helvetica"/>
+                <a:cs typeface="Helvetica"/>
+                <a:sym typeface="Helvetica"/>
+              </a:defRPr>
+            </a:pPr>
+            <a:r>
+              <a:rPr dirty="0"/>
+              <a:t>(and those instructions may be anything you want!) </a:t>
+            </a:r>
+            <a:r>
+              <a:rPr dirty="0">
+                <a:latin typeface="Apple Color Emoji"/>
+                <a:ea typeface="Apple Color Emoji"/>
+                <a:cs typeface="Apple Color Emoji"/>
+                <a:sym typeface="Apple Color Emoji"/>
+              </a:rPr>
+              <a:t>🙌🏻</a:t>
+            </a:r>
+            <a:endParaRPr lang="en-CA" dirty="0">
+              <a:latin typeface="Apple Color Emoji"/>
+              <a:ea typeface="Apple Color Emoji"/>
+              <a:cs typeface="Apple Color Emoji"/>
+              <a:sym typeface="Apple Color Emoji"/>
+            </a:endParaRPr>
+          </a:p>
+          <a:p>
+            <a:pPr algn="l" defTabSz="457200">
+              <a:spcBef>
+                <a:spcPts val="500"/>
+              </a:spcBef>
+              <a:defRPr sz="3500">
+                <a:latin typeface="Helvetica"/>
+                <a:ea typeface="Helvetica"/>
+                <a:cs typeface="Helvetica"/>
+                <a:sym typeface="Helvetica"/>
+              </a:defRPr>
+            </a:pPr>
+            <a:endParaRPr lang="en-US" dirty="0"/>
+          </a:p>
+          <a:p>
+            <a:pPr algn="l" defTabSz="457200">
+              <a:spcBef>
+                <a:spcPts val="500"/>
+              </a:spcBef>
+              <a:defRPr sz="3500">
+                <a:latin typeface="Helvetica"/>
+                <a:ea typeface="Helvetica"/>
+                <a:cs typeface="Helvetica"/>
+                <a:sym typeface="Helvetica"/>
+              </a:defRPr>
+            </a:pPr>
+            <a:r>
+              <a:rPr lang="en-US" dirty="0"/>
+              <a:t>The number of times the action will be repeated is </a:t>
+            </a:r>
+            <a:r>
+              <a:rPr lang="en-US" b="1" dirty="0">
+                <a:solidFill>
+                  <a:srgbClr val="FA1116"/>
+                </a:solidFill>
+              </a:rPr>
+              <a:t>known </a:t>
+            </a:r>
+            <a:r>
+              <a:rPr lang="en-US" dirty="0">
+                <a:solidFill>
+                  <a:schemeClr val="tx1"/>
+                </a:solidFill>
+              </a:rPr>
+              <a:t>(not infinite)</a:t>
+            </a:r>
+            <a:r>
+              <a:rPr lang="en-US" b="1" dirty="0">
+                <a:solidFill>
+                  <a:schemeClr val="accent5">
+                    <a:hueOff val="-444211"/>
+                    <a:satOff val="-14915"/>
+                    <a:lumOff val="22857"/>
+                  </a:schemeClr>
+                </a:solidFill>
+              </a:rPr>
+              <a:t> </a:t>
+            </a:r>
+            <a:endParaRPr lang="en-US" b="1" dirty="0"/>
+          </a:p>
+          <a:p>
+            <a:pPr algn="l" defTabSz="457200">
+              <a:spcBef>
+                <a:spcPts val="500"/>
+              </a:spcBef>
+              <a:defRPr sz="3500">
+                <a:latin typeface="Helvetica"/>
+                <a:ea typeface="Helvetica"/>
+                <a:cs typeface="Helvetica"/>
+                <a:sym typeface="Helvetica"/>
+              </a:defRPr>
+            </a:pPr>
+            <a:endParaRPr dirty="0">
+              <a:latin typeface="Apple Color Emoji"/>
+              <a:ea typeface="Apple Color Emoji"/>
+              <a:cs typeface="Apple Color Emoji"/>
+              <a:sym typeface="Apple Color Emoji"/>
+            </a:endParaRPr>
+          </a:p>
+        </p:txBody>
+      </p:sp>
+    </p:spTree>
+  </p:cSld>
+  <p:clrMapOvr>
+    <a:masterClrMapping/>
+  </p:clrMapOvr>
+  <p:transition spd="med"/>
+</p:sld>
+</file>
+
+<file path=ppt/slides/slide9.xml><?xml version="1.0" encoding="utf-8"?>
+<p:sld xmlns:a="http://schemas.openxmlformats.org/drawingml/2006/main" xmlns:r="http://schemas.openxmlformats.org/officeDocument/2006/relationships" xmlns:p="http://schemas.openxmlformats.org/presentationml/2006/main">
+  <p:cSld>
+    <p:spTree>
+      <p:nvGrpSpPr>
+        <p:cNvPr id="1" name=""/>
+        <p:cNvGrpSpPr/>
+        <p:nvPr/>
+      </p:nvGrpSpPr>
+      <p:grpSpPr>
+        <a:xfrm>
+          <a:off x="0" y="0"/>
+          <a:ext cx="0" cy="0"/>
+          <a:chOff x="0" y="0"/>
+          <a:chExt cx="0" cy="0"/>
+        </a:xfrm>
+      </p:grpSpPr>
+      <p:sp>
+        <p:nvSpPr>
+          <p:cNvPr id="135" name="For loop"/>
+          <p:cNvSpPr txBox="1"/>
+          <p:nvPr/>
+        </p:nvSpPr>
+        <p:spPr>
+          <a:xfrm>
+            <a:off x="3657554" y="590576"/>
+            <a:ext cx="6128281" cy="1308050"/>
+          </a:xfrm>
+          <a:prstGeom prst="rect">
+            <a:avLst/>
+          </a:prstGeom>
+          <a:ln w="3175">
+            <a:miter lim="400000"/>
+          </a:ln>
+          <a:extLst>
+            <a:ext uri="{C572A759-6A51-4108-AA02-DFA0A04FC94B}">
+              <ma14:wrappingTextBoxFlag xmlns:ma14="http://schemas.microsoft.com/office/mac/drawingml/2011/main" xmlns:a14="http://schemas.microsoft.com/office/drawing/2010/main" xmlns:m="http://schemas.openxmlformats.org/officeDocument/2006/math" xmlns="" val="1"/>
+            </a:ext>
+          </a:extLst>
+        </p:spPr>
+        <p:txBody>
+          <a:bodyPr wrap="none" lIns="38100" tIns="38100" rIns="38100" bIns="38100" anchor="ctr">
+            <a:spAutoFit/>
+          </a:bodyPr>
+          <a:lstStyle/>
+          <a:p>
+            <a:pPr>
+              <a:defRPr sz="8000">
+                <a:solidFill>
+                  <a:schemeClr val="accent5">
+                    <a:hueOff val="-444211"/>
+                    <a:satOff val="-14915"/>
+                    <a:lumOff val="22857"/>
+                  </a:schemeClr>
+                </a:solidFill>
+              </a:defRPr>
+            </a:pPr>
+            <a:r>
+              <a:rPr lang="en-CA" dirty="0">
+                <a:solidFill>
+                  <a:srgbClr val="FA1116"/>
+                </a:solidFill>
+              </a:rPr>
+              <a:t>I</a:t>
+            </a:r>
+            <a:r>
+              <a:rPr lang="en-CA" dirty="0">
+                <a:solidFill>
+                  <a:srgbClr val="000000"/>
+                </a:solidFill>
+              </a:rPr>
+              <a:t>terators: </a:t>
+            </a:r>
+            <a:r>
+              <a:rPr lang="en-CA" dirty="0">
+                <a:solidFill>
+                  <a:srgbClr val="FF0000"/>
+                </a:solidFill>
+              </a:rPr>
+              <a:t>For</a:t>
+            </a:r>
+            <a:endParaRPr lang="en-CA" dirty="0">
+              <a:solidFill>
+                <a:srgbClr val="000000"/>
+              </a:solidFill>
+            </a:endParaRPr>
+          </a:p>
+        </p:txBody>
+      </p:sp>
+      <p:sp>
+        <p:nvSpPr>
+          <p:cNvPr id="136" name="The number of times the action will be repeated is known…"/>
+          <p:cNvSpPr txBox="1"/>
+          <p:nvPr/>
+        </p:nvSpPr>
+        <p:spPr>
+          <a:xfrm>
+            <a:off x="555246" y="2981773"/>
+            <a:ext cx="12332894" cy="5719514"/>
+          </a:xfrm>
+          <a:prstGeom prst="rect">
+            <a:avLst/>
+          </a:prstGeom>
+          <a:ln w="3175">
+            <a:miter lim="400000"/>
+          </a:ln>
+          <a:extLst>
+            <a:ext uri="{C572A759-6A51-4108-AA02-DFA0A04FC94B}">
+              <ma14:wrappingTextBoxFlag xmlns:ma14="http://schemas.microsoft.com/office/mac/drawingml/2011/main" xmlns:a14="http://schemas.microsoft.com/office/drawing/2010/main" xmlns:m="http://schemas.openxmlformats.org/officeDocument/2006/math" xmlns="" val="1"/>
+            </a:ext>
+          </a:extLst>
+        </p:spPr>
+        <p:txBody>
+          <a:bodyPr lIns="38100" tIns="38100" rIns="38100" bIns="38100" anchor="ctr">
+            <a:spAutoFit/>
+          </a:bodyPr>
+          <a:lstStyle/>
+          <a:p>
+            <a:pPr marL="514350" indent="-514350" algn="l" defTabSz="457200">
+              <a:spcBef>
+                <a:spcPts val="500"/>
+              </a:spcBef>
+              <a:buAutoNum type="arabicPeriod"/>
+              <a:defRPr sz="3500">
+                <a:latin typeface="Helvetica"/>
+                <a:ea typeface="Helvetica"/>
+                <a:cs typeface="Helvetica"/>
+                <a:sym typeface="Helvetica"/>
+              </a:defRPr>
+            </a:pPr>
+            <a:r>
+              <a:rPr lang="en-CA" b="1" dirty="0">
+                <a:solidFill>
+                  <a:srgbClr val="FA1116"/>
+                </a:solidFill>
+              </a:rPr>
+              <a:t>For</a:t>
+            </a:r>
+          </a:p>
+          <a:p>
+            <a:pPr algn="l" defTabSz="457200">
+              <a:spcBef>
+                <a:spcPts val="500"/>
+              </a:spcBef>
+              <a:defRPr sz="3500">
+                <a:latin typeface="Helvetica"/>
+                <a:ea typeface="Helvetica"/>
+                <a:cs typeface="Helvetica"/>
+                <a:sym typeface="Helvetica"/>
+              </a:defRPr>
+            </a:pPr>
+            <a:endParaRPr b="1" dirty="0"/>
+          </a:p>
+          <a:p>
+            <a:pPr algn="l" defTabSz="457200">
+              <a:spcBef>
+                <a:spcPts val="500"/>
+              </a:spcBef>
+              <a:defRPr sz="3500">
+                <a:latin typeface="Helvetica"/>
+                <a:ea typeface="Helvetica"/>
+                <a:cs typeface="Helvetica"/>
+                <a:sym typeface="Helvetica"/>
+              </a:defRPr>
+            </a:pPr>
+            <a:r>
+              <a:rPr lang="en-CA" dirty="0"/>
+              <a:t>It is used t</a:t>
+            </a:r>
+            <a:r>
+              <a:rPr dirty="0"/>
+              <a:t>o repeat an action in Ruby within a certain </a:t>
+            </a:r>
+            <a:r>
+              <a:rPr b="1" dirty="0">
+                <a:solidFill>
+                  <a:srgbClr val="FF0000"/>
+                </a:solidFill>
+              </a:rPr>
+              <a:t>range</a:t>
+            </a:r>
+            <a:r>
+              <a:rPr dirty="0"/>
+              <a:t> of elements</a:t>
+            </a:r>
+            <a:endParaRPr b="1" dirty="0"/>
+          </a:p>
+          <a:p>
+            <a:pPr algn="l" defTabSz="457200">
+              <a:spcBef>
+                <a:spcPts val="500"/>
+              </a:spcBef>
+              <a:defRPr sz="3500">
+                <a:latin typeface="Helvetica"/>
+                <a:ea typeface="Helvetica"/>
+                <a:cs typeface="Helvetica"/>
+                <a:sym typeface="Helvetica"/>
+              </a:defRPr>
+            </a:pPr>
+            <a:endParaRPr b="1" dirty="0"/>
+          </a:p>
+          <a:p>
+            <a:pPr algn="l" defTabSz="457200">
+              <a:spcBef>
+                <a:spcPts val="500"/>
+              </a:spcBef>
+              <a:defRPr sz="3500">
+                <a:latin typeface="Helvetica"/>
+                <a:ea typeface="Helvetica"/>
+                <a:cs typeface="Helvetica"/>
+                <a:sym typeface="Helvetica"/>
+              </a:defRPr>
+            </a:pPr>
+            <a:endParaRPr b="1" dirty="0"/>
+          </a:p>
+          <a:p>
+            <a:pPr algn="l" defTabSz="457200">
+              <a:defRPr sz="3500">
+                <a:latin typeface="Helvetica"/>
+                <a:ea typeface="Helvetica"/>
+                <a:cs typeface="Helvetica"/>
+                <a:sym typeface="Helvetica"/>
+              </a:defRPr>
+            </a:pPr>
+            <a:r>
+              <a:rPr dirty="0"/>
+              <a:t>1..10 -&gt; a range which includes the numbers from 1 to </a:t>
+            </a:r>
+            <a:r>
+              <a:rPr b="1" dirty="0"/>
+              <a:t>10</a:t>
+            </a:r>
+          </a:p>
+          <a:p>
+            <a:pPr algn="l" defTabSz="457200">
+              <a:defRPr sz="3500">
+                <a:latin typeface="Helvetica"/>
+                <a:ea typeface="Helvetica"/>
+                <a:cs typeface="Helvetica"/>
+                <a:sym typeface="Helvetica"/>
+              </a:defRPr>
+            </a:pPr>
+            <a:endParaRPr b="1" dirty="0"/>
+          </a:p>
+          <a:p>
+            <a:pPr algn="l" defTabSz="457200">
+              <a:defRPr sz="3500">
+                <a:latin typeface="Helvetica"/>
+                <a:ea typeface="Helvetica"/>
+                <a:cs typeface="Helvetica"/>
+                <a:sym typeface="Helvetica"/>
+              </a:defRPr>
+            </a:pPr>
+            <a:r>
+              <a:rPr dirty="0"/>
+              <a:t>1…10 -&gt; a range which includes the numbers from 1 to </a:t>
+            </a:r>
+            <a:r>
+              <a:rPr b="1" dirty="0"/>
+              <a:t>9</a:t>
+            </a:r>
+          </a:p>
+          <a:p>
+            <a:pPr algn="l" defTabSz="457200">
+              <a:defRPr sz="3500">
+                <a:latin typeface="Helvetica"/>
+                <a:ea typeface="Helvetica"/>
+                <a:cs typeface="Helvetica"/>
+                <a:sym typeface="Helvetica"/>
+              </a:defRPr>
+            </a:pPr>
+            <a:endParaRPr b="1" dirty="0"/>
           </a:p>
         </p:txBody>
       </p:sp>

</xml_diff>